<commit_message>
Erster Entwurf Umfrage II
</commit_message>
<xml_diff>
--- a/documents/marketing/Marketing Analyse von Umfrage 1 (5.5).pptx
+++ b/documents/marketing/Marketing Analyse von Umfrage 1 (5.5).pptx
@@ -373,7 +373,7 @@
           <a:p>
             <a:fld id="{1BA50D42-C9CD-4801-B293-61D1F53EC57E}" type="datetimeFigureOut">
               <a:rPr lang="de-DE" smtClean="0"/>
-              <a:t>18.12.2014</a:t>
+              <a:t>19.12.2014</a:t>
             </a:fld>
             <a:endParaRPr lang="de-DE"/>
           </a:p>
@@ -538,7 +538,7 @@
           <a:p>
             <a:fld id="{1BA50D42-C9CD-4801-B293-61D1F53EC57E}" type="datetimeFigureOut">
               <a:rPr lang="de-DE" smtClean="0"/>
-              <a:t>18.12.2014</a:t>
+              <a:t>19.12.2014</a:t>
             </a:fld>
             <a:endParaRPr lang="de-DE"/>
           </a:p>
@@ -713,7 +713,7 @@
           <a:p>
             <a:fld id="{1BA50D42-C9CD-4801-B293-61D1F53EC57E}" type="datetimeFigureOut">
               <a:rPr lang="de-DE" smtClean="0"/>
-              <a:t>18.12.2014</a:t>
+              <a:t>19.12.2014</a:t>
             </a:fld>
             <a:endParaRPr lang="de-DE"/>
           </a:p>
@@ -878,7 +878,7 @@
           <a:p>
             <a:fld id="{1BA50D42-C9CD-4801-B293-61D1F53EC57E}" type="datetimeFigureOut">
               <a:rPr lang="de-DE" smtClean="0"/>
-              <a:t>18.12.2014</a:t>
+              <a:t>19.12.2014</a:t>
             </a:fld>
             <a:endParaRPr lang="de-DE"/>
           </a:p>
@@ -1119,7 +1119,7 @@
           <a:p>
             <a:fld id="{1BA50D42-C9CD-4801-B293-61D1F53EC57E}" type="datetimeFigureOut">
               <a:rPr lang="de-DE" smtClean="0"/>
-              <a:t>18.12.2014</a:t>
+              <a:t>19.12.2014</a:t>
             </a:fld>
             <a:endParaRPr lang="de-DE"/>
           </a:p>
@@ -1402,7 +1402,7 @@
           <a:p>
             <a:fld id="{1BA50D42-C9CD-4801-B293-61D1F53EC57E}" type="datetimeFigureOut">
               <a:rPr lang="de-DE" smtClean="0"/>
-              <a:t>18.12.2014</a:t>
+              <a:t>19.12.2014</a:t>
             </a:fld>
             <a:endParaRPr lang="de-DE"/>
           </a:p>
@@ -1819,7 +1819,7 @@
           <a:p>
             <a:fld id="{1BA50D42-C9CD-4801-B293-61D1F53EC57E}" type="datetimeFigureOut">
               <a:rPr lang="de-DE" smtClean="0"/>
-              <a:t>18.12.2014</a:t>
+              <a:t>19.12.2014</a:t>
             </a:fld>
             <a:endParaRPr lang="de-DE"/>
           </a:p>
@@ -1932,7 +1932,7 @@
           <a:p>
             <a:fld id="{1BA50D42-C9CD-4801-B293-61D1F53EC57E}" type="datetimeFigureOut">
               <a:rPr lang="de-DE" smtClean="0"/>
-              <a:t>18.12.2014</a:t>
+              <a:t>19.12.2014</a:t>
             </a:fld>
             <a:endParaRPr lang="de-DE"/>
           </a:p>
@@ -2022,7 +2022,7 @@
           <a:p>
             <a:fld id="{1BA50D42-C9CD-4801-B293-61D1F53EC57E}" type="datetimeFigureOut">
               <a:rPr lang="de-DE" smtClean="0"/>
-              <a:t>18.12.2014</a:t>
+              <a:t>19.12.2014</a:t>
             </a:fld>
             <a:endParaRPr lang="de-DE"/>
           </a:p>
@@ -2294,7 +2294,7 @@
           <a:p>
             <a:fld id="{1BA50D42-C9CD-4801-B293-61D1F53EC57E}" type="datetimeFigureOut">
               <a:rPr lang="de-DE" smtClean="0"/>
-              <a:t>18.12.2014</a:t>
+              <a:t>19.12.2014</a:t>
             </a:fld>
             <a:endParaRPr lang="de-DE"/>
           </a:p>
@@ -2542,7 +2542,7 @@
           <a:p>
             <a:fld id="{1BA50D42-C9CD-4801-B293-61D1F53EC57E}" type="datetimeFigureOut">
               <a:rPr lang="de-DE" smtClean="0"/>
-              <a:t>18.12.2014</a:t>
+              <a:t>19.12.2014</a:t>
             </a:fld>
             <a:endParaRPr lang="de-DE"/>
           </a:p>
@@ -2750,7 +2750,7 @@
           <a:p>
             <a:fld id="{1BA50D42-C9CD-4801-B293-61D1F53EC57E}" type="datetimeFigureOut">
               <a:rPr lang="de-DE" smtClean="0"/>
-              <a:t>18.12.2014</a:t>
+              <a:t>19.12.2014</a:t>
             </a:fld>
             <a:endParaRPr lang="de-DE"/>
           </a:p>
@@ -3184,6 +3184,13 @@
   <p:clrMapOvr>
     <a:masterClrMapping/>
   </p:clrMapOvr>
+  <p:timing>
+    <p:tnLst>
+      <p:par>
+        <p:cTn id="1" dur="indefinite" restart="never" nodeType="tmRoot"/>
+      </p:par>
+    </p:tnLst>
+  </p:timing>
 </p:sld>
 </file>
 
@@ -3391,6 +3398,13 @@
   <p:clrMapOvr>
     <a:masterClrMapping/>
   </p:clrMapOvr>
+  <p:timing>
+    <p:tnLst>
+      <p:par>
+        <p:cTn id="1" dur="indefinite" restart="never" nodeType="tmRoot"/>
+      </p:par>
+    </p:tnLst>
+  </p:timing>
 </p:sld>
 </file>
 
@@ -3626,6 +3640,13 @@
   <p:clrMapOvr>
     <a:masterClrMapping/>
   </p:clrMapOvr>
+  <p:timing>
+    <p:tnLst>
+      <p:par>
+        <p:cTn id="1" dur="indefinite" restart="never" nodeType="tmRoot"/>
+      </p:par>
+    </p:tnLst>
+  </p:timing>
 </p:sld>
 </file>
 
@@ -3823,6 +3844,13 @@
   <p:clrMapOvr>
     <a:masterClrMapping/>
   </p:clrMapOvr>
+  <p:timing>
+    <p:tnLst>
+      <p:par>
+        <p:cTn id="1" dur="indefinite" restart="never" nodeType="tmRoot"/>
+      </p:par>
+    </p:tnLst>
+  </p:timing>
 </p:sld>
 </file>
 
@@ -4028,6 +4056,13 @@
   <p:clrMapOvr>
     <a:masterClrMapping/>
   </p:clrMapOvr>
+  <p:timing>
+    <p:tnLst>
+      <p:par>
+        <p:cTn id="1" dur="indefinite" restart="never" nodeType="tmRoot"/>
+      </p:par>
+    </p:tnLst>
+  </p:timing>
 </p:sld>
 </file>
 
@@ -4232,6 +4267,13 @@
   <p:clrMapOvr>
     <a:masterClrMapping/>
   </p:clrMapOvr>
+  <p:timing>
+    <p:tnLst>
+      <p:par>
+        <p:cTn id="1" dur="indefinite" restart="never" nodeType="tmRoot"/>
+      </p:par>
+    </p:tnLst>
+  </p:timing>
 </p:sld>
 </file>
 
@@ -4429,6 +4471,13 @@
   <p:clrMapOvr>
     <a:masterClrMapping/>
   </p:clrMapOvr>
+  <p:timing>
+    <p:tnLst>
+      <p:par>
+        <p:cTn id="1" dur="indefinite" restart="never" nodeType="tmRoot"/>
+      </p:par>
+    </p:tnLst>
+  </p:timing>
 </p:sld>
 </file>
 
@@ -4633,6 +4682,13 @@
   <p:clrMapOvr>
     <a:masterClrMapping/>
   </p:clrMapOvr>
+  <p:timing>
+    <p:tnLst>
+      <p:par>
+        <p:cTn id="1" dur="indefinite" restart="never" nodeType="tmRoot"/>
+      </p:par>
+    </p:tnLst>
+  </p:timing>
 </p:sld>
 </file>
 
@@ -4837,6 +4893,13 @@
   <p:clrMapOvr>
     <a:masterClrMapping/>
   </p:clrMapOvr>
+  <p:timing>
+    <p:tnLst>
+      <p:par>
+        <p:cTn id="1" dur="indefinite" restart="never" nodeType="tmRoot"/>
+      </p:par>
+    </p:tnLst>
+  </p:timing>
 </p:sld>
 </file>
 
@@ -5041,6 +5104,13 @@
   <p:clrMapOvr>
     <a:masterClrMapping/>
   </p:clrMapOvr>
+  <p:timing>
+    <p:tnLst>
+      <p:par>
+        <p:cTn id="1" dur="indefinite" restart="never" nodeType="tmRoot"/>
+      </p:par>
+    </p:tnLst>
+  </p:timing>
 </p:sld>
 </file>
 
@@ -5248,6 +5318,13 @@
   <p:clrMapOvr>
     <a:masterClrMapping/>
   </p:clrMapOvr>
+  <p:timing>
+    <p:tnLst>
+      <p:par>
+        <p:cTn id="1" dur="indefinite" restart="never" nodeType="tmRoot"/>
+      </p:par>
+    </p:tnLst>
+  </p:timing>
 </p:sld>
 </file>
 
@@ -5439,6 +5516,13 @@
   <p:clrMapOvr>
     <a:masterClrMapping/>
   </p:clrMapOvr>
+  <p:timing>
+    <p:tnLst>
+      <p:par>
+        <p:cTn id="1" dur="indefinite" restart="never" nodeType="tmRoot"/>
+      </p:par>
+    </p:tnLst>
+  </p:timing>
 </p:sld>
 </file>
 
@@ -5636,6 +5720,13 @@
   <p:clrMapOvr>
     <a:masterClrMapping/>
   </p:clrMapOvr>
+  <p:timing>
+    <p:tnLst>
+      <p:par>
+        <p:cTn id="1" dur="indefinite" restart="never" nodeType="tmRoot"/>
+      </p:par>
+    </p:tnLst>
+  </p:timing>
 </p:sld>
 </file>
 
@@ -5840,6 +5931,13 @@
   <p:clrMapOvr>
     <a:masterClrMapping/>
   </p:clrMapOvr>
+  <p:timing>
+    <p:tnLst>
+      <p:par>
+        <p:cTn id="1" dur="indefinite" restart="never" nodeType="tmRoot"/>
+      </p:par>
+    </p:tnLst>
+  </p:timing>
 </p:sld>
 </file>
 
@@ -6044,6 +6142,13 @@
   <p:clrMapOvr>
     <a:masterClrMapping/>
   </p:clrMapOvr>
+  <p:timing>
+    <p:tnLst>
+      <p:par>
+        <p:cTn id="1" dur="indefinite" restart="never" nodeType="tmRoot"/>
+      </p:par>
+    </p:tnLst>
+  </p:timing>
 </p:sld>
 </file>
 
@@ -6259,6 +6364,13 @@
   <p:clrMapOvr>
     <a:masterClrMapping/>
   </p:clrMapOvr>
+  <p:timing>
+    <p:tnLst>
+      <p:par>
+        <p:cTn id="1" dur="indefinite" restart="never" nodeType="tmRoot"/>
+      </p:par>
+    </p:tnLst>
+  </p:timing>
 </p:sld>
 </file>
 
@@ -6466,6 +6578,13 @@
   <p:clrMapOvr>
     <a:masterClrMapping/>
   </p:clrMapOvr>
+  <p:timing>
+    <p:tnLst>
+      <p:par>
+        <p:cTn id="1" dur="indefinite" restart="never" nodeType="tmRoot"/>
+      </p:par>
+    </p:tnLst>
+  </p:timing>
 </p:sld>
 </file>
 
@@ -6670,6 +6789,13 @@
   <p:clrMapOvr>
     <a:masterClrMapping/>
   </p:clrMapOvr>
+  <p:timing>
+    <p:tnLst>
+      <p:par>
+        <p:cTn id="1" dur="indefinite" restart="never" nodeType="tmRoot"/>
+      </p:par>
+    </p:tnLst>
+  </p:timing>
 </p:sld>
 </file>
 
@@ -6874,6 +7000,13 @@
   <p:clrMapOvr>
     <a:masterClrMapping/>
   </p:clrMapOvr>
+  <p:timing>
+    <p:tnLst>
+      <p:par>
+        <p:cTn id="1" dur="indefinite" restart="never" nodeType="tmRoot"/>
+      </p:par>
+    </p:tnLst>
+  </p:timing>
 </p:sld>
 </file>
 
@@ -7098,6 +7231,13 @@
   <p:clrMapOvr>
     <a:masterClrMapping/>
   </p:clrMapOvr>
+  <p:timing>
+    <p:tnLst>
+      <p:par>
+        <p:cTn id="1" dur="indefinite" restart="never" nodeType="tmRoot"/>
+      </p:par>
+    </p:tnLst>
+  </p:timing>
 </p:sld>
 </file>
 
@@ -7182,6 +7322,13 @@
   <p:clrMapOvr>
     <a:masterClrMapping/>
   </p:clrMapOvr>
+  <p:timing>
+    <p:tnLst>
+      <p:par>
+        <p:cTn id="1" dur="indefinite" restart="never" nodeType="tmRoot"/>
+      </p:par>
+    </p:tnLst>
+  </p:timing>
 </p:sld>
 </file>
 
@@ -7373,6 +7520,13 @@
   <p:clrMapOvr>
     <a:masterClrMapping/>
   </p:clrMapOvr>
+  <p:timing>
+    <p:tnLst>
+      <p:par>
+        <p:cTn id="1" dur="indefinite" restart="never" nodeType="tmRoot"/>
+      </p:par>
+    </p:tnLst>
+  </p:timing>
 </p:sld>
 </file>
 
@@ -7564,6 +7718,13 @@
   <p:clrMapOvr>
     <a:masterClrMapping/>
   </p:clrMapOvr>
+  <p:timing>
+    <p:tnLst>
+      <p:par>
+        <p:cTn id="1" dur="indefinite" restart="never" nodeType="tmRoot"/>
+      </p:par>
+    </p:tnLst>
+  </p:timing>
 </p:sld>
 </file>
 
@@ -7771,6 +7932,13 @@
   <p:clrMapOvr>
     <a:masterClrMapping/>
   </p:clrMapOvr>
+  <p:timing>
+    <p:tnLst>
+      <p:par>
+        <p:cTn id="1" dur="indefinite" restart="never" nodeType="tmRoot"/>
+      </p:par>
+    </p:tnLst>
+  </p:timing>
 </p:sld>
 </file>
 
@@ -7962,6 +8130,13 @@
   <p:clrMapOvr>
     <a:masterClrMapping/>
   </p:clrMapOvr>
+  <p:timing>
+    <p:tnLst>
+      <p:par>
+        <p:cTn id="1" dur="indefinite" restart="never" nodeType="tmRoot"/>
+      </p:par>
+    </p:tnLst>
+  </p:timing>
 </p:sld>
 </file>
 
@@ -8163,6 +8338,13 @@
   <p:clrMapOvr>
     <a:masterClrMapping/>
   </p:clrMapOvr>
+  <p:timing>
+    <p:tnLst>
+      <p:par>
+        <p:cTn id="1" dur="indefinite" restart="never" nodeType="tmRoot"/>
+      </p:par>
+    </p:tnLst>
+  </p:timing>
 </p:sld>
 </file>
 
@@ -8252,12 +8434,12 @@
               <a:t>An diesen Tagen sollte mehr als eine vordefinierte Route angeboten werden </a:t>
             </a:r>
             <a:r>
-              <a:rPr lang="de-DE" sz="1600" dirty="0" err="1" smtClean="0"/>
-              <a:t>umd</a:t>
-            </a:r>
-            <a:r>
               <a:rPr lang="de-DE" sz="1600" dirty="0" smtClean="0"/>
-              <a:t> Auswahlmöglichkeiten zu bieten.</a:t>
+              <a:t>um </a:t>
+            </a:r>
+            <a:r>
+              <a:rPr lang="de-DE" sz="1600" dirty="0" smtClean="0"/>
+              <a:t>Auswahlmöglichkeiten zu bieten.</a:t>
             </a:r>
             <a:endParaRPr lang="de-DE" sz="1600" dirty="0"/>
           </a:p>
@@ -8375,6 +8557,13 @@
   <p:clrMapOvr>
     <a:masterClrMapping/>
   </p:clrMapOvr>
+  <p:timing>
+    <p:tnLst>
+      <p:par>
+        <p:cTn id="1" dur="indefinite" restart="never" nodeType="tmRoot"/>
+      </p:par>
+    </p:tnLst>
+  </p:timing>
 </p:sld>
 </file>
 
@@ -8582,6 +8771,13 @@
   <p:clrMapOvr>
     <a:masterClrMapping/>
   </p:clrMapOvr>
+  <p:timing>
+    <p:tnLst>
+      <p:par>
+        <p:cTn id="1" dur="indefinite" restart="never" nodeType="tmRoot"/>
+      </p:par>
+    </p:tnLst>
+  </p:timing>
 </p:sld>
 </file>
 

</xml_diff>

<commit_message>
Update Analyse Umfrage I
</commit_message>
<xml_diff>
--- a/documents/marketing/Marketing Analyse von Umfrage 1 (5.5).pptx
+++ b/documents/marketing/Marketing Analyse von Umfrage 1 (5.5).pptx
@@ -373,7 +373,7 @@
           <a:p>
             <a:fld id="{1BA50D42-C9CD-4801-B293-61D1F53EC57E}" type="datetimeFigureOut">
               <a:rPr lang="de-DE" smtClean="0"/>
-              <a:t>19.12.2014</a:t>
+              <a:t>20.12.2014</a:t>
             </a:fld>
             <a:endParaRPr lang="de-DE"/>
           </a:p>
@@ -538,7 +538,7 @@
           <a:p>
             <a:fld id="{1BA50D42-C9CD-4801-B293-61D1F53EC57E}" type="datetimeFigureOut">
               <a:rPr lang="de-DE" smtClean="0"/>
-              <a:t>19.12.2014</a:t>
+              <a:t>20.12.2014</a:t>
             </a:fld>
             <a:endParaRPr lang="de-DE"/>
           </a:p>
@@ -713,7 +713,7 @@
           <a:p>
             <a:fld id="{1BA50D42-C9CD-4801-B293-61D1F53EC57E}" type="datetimeFigureOut">
               <a:rPr lang="de-DE" smtClean="0"/>
-              <a:t>19.12.2014</a:t>
+              <a:t>20.12.2014</a:t>
             </a:fld>
             <a:endParaRPr lang="de-DE"/>
           </a:p>
@@ -878,7 +878,7 @@
           <a:p>
             <a:fld id="{1BA50D42-C9CD-4801-B293-61D1F53EC57E}" type="datetimeFigureOut">
               <a:rPr lang="de-DE" smtClean="0"/>
-              <a:t>19.12.2014</a:t>
+              <a:t>20.12.2014</a:t>
             </a:fld>
             <a:endParaRPr lang="de-DE"/>
           </a:p>
@@ -1119,7 +1119,7 @@
           <a:p>
             <a:fld id="{1BA50D42-C9CD-4801-B293-61D1F53EC57E}" type="datetimeFigureOut">
               <a:rPr lang="de-DE" smtClean="0"/>
-              <a:t>19.12.2014</a:t>
+              <a:t>20.12.2014</a:t>
             </a:fld>
             <a:endParaRPr lang="de-DE"/>
           </a:p>
@@ -1402,7 +1402,7 @@
           <a:p>
             <a:fld id="{1BA50D42-C9CD-4801-B293-61D1F53EC57E}" type="datetimeFigureOut">
               <a:rPr lang="de-DE" smtClean="0"/>
-              <a:t>19.12.2014</a:t>
+              <a:t>20.12.2014</a:t>
             </a:fld>
             <a:endParaRPr lang="de-DE"/>
           </a:p>
@@ -1819,7 +1819,7 @@
           <a:p>
             <a:fld id="{1BA50D42-C9CD-4801-B293-61D1F53EC57E}" type="datetimeFigureOut">
               <a:rPr lang="de-DE" smtClean="0"/>
-              <a:t>19.12.2014</a:t>
+              <a:t>20.12.2014</a:t>
             </a:fld>
             <a:endParaRPr lang="de-DE"/>
           </a:p>
@@ -1932,7 +1932,7 @@
           <a:p>
             <a:fld id="{1BA50D42-C9CD-4801-B293-61D1F53EC57E}" type="datetimeFigureOut">
               <a:rPr lang="de-DE" smtClean="0"/>
-              <a:t>19.12.2014</a:t>
+              <a:t>20.12.2014</a:t>
             </a:fld>
             <a:endParaRPr lang="de-DE"/>
           </a:p>
@@ -2022,7 +2022,7 @@
           <a:p>
             <a:fld id="{1BA50D42-C9CD-4801-B293-61D1F53EC57E}" type="datetimeFigureOut">
               <a:rPr lang="de-DE" smtClean="0"/>
-              <a:t>19.12.2014</a:t>
+              <a:t>20.12.2014</a:t>
             </a:fld>
             <a:endParaRPr lang="de-DE"/>
           </a:p>
@@ -2294,7 +2294,7 @@
           <a:p>
             <a:fld id="{1BA50D42-C9CD-4801-B293-61D1F53EC57E}" type="datetimeFigureOut">
               <a:rPr lang="de-DE" smtClean="0"/>
-              <a:t>19.12.2014</a:t>
+              <a:t>20.12.2014</a:t>
             </a:fld>
             <a:endParaRPr lang="de-DE"/>
           </a:p>
@@ -2542,7 +2542,7 @@
           <a:p>
             <a:fld id="{1BA50D42-C9CD-4801-B293-61D1F53EC57E}" type="datetimeFigureOut">
               <a:rPr lang="de-DE" smtClean="0"/>
-              <a:t>19.12.2014</a:t>
+              <a:t>20.12.2014</a:t>
             </a:fld>
             <a:endParaRPr lang="de-DE"/>
           </a:p>
@@ -2750,7 +2750,7 @@
           <a:p>
             <a:fld id="{1BA50D42-C9CD-4801-B293-61D1F53EC57E}" type="datetimeFigureOut">
               <a:rPr lang="de-DE" smtClean="0"/>
-              <a:t>19.12.2014</a:t>
+              <a:t>20.12.2014</a:t>
             </a:fld>
             <a:endParaRPr lang="de-DE"/>
           </a:p>
@@ -3184,13 +3184,6 @@
   <p:clrMapOvr>
     <a:masterClrMapping/>
   </p:clrMapOvr>
-  <p:timing>
-    <p:tnLst>
-      <p:par>
-        <p:cTn id="1" dur="indefinite" restart="never" nodeType="tmRoot"/>
-      </p:par>
-    </p:tnLst>
-  </p:timing>
 </p:sld>
 </file>
 
@@ -3398,13 +3391,6 @@
   <p:clrMapOvr>
     <a:masterClrMapping/>
   </p:clrMapOvr>
-  <p:timing>
-    <p:tnLst>
-      <p:par>
-        <p:cTn id="1" dur="indefinite" restart="never" nodeType="tmRoot"/>
-      </p:par>
-    </p:tnLst>
-  </p:timing>
 </p:sld>
 </file>
 
@@ -3640,13 +3626,6 @@
   <p:clrMapOvr>
     <a:masterClrMapping/>
   </p:clrMapOvr>
-  <p:timing>
-    <p:tnLst>
-      <p:par>
-        <p:cTn id="1" dur="indefinite" restart="never" nodeType="tmRoot"/>
-      </p:par>
-    </p:tnLst>
-  </p:timing>
 </p:sld>
 </file>
 
@@ -3844,13 +3823,6 @@
   <p:clrMapOvr>
     <a:masterClrMapping/>
   </p:clrMapOvr>
-  <p:timing>
-    <p:tnLst>
-      <p:par>
-        <p:cTn id="1" dur="indefinite" restart="never" nodeType="tmRoot"/>
-      </p:par>
-    </p:tnLst>
-  </p:timing>
 </p:sld>
 </file>
 
@@ -4056,13 +4028,6 @@
   <p:clrMapOvr>
     <a:masterClrMapping/>
   </p:clrMapOvr>
-  <p:timing>
-    <p:tnLst>
-      <p:par>
-        <p:cTn id="1" dur="indefinite" restart="never" nodeType="tmRoot"/>
-      </p:par>
-    </p:tnLst>
-  </p:timing>
 </p:sld>
 </file>
 
@@ -4267,13 +4232,6 @@
   <p:clrMapOvr>
     <a:masterClrMapping/>
   </p:clrMapOvr>
-  <p:timing>
-    <p:tnLst>
-      <p:par>
-        <p:cTn id="1" dur="indefinite" restart="never" nodeType="tmRoot"/>
-      </p:par>
-    </p:tnLst>
-  </p:timing>
 </p:sld>
 </file>
 
@@ -4471,13 +4429,6 @@
   <p:clrMapOvr>
     <a:masterClrMapping/>
   </p:clrMapOvr>
-  <p:timing>
-    <p:tnLst>
-      <p:par>
-        <p:cTn id="1" dur="indefinite" restart="never" nodeType="tmRoot"/>
-      </p:par>
-    </p:tnLst>
-  </p:timing>
 </p:sld>
 </file>
 
@@ -4682,13 +4633,6 @@
   <p:clrMapOvr>
     <a:masterClrMapping/>
   </p:clrMapOvr>
-  <p:timing>
-    <p:tnLst>
-      <p:par>
-        <p:cTn id="1" dur="indefinite" restart="never" nodeType="tmRoot"/>
-      </p:par>
-    </p:tnLst>
-  </p:timing>
 </p:sld>
 </file>
 
@@ -4893,13 +4837,6 @@
   <p:clrMapOvr>
     <a:masterClrMapping/>
   </p:clrMapOvr>
-  <p:timing>
-    <p:tnLst>
-      <p:par>
-        <p:cTn id="1" dur="indefinite" restart="never" nodeType="tmRoot"/>
-      </p:par>
-    </p:tnLst>
-  </p:timing>
 </p:sld>
 </file>
 
@@ -5104,13 +5041,6 @@
   <p:clrMapOvr>
     <a:masterClrMapping/>
   </p:clrMapOvr>
-  <p:timing>
-    <p:tnLst>
-      <p:par>
-        <p:cTn id="1" dur="indefinite" restart="never" nodeType="tmRoot"/>
-      </p:par>
-    </p:tnLst>
-  </p:timing>
 </p:sld>
 </file>
 
@@ -5318,13 +5248,6 @@
   <p:clrMapOvr>
     <a:masterClrMapping/>
   </p:clrMapOvr>
-  <p:timing>
-    <p:tnLst>
-      <p:par>
-        <p:cTn id="1" dur="indefinite" restart="never" nodeType="tmRoot"/>
-      </p:par>
-    </p:tnLst>
-  </p:timing>
 </p:sld>
 </file>
 
@@ -5516,13 +5439,6 @@
   <p:clrMapOvr>
     <a:masterClrMapping/>
   </p:clrMapOvr>
-  <p:timing>
-    <p:tnLst>
-      <p:par>
-        <p:cTn id="1" dur="indefinite" restart="never" nodeType="tmRoot"/>
-      </p:par>
-    </p:tnLst>
-  </p:timing>
 </p:sld>
 </file>
 
@@ -5720,13 +5636,6 @@
   <p:clrMapOvr>
     <a:masterClrMapping/>
   </p:clrMapOvr>
-  <p:timing>
-    <p:tnLst>
-      <p:par>
-        <p:cTn id="1" dur="indefinite" restart="never" nodeType="tmRoot"/>
-      </p:par>
-    </p:tnLst>
-  </p:timing>
 </p:sld>
 </file>
 
@@ -5931,13 +5840,6 @@
   <p:clrMapOvr>
     <a:masterClrMapping/>
   </p:clrMapOvr>
-  <p:timing>
-    <p:tnLst>
-      <p:par>
-        <p:cTn id="1" dur="indefinite" restart="never" nodeType="tmRoot"/>
-      </p:par>
-    </p:tnLst>
-  </p:timing>
 </p:sld>
 </file>
 
@@ -6142,13 +6044,6 @@
   <p:clrMapOvr>
     <a:masterClrMapping/>
   </p:clrMapOvr>
-  <p:timing>
-    <p:tnLst>
-      <p:par>
-        <p:cTn id="1" dur="indefinite" restart="never" nodeType="tmRoot"/>
-      </p:par>
-    </p:tnLst>
-  </p:timing>
 </p:sld>
 </file>
 
@@ -6364,13 +6259,6 @@
   <p:clrMapOvr>
     <a:masterClrMapping/>
   </p:clrMapOvr>
-  <p:timing>
-    <p:tnLst>
-      <p:par>
-        <p:cTn id="1" dur="indefinite" restart="never" nodeType="tmRoot"/>
-      </p:par>
-    </p:tnLst>
-  </p:timing>
 </p:sld>
 </file>
 
@@ -6578,13 +6466,6 @@
   <p:clrMapOvr>
     <a:masterClrMapping/>
   </p:clrMapOvr>
-  <p:timing>
-    <p:tnLst>
-      <p:par>
-        <p:cTn id="1" dur="indefinite" restart="never" nodeType="tmRoot"/>
-      </p:par>
-    </p:tnLst>
-  </p:timing>
 </p:sld>
 </file>
 
@@ -6789,13 +6670,6 @@
   <p:clrMapOvr>
     <a:masterClrMapping/>
   </p:clrMapOvr>
-  <p:timing>
-    <p:tnLst>
-      <p:par>
-        <p:cTn id="1" dur="indefinite" restart="never" nodeType="tmRoot"/>
-      </p:par>
-    </p:tnLst>
-  </p:timing>
 </p:sld>
 </file>
 
@@ -7000,13 +6874,6 @@
   <p:clrMapOvr>
     <a:masterClrMapping/>
   </p:clrMapOvr>
-  <p:timing>
-    <p:tnLst>
-      <p:par>
-        <p:cTn id="1" dur="indefinite" restart="never" nodeType="tmRoot"/>
-      </p:par>
-    </p:tnLst>
-  </p:timing>
 </p:sld>
 </file>
 
@@ -7231,13 +7098,6 @@
   <p:clrMapOvr>
     <a:masterClrMapping/>
   </p:clrMapOvr>
-  <p:timing>
-    <p:tnLst>
-      <p:par>
-        <p:cTn id="1" dur="indefinite" restart="never" nodeType="tmRoot"/>
-      </p:par>
-    </p:tnLst>
-  </p:timing>
 </p:sld>
 </file>
 
@@ -7322,13 +7182,6 @@
   <p:clrMapOvr>
     <a:masterClrMapping/>
   </p:clrMapOvr>
-  <p:timing>
-    <p:tnLst>
-      <p:par>
-        <p:cTn id="1" dur="indefinite" restart="never" nodeType="tmRoot"/>
-      </p:par>
-    </p:tnLst>
-  </p:timing>
 </p:sld>
 </file>
 
@@ -7366,7 +7219,11 @@
           <a:p>
             <a:r>
               <a:rPr lang="de-DE" dirty="0" smtClean="0"/>
-              <a:t>Geschlecht (22)</a:t>
+              <a:t>Dein Geschlecht? (Q22</a:t>
+            </a:r>
+            <a:r>
+              <a:rPr lang="de-DE" dirty="0" smtClean="0"/>
+              <a:t>)</a:t>
             </a:r>
             <a:endParaRPr lang="de-DE" dirty="0"/>
           </a:p>
@@ -7520,13 +7377,6 @@
   <p:clrMapOvr>
     <a:masterClrMapping/>
   </p:clrMapOvr>
-  <p:timing>
-    <p:tnLst>
-      <p:par>
-        <p:cTn id="1" dur="indefinite" restart="never" nodeType="tmRoot"/>
-      </p:par>
-    </p:tnLst>
-  </p:timing>
 </p:sld>
 </file>
 
@@ -7564,7 +7414,11 @@
           <a:p>
             <a:r>
               <a:rPr lang="de-DE" dirty="0" smtClean="0"/>
-              <a:t>Alter (23)</a:t>
+              <a:t>Dein Alter (Q23</a:t>
+            </a:r>
+            <a:r>
+              <a:rPr lang="de-DE" dirty="0" smtClean="0"/>
+              <a:t>)</a:t>
             </a:r>
             <a:endParaRPr lang="de-DE" dirty="0"/>
           </a:p>
@@ -7718,13 +7572,6 @@
   <p:clrMapOvr>
     <a:masterClrMapping/>
   </p:clrMapOvr>
-  <p:timing>
-    <p:tnLst>
-      <p:par>
-        <p:cTn id="1" dur="indefinite" restart="never" nodeType="tmRoot"/>
-      </p:par>
-    </p:tnLst>
-  </p:timing>
 </p:sld>
 </file>
 
@@ -7762,7 +7609,11 @@
           <a:p>
             <a:r>
               <a:rPr lang="de-DE" dirty="0" smtClean="0"/>
-              <a:t>Tätigkeit (24)</a:t>
+              <a:t>Deine Tätigkeit? (Q24</a:t>
+            </a:r>
+            <a:r>
+              <a:rPr lang="de-DE" dirty="0" smtClean="0"/>
+              <a:t>)</a:t>
             </a:r>
             <a:endParaRPr lang="de-DE" dirty="0"/>
           </a:p>
@@ -7932,13 +7783,6 @@
   <p:clrMapOvr>
     <a:masterClrMapping/>
   </p:clrMapOvr>
-  <p:timing>
-    <p:tnLst>
-      <p:par>
-        <p:cTn id="1" dur="indefinite" restart="never" nodeType="tmRoot"/>
-      </p:par>
-    </p:tnLst>
-  </p:timing>
 </p:sld>
 </file>
 
@@ -7976,7 +7820,11 @@
           <a:p>
             <a:r>
               <a:rPr lang="de-DE" dirty="0" smtClean="0"/>
-              <a:t>Wohnort (25)</a:t>
+              <a:t>Dein Wohnort? (Q25</a:t>
+            </a:r>
+            <a:r>
+              <a:rPr lang="de-DE" dirty="0" smtClean="0"/>
+              <a:t>)</a:t>
             </a:r>
             <a:endParaRPr lang="de-DE" dirty="0"/>
           </a:p>
@@ -8130,13 +7978,6 @@
   <p:clrMapOvr>
     <a:masterClrMapping/>
   </p:clrMapOvr>
-  <p:timing>
-    <p:tnLst>
-      <p:par>
-        <p:cTn id="1" dur="indefinite" restart="never" nodeType="tmRoot"/>
-      </p:par>
-    </p:tnLst>
-  </p:timing>
 </p:sld>
 </file>
 
@@ -8338,13 +8179,6 @@
   <p:clrMapOvr>
     <a:masterClrMapping/>
   </p:clrMapOvr>
-  <p:timing>
-    <p:tnLst>
-      <p:par>
-        <p:cTn id="1" dur="indefinite" restart="never" nodeType="tmRoot"/>
-      </p:par>
-    </p:tnLst>
-  </p:timing>
 </p:sld>
 </file>
 
@@ -8434,12 +8268,12 @@
               <a:t>An diesen Tagen sollte mehr als eine vordefinierte Route angeboten werden </a:t>
             </a:r>
             <a:r>
+              <a:rPr lang="de-DE" sz="1600" dirty="0" err="1" smtClean="0"/>
+              <a:t>umd</a:t>
+            </a:r>
+            <a:r>
               <a:rPr lang="de-DE" sz="1600" dirty="0" smtClean="0"/>
-              <a:t>um </a:t>
-            </a:r>
-            <a:r>
-              <a:rPr lang="de-DE" sz="1600" dirty="0" smtClean="0"/>
-              <a:t>Auswahlmöglichkeiten zu bieten.</a:t>
+              <a:t> Auswahlmöglichkeiten zu bieten.</a:t>
             </a:r>
             <a:endParaRPr lang="de-DE" sz="1600" dirty="0"/>
           </a:p>
@@ -8557,13 +8391,6 @@
   <p:clrMapOvr>
     <a:masterClrMapping/>
   </p:clrMapOvr>
-  <p:timing>
-    <p:tnLst>
-      <p:par>
-        <p:cTn id="1" dur="indefinite" restart="never" nodeType="tmRoot"/>
-      </p:par>
-    </p:tnLst>
-  </p:timing>
 </p:sld>
 </file>
 
@@ -8771,13 +8598,6 @@
   <p:clrMapOvr>
     <a:masterClrMapping/>
   </p:clrMapOvr>
-  <p:timing>
-    <p:tnLst>
-      <p:par>
-        <p:cTn id="1" dur="indefinite" restart="never" nodeType="tmRoot"/>
-      </p:par>
-    </p:tnLst>
-  </p:timing>
 </p:sld>
 </file>
 

</xml_diff>

<commit_message>
Analyse von Umfrage I abgeschlossen
</commit_message>
<xml_diff>
--- a/documents/marketing/Marketing Analyse von Umfrage 1 (5.5).pptx
+++ b/documents/marketing/Marketing Analyse von Umfrage 1 (5.5).pptx
@@ -5,7 +5,7 @@
     <p:sldMasterId id="2147483648" r:id="rId1"/>
   </p:sldMasterIdLst>
   <p:notesMasterIdLst>
-    <p:notesMasterId r:id="rId35"/>
+    <p:notesMasterId r:id="rId37"/>
   </p:notesMasterIdLst>
   <p:sldIdLst>
     <p:sldId id="256" r:id="rId2"/>
@@ -30,17 +30,19 @@
     <p:sldId id="300" r:id="rId21"/>
     <p:sldId id="301" r:id="rId22"/>
     <p:sldId id="302" r:id="rId23"/>
-    <p:sldId id="303" r:id="rId24"/>
-    <p:sldId id="304" r:id="rId25"/>
-    <p:sldId id="305" r:id="rId26"/>
-    <p:sldId id="306" r:id="rId27"/>
-    <p:sldId id="307" r:id="rId28"/>
-    <p:sldId id="308" r:id="rId29"/>
-    <p:sldId id="309" r:id="rId30"/>
-    <p:sldId id="319" r:id="rId31"/>
-    <p:sldId id="320" r:id="rId32"/>
-    <p:sldId id="258" r:id="rId33"/>
-    <p:sldId id="284" r:id="rId34"/>
+    <p:sldId id="322" r:id="rId24"/>
+    <p:sldId id="303" r:id="rId25"/>
+    <p:sldId id="304" r:id="rId26"/>
+    <p:sldId id="321" r:id="rId27"/>
+    <p:sldId id="305" r:id="rId28"/>
+    <p:sldId id="306" r:id="rId29"/>
+    <p:sldId id="307" r:id="rId30"/>
+    <p:sldId id="308" r:id="rId31"/>
+    <p:sldId id="309" r:id="rId32"/>
+    <p:sldId id="319" r:id="rId33"/>
+    <p:sldId id="320" r:id="rId34"/>
+    <p:sldId id="258" r:id="rId35"/>
+    <p:sldId id="284" r:id="rId36"/>
   </p:sldIdLst>
   <p:sldSz cx="9144000" cy="6858000" type="screen4x3"/>
   <p:notesSz cx="6858000" cy="9144000"/>
@@ -182,8 +184,10 @@
             <p14:sldId id="300"/>
             <p14:sldId id="301"/>
             <p14:sldId id="302"/>
+            <p14:sldId id="322"/>
             <p14:sldId id="303"/>
             <p14:sldId id="304"/>
+            <p14:sldId id="321"/>
             <p14:sldId id="305"/>
           </p14:sldIdLst>
         </p14:section>
@@ -2338,6 +2342,220 @@
     </mc:Fallback>
   </mc:AlternateContent>
   <c:chart>
+    <c:autoTitleDeleted val="0"/>
+    <c:plotArea>
+      <c:layout/>
+      <c:barChart>
+        <c:barDir val="col"/>
+        <c:grouping val="clustered"/>
+        <c:varyColors val="0"/>
+        <c:ser>
+          <c:idx val="0"/>
+          <c:order val="0"/>
+          <c:tx>
+            <c:strRef>
+              <c:f>'Q14--Q9'!$A$21:$B$21</c:f>
+              <c:strCache>
+                <c:ptCount val="1"/>
+                <c:pt idx="0">
+                  <c:v>Q14 Ja</c:v>
+                </c:pt>
+              </c:strCache>
+            </c:strRef>
+          </c:tx>
+          <c:spPr>
+            <a:solidFill>
+              <a:srgbClr val="00C853"/>
+            </a:solidFill>
+          </c:spPr>
+          <c:invertIfNegative val="0"/>
+          <c:dLbls>
+            <c:showLegendKey val="0"/>
+            <c:showVal val="1"/>
+            <c:showCatName val="0"/>
+            <c:showSerName val="0"/>
+            <c:showPercent val="0"/>
+            <c:showBubbleSize val="0"/>
+            <c:showLeaderLines val="0"/>
+          </c:dLbls>
+          <c:cat>
+            <c:multiLvlStrRef>
+              <c:f>'Q14--Q9'!$C$19:$D$20</c:f>
+              <c:multiLvlStrCache>
+                <c:ptCount val="2"/>
+                <c:lvl>
+                  <c:pt idx="0">
+                    <c:v>Ja</c:v>
+                  </c:pt>
+                  <c:pt idx="1">
+                    <c:v>Nein</c:v>
+                  </c:pt>
+                </c:lvl>
+                <c:lvl>
+                  <c:pt idx="0">
+                    <c:v>Q9</c:v>
+                  </c:pt>
+                </c:lvl>
+              </c:multiLvlStrCache>
+            </c:multiLvlStrRef>
+          </c:cat>
+          <c:val>
+            <c:numRef>
+              <c:f>'Q14--Q9'!$C$21:$D$21</c:f>
+              <c:numCache>
+                <c:formatCode>0.0%</c:formatCode>
+                <c:ptCount val="2"/>
+                <c:pt idx="0">
+                  <c:v>0.8666666666666667</c:v>
+                </c:pt>
+                <c:pt idx="1">
+                  <c:v>0.78395061728395066</c:v>
+                </c:pt>
+              </c:numCache>
+            </c:numRef>
+          </c:val>
+        </c:ser>
+        <c:ser>
+          <c:idx val="1"/>
+          <c:order val="1"/>
+          <c:tx>
+            <c:strRef>
+              <c:f>'Q14--Q9'!$A$22:$B$22</c:f>
+              <c:strCache>
+                <c:ptCount val="1"/>
+                <c:pt idx="0">
+                  <c:v>Q14 Nein</c:v>
+                </c:pt>
+              </c:strCache>
+            </c:strRef>
+          </c:tx>
+          <c:spPr>
+            <a:solidFill>
+              <a:srgbClr val="FF5722"/>
+            </a:solidFill>
+          </c:spPr>
+          <c:invertIfNegative val="0"/>
+          <c:dLbls>
+            <c:showLegendKey val="0"/>
+            <c:showVal val="1"/>
+            <c:showCatName val="0"/>
+            <c:showSerName val="0"/>
+            <c:showPercent val="0"/>
+            <c:showBubbleSize val="0"/>
+            <c:showLeaderLines val="0"/>
+          </c:dLbls>
+          <c:cat>
+            <c:multiLvlStrRef>
+              <c:f>'Q14--Q9'!$C$19:$D$20</c:f>
+              <c:multiLvlStrCache>
+                <c:ptCount val="2"/>
+                <c:lvl>
+                  <c:pt idx="0">
+                    <c:v>Ja</c:v>
+                  </c:pt>
+                  <c:pt idx="1">
+                    <c:v>Nein</c:v>
+                  </c:pt>
+                </c:lvl>
+                <c:lvl>
+                  <c:pt idx="0">
+                    <c:v>Q9</c:v>
+                  </c:pt>
+                </c:lvl>
+              </c:multiLvlStrCache>
+            </c:multiLvlStrRef>
+          </c:cat>
+          <c:val>
+            <c:numRef>
+              <c:f>'Q14--Q9'!$C$22:$D$22</c:f>
+              <c:numCache>
+                <c:formatCode>0.0%</c:formatCode>
+                <c:ptCount val="2"/>
+                <c:pt idx="0">
+                  <c:v>0.13333333333333333</c:v>
+                </c:pt>
+                <c:pt idx="1">
+                  <c:v>0.21604938271604937</c:v>
+                </c:pt>
+              </c:numCache>
+            </c:numRef>
+          </c:val>
+        </c:ser>
+        <c:dLbls>
+          <c:showLegendKey val="0"/>
+          <c:showVal val="0"/>
+          <c:showCatName val="0"/>
+          <c:showSerName val="0"/>
+          <c:showPercent val="0"/>
+          <c:showBubbleSize val="0"/>
+        </c:dLbls>
+        <c:gapWidth val="150"/>
+        <c:axId val="185876864"/>
+        <c:axId val="185907072"/>
+      </c:barChart>
+      <c:catAx>
+        <c:axId val="185876864"/>
+        <c:scaling>
+          <c:orientation val="minMax"/>
+        </c:scaling>
+        <c:delete val="0"/>
+        <c:axPos val="b"/>
+        <c:majorTickMark val="out"/>
+        <c:minorTickMark val="none"/>
+        <c:tickLblPos val="nextTo"/>
+        <c:crossAx val="185907072"/>
+        <c:crosses val="autoZero"/>
+        <c:auto val="1"/>
+        <c:lblAlgn val="ctr"/>
+        <c:lblOffset val="100"/>
+        <c:noMultiLvlLbl val="0"/>
+      </c:catAx>
+      <c:valAx>
+        <c:axId val="185907072"/>
+        <c:scaling>
+          <c:orientation val="minMax"/>
+        </c:scaling>
+        <c:delete val="0"/>
+        <c:axPos val="l"/>
+        <c:majorGridlines/>
+        <c:numFmt formatCode="0.0%" sourceLinked="1"/>
+        <c:majorTickMark val="out"/>
+        <c:minorTickMark val="none"/>
+        <c:tickLblPos val="nextTo"/>
+        <c:crossAx val="185876864"/>
+        <c:crosses val="autoZero"/>
+        <c:crossBetween val="between"/>
+      </c:valAx>
+    </c:plotArea>
+    <c:legend>
+      <c:legendPos val="r"/>
+      <c:layout/>
+      <c:overlay val="0"/>
+    </c:legend>
+    <c:plotVisOnly val="1"/>
+    <c:dispBlanksAs val="gap"/>
+    <c:showDLblsOverMax val="0"/>
+  </c:chart>
+  <c:externalData r:id="rId1">
+    <c:autoUpdate val="0"/>
+  </c:externalData>
+</c:chartSpace>
+</file>
+
+<file path=ppt/charts/chart21.xml><?xml version="1.0" encoding="utf-8"?>
+<c:chartSpace xmlns:c="http://schemas.openxmlformats.org/drawingml/2006/chart" xmlns:a="http://schemas.openxmlformats.org/drawingml/2006/main" xmlns:r="http://schemas.openxmlformats.org/officeDocument/2006/relationships">
+  <c:date1904 val="0"/>
+  <c:lang val="de-DE"/>
+  <c:roundedCorners val="0"/>
+  <mc:AlternateContent xmlns:mc="http://schemas.openxmlformats.org/markup-compatibility/2006">
+    <mc:Choice xmlns:c14="http://schemas.microsoft.com/office/drawing/2007/8/2/chart" Requires="c14">
+      <c14:style val="102"/>
+    </mc:Choice>
+    <mc:Fallback>
+      <c:style val="2"/>
+    </mc:Fallback>
+  </mc:AlternateContent>
+  <c:chart>
     <c:autoTitleDeleted val="1"/>
     <c:plotArea>
       <c:layout/>
@@ -2432,7 +2650,221 @@
 </c:chartSpace>
 </file>
 
-<file path=ppt/charts/chart21.xml><?xml version="1.0" encoding="utf-8"?>
+<file path=ppt/charts/chart22.xml><?xml version="1.0" encoding="utf-8"?>
+<c:chartSpace xmlns:c="http://schemas.openxmlformats.org/drawingml/2006/chart" xmlns:a="http://schemas.openxmlformats.org/drawingml/2006/main" xmlns:r="http://schemas.openxmlformats.org/officeDocument/2006/relationships">
+  <c:date1904 val="0"/>
+  <c:lang val="de-DE"/>
+  <c:roundedCorners val="0"/>
+  <mc:AlternateContent xmlns:mc="http://schemas.openxmlformats.org/markup-compatibility/2006">
+    <mc:Choice xmlns:c14="http://schemas.microsoft.com/office/drawing/2007/8/2/chart" Requires="c14">
+      <c14:style val="102"/>
+    </mc:Choice>
+    <mc:Fallback>
+      <c:style val="2"/>
+    </mc:Fallback>
+  </mc:AlternateContent>
+  <c:chart>
+    <c:autoTitleDeleted val="0"/>
+    <c:plotArea>
+      <c:layout/>
+      <c:barChart>
+        <c:barDir val="col"/>
+        <c:grouping val="clustered"/>
+        <c:varyColors val="0"/>
+        <c:ser>
+          <c:idx val="0"/>
+          <c:order val="0"/>
+          <c:tx>
+            <c:strRef>
+              <c:f>'Q16--Q9'!$A$21:$B$21</c:f>
+              <c:strCache>
+                <c:ptCount val="1"/>
+                <c:pt idx="0">
+                  <c:v>Q16 Ja</c:v>
+                </c:pt>
+              </c:strCache>
+            </c:strRef>
+          </c:tx>
+          <c:spPr>
+            <a:solidFill>
+              <a:srgbClr val="00C853"/>
+            </a:solidFill>
+          </c:spPr>
+          <c:invertIfNegative val="0"/>
+          <c:dLbls>
+            <c:showLegendKey val="0"/>
+            <c:showVal val="1"/>
+            <c:showCatName val="0"/>
+            <c:showSerName val="0"/>
+            <c:showPercent val="0"/>
+            <c:showBubbleSize val="0"/>
+            <c:showLeaderLines val="0"/>
+          </c:dLbls>
+          <c:cat>
+            <c:multiLvlStrRef>
+              <c:f>'Q16--Q9'!$C$19:$D$20</c:f>
+              <c:multiLvlStrCache>
+                <c:ptCount val="2"/>
+                <c:lvl>
+                  <c:pt idx="0">
+                    <c:v>Ja</c:v>
+                  </c:pt>
+                  <c:pt idx="1">
+                    <c:v>Nein</c:v>
+                  </c:pt>
+                </c:lvl>
+                <c:lvl>
+                  <c:pt idx="0">
+                    <c:v>Q9</c:v>
+                  </c:pt>
+                </c:lvl>
+              </c:multiLvlStrCache>
+            </c:multiLvlStrRef>
+          </c:cat>
+          <c:val>
+            <c:numRef>
+              <c:f>'Q16--Q9'!$C$21:$D$21</c:f>
+              <c:numCache>
+                <c:formatCode>0.0%</c:formatCode>
+                <c:ptCount val="2"/>
+                <c:pt idx="0">
+                  <c:v>0.56666666666666665</c:v>
+                </c:pt>
+                <c:pt idx="1">
+                  <c:v>0.27160493827160492</c:v>
+                </c:pt>
+              </c:numCache>
+            </c:numRef>
+          </c:val>
+        </c:ser>
+        <c:ser>
+          <c:idx val="1"/>
+          <c:order val="1"/>
+          <c:tx>
+            <c:strRef>
+              <c:f>'Q16--Q9'!$A$22:$B$22</c:f>
+              <c:strCache>
+                <c:ptCount val="1"/>
+                <c:pt idx="0">
+                  <c:v>Q16 Nein</c:v>
+                </c:pt>
+              </c:strCache>
+            </c:strRef>
+          </c:tx>
+          <c:spPr>
+            <a:solidFill>
+              <a:srgbClr val="FF5722"/>
+            </a:solidFill>
+          </c:spPr>
+          <c:invertIfNegative val="0"/>
+          <c:dLbls>
+            <c:showLegendKey val="0"/>
+            <c:showVal val="1"/>
+            <c:showCatName val="0"/>
+            <c:showSerName val="0"/>
+            <c:showPercent val="0"/>
+            <c:showBubbleSize val="0"/>
+            <c:showLeaderLines val="0"/>
+          </c:dLbls>
+          <c:cat>
+            <c:multiLvlStrRef>
+              <c:f>'Q16--Q9'!$C$19:$D$20</c:f>
+              <c:multiLvlStrCache>
+                <c:ptCount val="2"/>
+                <c:lvl>
+                  <c:pt idx="0">
+                    <c:v>Ja</c:v>
+                  </c:pt>
+                  <c:pt idx="1">
+                    <c:v>Nein</c:v>
+                  </c:pt>
+                </c:lvl>
+                <c:lvl>
+                  <c:pt idx="0">
+                    <c:v>Q9</c:v>
+                  </c:pt>
+                </c:lvl>
+              </c:multiLvlStrCache>
+            </c:multiLvlStrRef>
+          </c:cat>
+          <c:val>
+            <c:numRef>
+              <c:f>'Q16--Q9'!$C$22:$D$22</c:f>
+              <c:numCache>
+                <c:formatCode>0.0%</c:formatCode>
+                <c:ptCount val="2"/>
+                <c:pt idx="0">
+                  <c:v>0.43333333333333335</c:v>
+                </c:pt>
+                <c:pt idx="1">
+                  <c:v>0.72839506172839508</c:v>
+                </c:pt>
+              </c:numCache>
+            </c:numRef>
+          </c:val>
+        </c:ser>
+        <c:dLbls>
+          <c:showLegendKey val="0"/>
+          <c:showVal val="0"/>
+          <c:showCatName val="0"/>
+          <c:showSerName val="0"/>
+          <c:showPercent val="0"/>
+          <c:showBubbleSize val="0"/>
+        </c:dLbls>
+        <c:gapWidth val="150"/>
+        <c:axId val="188693120"/>
+        <c:axId val="188738944"/>
+      </c:barChart>
+      <c:catAx>
+        <c:axId val="188693120"/>
+        <c:scaling>
+          <c:orientation val="minMax"/>
+        </c:scaling>
+        <c:delete val="0"/>
+        <c:axPos val="b"/>
+        <c:majorTickMark val="out"/>
+        <c:minorTickMark val="none"/>
+        <c:tickLblPos val="nextTo"/>
+        <c:crossAx val="188738944"/>
+        <c:crosses val="autoZero"/>
+        <c:auto val="1"/>
+        <c:lblAlgn val="ctr"/>
+        <c:lblOffset val="100"/>
+        <c:noMultiLvlLbl val="0"/>
+      </c:catAx>
+      <c:valAx>
+        <c:axId val="188738944"/>
+        <c:scaling>
+          <c:orientation val="minMax"/>
+        </c:scaling>
+        <c:delete val="0"/>
+        <c:axPos val="l"/>
+        <c:majorGridlines/>
+        <c:numFmt formatCode="0.0%" sourceLinked="1"/>
+        <c:majorTickMark val="out"/>
+        <c:minorTickMark val="none"/>
+        <c:tickLblPos val="nextTo"/>
+        <c:crossAx val="188693120"/>
+        <c:crosses val="autoZero"/>
+        <c:crossBetween val="between"/>
+      </c:valAx>
+    </c:plotArea>
+    <c:legend>
+      <c:legendPos val="r"/>
+      <c:layout/>
+      <c:overlay val="0"/>
+    </c:legend>
+    <c:plotVisOnly val="1"/>
+    <c:dispBlanksAs val="gap"/>
+    <c:showDLblsOverMax val="0"/>
+  </c:chart>
+  <c:externalData r:id="rId1">
+    <c:autoUpdate val="0"/>
+  </c:externalData>
+</c:chartSpace>
+</file>
+
+<file path=ppt/charts/chart23.xml><?xml version="1.0" encoding="utf-8"?>
 <c:chartSpace xmlns:c="http://schemas.openxmlformats.org/drawingml/2006/chart" xmlns:a="http://schemas.openxmlformats.org/drawingml/2006/main" xmlns:r="http://schemas.openxmlformats.org/officeDocument/2006/relationships">
   <c:date1904 val="0"/>
   <c:lang val="de-DE"/>
@@ -2598,7 +3030,7 @@
 </c:chartSpace>
 </file>
 
-<file path=ppt/charts/chart22.xml><?xml version="1.0" encoding="utf-8"?>
+<file path=ppt/charts/chart24.xml><?xml version="1.0" encoding="utf-8"?>
 <c:chartSpace xmlns:c="http://schemas.openxmlformats.org/drawingml/2006/chart" xmlns:a="http://schemas.openxmlformats.org/drawingml/2006/main" xmlns:r="http://schemas.openxmlformats.org/officeDocument/2006/relationships">
   <c:date1904 val="0"/>
   <c:lang val="de-DE"/>
@@ -2776,7 +3208,7 @@
 </c:chartSpace>
 </file>
 
-<file path=ppt/charts/chart23.xml><?xml version="1.0" encoding="utf-8"?>
+<file path=ppt/charts/chart25.xml><?xml version="1.0" encoding="utf-8"?>
 <c:chartSpace xmlns:c="http://schemas.openxmlformats.org/drawingml/2006/chart" xmlns:a="http://schemas.openxmlformats.org/drawingml/2006/main" xmlns:r="http://schemas.openxmlformats.org/officeDocument/2006/relationships">
   <c:date1904 val="0"/>
   <c:lang val="de-DE"/>
@@ -18130,18 +18562,11 @@
               <a:t>4. Route </a:t>
             </a:r>
             <a:r>
-              <a:rPr lang="de-DE" sz="2000" dirty="0">
-                <a:latin typeface="Arial" panose="020B0604020202020204" pitchFamily="34" charset="0"/>
-                <a:cs typeface="Arial" panose="020B0604020202020204" pitchFamily="34" charset="0"/>
-              </a:rPr>
-              <a:t>– Funktion: Vordefinierte </a:t>
-            </a:r>
-            <a:r>
               <a:rPr lang="de-DE" sz="2000" dirty="0" smtClean="0">
                 <a:latin typeface="Arial" panose="020B0604020202020204" pitchFamily="34" charset="0"/>
                 <a:cs typeface="Arial" panose="020B0604020202020204" pitchFamily="34" charset="0"/>
               </a:rPr>
-              <a:t>Route</a:t>
+              <a:t>– Funktion: Vordefinierte Route</a:t>
             </a:r>
             <a:endParaRPr lang="de-DE" sz="2000" dirty="0">
               <a:latin typeface="Arial" panose="020B0604020202020204" pitchFamily="34" charset="0"/>
@@ -18179,72 +18604,110 @@
           <a:p>
             <a:pPr marL="720725" indent="-274638"/>
             <a:r>
-              <a:rPr lang="de-DE" sz="1600" dirty="0">
-                <a:latin typeface="Arial" panose="020B0604020202020204" pitchFamily="34" charset="0"/>
-                <a:cs typeface="Arial" panose="020B0604020202020204" pitchFamily="34" charset="0"/>
-              </a:rPr>
-              <a:t>Häufige </a:t>
-            </a:r>
-            <a:r>
-              <a:rPr lang="de-DE" sz="1600" dirty="0" smtClean="0">
-                <a:latin typeface="Arial" panose="020B0604020202020204" pitchFamily="34" charset="0"/>
-                <a:cs typeface="Arial" panose="020B0604020202020204" pitchFamily="34" charset="0"/>
-              </a:rPr>
-              <a:t>Gründe für das nicht Nutzen wollen einer vordefinierten Route sind die </a:t>
-            </a:r>
-            <a:r>
-              <a:rPr lang="de-DE" sz="1600" b="1" dirty="0">
-                <a:latin typeface="Arial" panose="020B0604020202020204" pitchFamily="34" charset="0"/>
-                <a:cs typeface="Arial" panose="020B0604020202020204" pitchFamily="34" charset="0"/>
-              </a:rPr>
-              <a:t>fehlende Spontanität </a:t>
-            </a:r>
-            <a:r>
-              <a:rPr lang="de-DE" sz="1600" dirty="0">
-                <a:latin typeface="Arial" panose="020B0604020202020204" pitchFamily="34" charset="0"/>
-                <a:cs typeface="Arial" panose="020B0604020202020204" pitchFamily="34" charset="0"/>
-              </a:rPr>
-              <a:t>und der </a:t>
-            </a:r>
-            <a:r>
-              <a:rPr lang="de-DE" sz="1600" b="1" dirty="0">
-                <a:latin typeface="Arial" panose="020B0604020202020204" pitchFamily="34" charset="0"/>
-                <a:cs typeface="Arial" panose="020B0604020202020204" pitchFamily="34" charset="0"/>
-              </a:rPr>
-              <a:t>erhöhte Aufwand</a:t>
-            </a:r>
-            <a:r>
-              <a:rPr lang="de-DE" sz="1600" dirty="0" smtClean="0">
-                <a:latin typeface="Arial" panose="020B0604020202020204" pitchFamily="34" charset="0"/>
-                <a:cs typeface="Arial" panose="020B0604020202020204" pitchFamily="34" charset="0"/>
-              </a:rPr>
-              <a:t>.</a:t>
+              <a:rPr lang="de-DE" sz="1530" b="1" dirty="0" smtClean="0">
+                <a:latin typeface="Arial" panose="020B0604020202020204" pitchFamily="34" charset="0"/>
+                <a:cs typeface="Arial" panose="020B0604020202020204" pitchFamily="34" charset="0"/>
+              </a:rPr>
+              <a:t>86,7%</a:t>
+            </a:r>
+            <a:r>
+              <a:rPr lang="de-DE" sz="1530" dirty="0" smtClean="0">
+                <a:latin typeface="Arial" panose="020B0604020202020204" pitchFamily="34" charset="0"/>
+                <a:cs typeface="Arial" panose="020B0604020202020204" pitchFamily="34" charset="0"/>
+              </a:rPr>
+              <a:t> </a:t>
+            </a:r>
+            <a:r>
+              <a:rPr lang="de-DE" sz="1530" dirty="0">
+                <a:latin typeface="Arial" panose="020B0604020202020204" pitchFamily="34" charset="0"/>
+                <a:cs typeface="Arial" panose="020B0604020202020204" pitchFamily="34" charset="0"/>
+              </a:rPr>
+              <a:t>der Befragten die angegeben haben mehr als eine Happy Hour pro Abend zu </a:t>
+            </a:r>
+            <a:r>
+              <a:rPr lang="de-DE" sz="1530" dirty="0" smtClean="0">
+                <a:latin typeface="Arial" panose="020B0604020202020204" pitchFamily="34" charset="0"/>
+                <a:cs typeface="Arial" panose="020B0604020202020204" pitchFamily="34" charset="0"/>
+              </a:rPr>
+              <a:t>besuchen, </a:t>
+            </a:r>
+            <a:r>
+              <a:rPr lang="de-DE" sz="1530" dirty="0">
+                <a:latin typeface="Arial" panose="020B0604020202020204" pitchFamily="34" charset="0"/>
+                <a:cs typeface="Arial" panose="020B0604020202020204" pitchFamily="34" charset="0"/>
+              </a:rPr>
+              <a:t>würden </a:t>
+            </a:r>
+            <a:r>
+              <a:rPr lang="de-DE" sz="1530" dirty="0" smtClean="0">
+                <a:latin typeface="Arial" panose="020B0604020202020204" pitchFamily="34" charset="0"/>
+                <a:cs typeface="Arial" panose="020B0604020202020204" pitchFamily="34" charset="0"/>
+              </a:rPr>
+              <a:t>eine vordefinierte Happy Hour Route nutzen.</a:t>
             </a:r>
           </a:p>
           <a:p>
             <a:pPr marL="720725" indent="-274638"/>
             <a:r>
-              <a:rPr lang="de-DE" sz="1600" u="sng" dirty="0" smtClean="0">
-                <a:latin typeface="Arial" panose="020B0604020202020204" pitchFamily="34" charset="0"/>
-                <a:cs typeface="Arial" panose="020B0604020202020204" pitchFamily="34" charset="0"/>
-              </a:rPr>
-              <a:t>Schlussfolgerung:</a:t>
-            </a:r>
-            <a:r>
-              <a:rPr lang="de-DE" sz="1600" dirty="0" smtClean="0">
-                <a:latin typeface="Arial" panose="020B0604020202020204" pitchFamily="34" charset="0"/>
-                <a:cs typeface="Arial" panose="020B0604020202020204" pitchFamily="34" charset="0"/>
-              </a:rPr>
-              <a:t> Zu mindestens der zweite Punkt kann durch eine einfache Bedienung der Web-App vermieden werden.</a:t>
-            </a:r>
-            <a:endParaRPr lang="de-DE" sz="1600" dirty="0">
-              <a:latin typeface="Arial" panose="020B0604020202020204" pitchFamily="34" charset="0"/>
-              <a:cs typeface="Arial" panose="020B0604020202020204" pitchFamily="34" charset="0"/>
-            </a:endParaRPr>
+              <a:rPr lang="de-DE" sz="1530" dirty="0" smtClean="0">
+                <a:latin typeface="Arial" panose="020B0604020202020204" pitchFamily="34" charset="0"/>
+                <a:cs typeface="Arial" panose="020B0604020202020204" pitchFamily="34" charset="0"/>
+              </a:rPr>
+              <a:t>Immerhin noch </a:t>
+            </a:r>
+            <a:r>
+              <a:rPr lang="de-DE" sz="1530" b="1" dirty="0" smtClean="0">
+                <a:latin typeface="Arial" panose="020B0604020202020204" pitchFamily="34" charset="0"/>
+                <a:cs typeface="Arial" panose="020B0604020202020204" pitchFamily="34" charset="0"/>
+              </a:rPr>
+              <a:t>78,4% </a:t>
+            </a:r>
+            <a:r>
+              <a:rPr lang="de-DE" sz="1530" dirty="0" smtClean="0">
+                <a:latin typeface="Arial" panose="020B0604020202020204" pitchFamily="34" charset="0"/>
+                <a:cs typeface="Arial" panose="020B0604020202020204" pitchFamily="34" charset="0"/>
+              </a:rPr>
+              <a:t>der Befragten </a:t>
+            </a:r>
+            <a:r>
+              <a:rPr lang="de-DE" sz="1530" dirty="0">
+                <a:latin typeface="Arial" panose="020B0604020202020204" pitchFamily="34" charset="0"/>
+                <a:cs typeface="Arial" panose="020B0604020202020204" pitchFamily="34" charset="0"/>
+              </a:rPr>
+              <a:t>die angegeben haben </a:t>
+            </a:r>
+            <a:r>
+              <a:rPr lang="de-DE" sz="1530" dirty="0" smtClean="0">
+                <a:latin typeface="Arial" panose="020B0604020202020204" pitchFamily="34" charset="0"/>
+                <a:cs typeface="Arial" panose="020B0604020202020204" pitchFamily="34" charset="0"/>
+              </a:rPr>
+              <a:t>nicht mehr </a:t>
+            </a:r>
+            <a:r>
+              <a:rPr lang="de-DE" sz="1530" dirty="0">
+                <a:latin typeface="Arial" panose="020B0604020202020204" pitchFamily="34" charset="0"/>
+                <a:cs typeface="Arial" panose="020B0604020202020204" pitchFamily="34" charset="0"/>
+              </a:rPr>
+              <a:t>als eine Happy Hour pro Abend zu </a:t>
+            </a:r>
+            <a:r>
+              <a:rPr lang="de-DE" sz="1530" dirty="0" smtClean="0">
+                <a:latin typeface="Arial" panose="020B0604020202020204" pitchFamily="34" charset="0"/>
+                <a:cs typeface="Arial" panose="020B0604020202020204" pitchFamily="34" charset="0"/>
+              </a:rPr>
+              <a:t>besuchen, </a:t>
+            </a:r>
+            <a:r>
+              <a:rPr lang="de-DE" sz="1530" dirty="0">
+                <a:latin typeface="Arial" panose="020B0604020202020204" pitchFamily="34" charset="0"/>
+                <a:cs typeface="Arial" panose="020B0604020202020204" pitchFamily="34" charset="0"/>
+              </a:rPr>
+              <a:t>würden eine vordefinierte Happy Hour Route nutzen.</a:t>
+            </a:r>
           </a:p>
           <a:p>
             <a:pPr marL="720725" indent="-274638"/>
-            <a:endParaRPr lang="de-DE" sz="1600" dirty="0">
+            <a:endParaRPr lang="de-DE" sz="1530" dirty="0">
               <a:latin typeface="Arial" panose="020B0604020202020204" pitchFamily="34" charset="0"/>
               <a:cs typeface="Arial" panose="020B0604020202020204" pitchFamily="34" charset="0"/>
             </a:endParaRPr>
@@ -18523,6 +18986,627 @@
                 <a:latin typeface="Arial" panose="020B0604020202020204" pitchFamily="34" charset="0"/>
                 <a:cs typeface="Arial" panose="020B0604020202020204" pitchFamily="34" charset="0"/>
               </a:rPr>
+              <a:t>Q14 </a:t>
+            </a:r>
+            <a:r>
+              <a:rPr lang="de-DE" sz="1600" dirty="0">
+                <a:latin typeface="Arial" panose="020B0604020202020204" pitchFamily="34" charset="0"/>
+                <a:cs typeface="Arial" panose="020B0604020202020204" pitchFamily="34" charset="0"/>
+              </a:rPr>
+              <a:t>– Würdest du eine vordefinierte Happy Hour Route nutzen</a:t>
+            </a:r>
+            <a:r>
+              <a:rPr lang="de-DE" sz="1600" dirty="0" smtClean="0">
+                <a:latin typeface="Arial" panose="020B0604020202020204" pitchFamily="34" charset="0"/>
+                <a:cs typeface="Arial" panose="020B0604020202020204" pitchFamily="34" charset="0"/>
+              </a:rPr>
+              <a:t>? </a:t>
+            </a:r>
+            <a:r>
+              <a:rPr lang="de-DE" sz="1600" dirty="0">
+                <a:latin typeface="Arial" panose="020B0604020202020204" pitchFamily="34" charset="0"/>
+                <a:cs typeface="Arial" panose="020B0604020202020204" pitchFamily="34" charset="0"/>
+              </a:rPr>
+              <a:t>* </a:t>
+            </a:r>
+            <a:r>
+              <a:rPr lang="de-DE" sz="1600" b="1" dirty="0">
+                <a:latin typeface="Arial" panose="020B0604020202020204" pitchFamily="34" charset="0"/>
+                <a:cs typeface="Arial" panose="020B0604020202020204" pitchFamily="34" charset="0"/>
+              </a:rPr>
+              <a:t>Q9</a:t>
+            </a:r>
+            <a:r>
+              <a:rPr lang="de-DE" sz="1600" dirty="0">
+                <a:latin typeface="Arial" panose="020B0604020202020204" pitchFamily="34" charset="0"/>
+                <a:cs typeface="Arial" panose="020B0604020202020204" pitchFamily="34" charset="0"/>
+              </a:rPr>
+              <a:t> – Besuchst du mehr als eine Happy Hour pro Abend? </a:t>
+            </a:r>
+            <a:r>
+              <a:rPr lang="de-DE" sz="900" dirty="0">
+                <a:latin typeface="Arial" panose="020B0604020202020204" pitchFamily="34" charset="0"/>
+                <a:cs typeface="Arial" panose="020B0604020202020204" pitchFamily="34" charset="0"/>
+              </a:rPr>
+              <a:t>(Kreuztabelle)</a:t>
+            </a:r>
+            <a:endParaRPr lang="de-DE" sz="1600" dirty="0">
+              <a:latin typeface="Arial" panose="020B0604020202020204" pitchFamily="34" charset="0"/>
+              <a:cs typeface="Arial" panose="020B0604020202020204" pitchFamily="34" charset="0"/>
+            </a:endParaRPr>
+          </a:p>
+        </p:txBody>
+      </p:sp>
+      <p:sp>
+        <p:nvSpPr>
+          <p:cNvPr id="11" name="Rechteck 10"/>
+          <p:cNvSpPr/>
+          <p:nvPr/>
+        </p:nvSpPr>
+        <p:spPr>
+          <a:xfrm>
+            <a:off x="7791028" y="3246884"/>
+            <a:ext cx="811039" cy="351457"/>
+          </a:xfrm>
+          <a:prstGeom prst="rect">
+            <a:avLst/>
+          </a:prstGeom>
+          <a:noFill/>
+          <a:ln w="12700">
+            <a:solidFill>
+              <a:srgbClr val="3F51B5"/>
+            </a:solidFill>
+          </a:ln>
+        </p:spPr>
+        <p:style>
+          <a:lnRef idx="2">
+            <a:schemeClr val="accent1">
+              <a:shade val="50000"/>
+            </a:schemeClr>
+          </a:lnRef>
+          <a:fillRef idx="1">
+            <a:schemeClr val="accent1"/>
+          </a:fillRef>
+          <a:effectRef idx="0">
+            <a:schemeClr val="accent1"/>
+          </a:effectRef>
+          <a:fontRef idx="minor">
+            <a:schemeClr val="lt1"/>
+          </a:fontRef>
+        </p:style>
+        <p:txBody>
+          <a:bodyPr rtlCol="0" anchor="ctr"/>
+          <a:lstStyle/>
+          <a:p>
+            <a:pPr algn="ctr"/>
+            <a:r>
+              <a:rPr lang="de-DE" sz="1400" dirty="0" smtClean="0">
+                <a:solidFill>
+                  <a:schemeClr val="tx1"/>
+                </a:solidFill>
+                <a:latin typeface="Arial" panose="020B0604020202020204" pitchFamily="34" charset="0"/>
+                <a:cs typeface="Arial" panose="020B0604020202020204" pitchFamily="34" charset="0"/>
+              </a:rPr>
+              <a:t>N = 192</a:t>
+            </a:r>
+            <a:endParaRPr lang="de-DE" sz="1400" dirty="0">
+              <a:solidFill>
+                <a:schemeClr val="tx1"/>
+              </a:solidFill>
+              <a:latin typeface="Arial" panose="020B0604020202020204" pitchFamily="34" charset="0"/>
+              <a:cs typeface="Arial" panose="020B0604020202020204" pitchFamily="34" charset="0"/>
+            </a:endParaRPr>
+          </a:p>
+        </p:txBody>
+      </p:sp>
+      <p:sp>
+        <p:nvSpPr>
+          <p:cNvPr id="7" name="Foliennummernplatzhalter 6"/>
+          <p:cNvSpPr>
+            <a:spLocks noGrp="1"/>
+          </p:cNvSpPr>
+          <p:nvPr>
+            <p:ph type="sldNum" sz="quarter" idx="12"/>
+          </p:nvPr>
+        </p:nvSpPr>
+        <p:spPr/>
+        <p:txBody>
+          <a:bodyPr/>
+          <a:lstStyle/>
+          <a:p>
+            <a:fld id="{6C6AE60A-B69C-4790-82F7-3882EDF23186}" type="slidenum">
+              <a:rPr lang="de-DE" smtClean="0"/>
+              <a:t>23</a:t>
+            </a:fld>
+            <a:endParaRPr lang="de-DE"/>
+          </a:p>
+        </p:txBody>
+      </p:sp>
+      <p:graphicFrame>
+        <p:nvGraphicFramePr>
+          <p:cNvPr id="12" name="Diagramm 11"/>
+          <p:cNvGraphicFramePr>
+            <a:graphicFrameLocks/>
+          </p:cNvGraphicFramePr>
+          <p:nvPr>
+            <p:extLst>
+              <p:ext uri="{D42A27DB-BD31-4B8C-83A1-F6EECF244321}">
+                <p14:modId xmlns:p14="http://schemas.microsoft.com/office/powerpoint/2010/main" val="4191987353"/>
+              </p:ext>
+            </p:extLst>
+          </p:nvPr>
+        </p:nvGraphicFramePr>
+        <p:xfrm>
+          <a:off x="1331640" y="1635150"/>
+          <a:ext cx="6459388" cy="3450034"/>
+        </p:xfrm>
+        <a:graphic>
+          <a:graphicData uri="http://schemas.openxmlformats.org/drawingml/2006/chart">
+            <c:chart xmlns:c="http://schemas.openxmlformats.org/drawingml/2006/chart" xmlns:r="http://schemas.openxmlformats.org/officeDocument/2006/relationships" r:id="rId2"/>
+          </a:graphicData>
+        </a:graphic>
+      </p:graphicFrame>
+    </p:spTree>
+    <p:extLst>
+      <p:ext uri="{BB962C8B-B14F-4D97-AF65-F5344CB8AC3E}">
+        <p14:creationId xmlns:p14="http://schemas.microsoft.com/office/powerpoint/2010/main" val="3465976006"/>
+      </p:ext>
+    </p:extLst>
+  </p:cSld>
+  <p:clrMapOvr>
+    <a:masterClrMapping/>
+  </p:clrMapOvr>
+  <p:timing>
+    <p:tnLst>
+      <p:par>
+        <p:cTn id="1" dur="indefinite" restart="never" nodeType="tmRoot"/>
+      </p:par>
+    </p:tnLst>
+  </p:timing>
+</p:sld>
+</file>
+
+<file path=ppt/slides/slide24.xml><?xml version="1.0" encoding="utf-8"?>
+<p:sld xmlns:a="http://schemas.openxmlformats.org/drawingml/2006/main" xmlns:r="http://schemas.openxmlformats.org/officeDocument/2006/relationships" xmlns:p="http://schemas.openxmlformats.org/presentationml/2006/main">
+  <p:cSld>
+    <p:spTree>
+      <p:nvGrpSpPr>
+        <p:cNvPr id="1" name=""/>
+        <p:cNvGrpSpPr/>
+        <p:nvPr/>
+      </p:nvGrpSpPr>
+      <p:grpSpPr>
+        <a:xfrm>
+          <a:off x="0" y="0"/>
+          <a:ext cx="0" cy="0"/>
+          <a:chOff x="0" y="0"/>
+          <a:chExt cx="0" cy="0"/>
+        </a:xfrm>
+      </p:grpSpPr>
+      <p:sp>
+        <p:nvSpPr>
+          <p:cNvPr id="2" name="Titel 1"/>
+          <p:cNvSpPr>
+            <a:spLocks noGrp="1"/>
+          </p:cNvSpPr>
+          <p:nvPr>
+            <p:ph type="title"/>
+          </p:nvPr>
+        </p:nvSpPr>
+        <p:spPr>
+          <a:xfrm>
+            <a:off x="457200" y="274638"/>
+            <a:ext cx="8229600" cy="634082"/>
+          </a:xfrm>
+        </p:spPr>
+        <p:txBody>
+          <a:bodyPr>
+            <a:normAutofit/>
+          </a:bodyPr>
+          <a:lstStyle/>
+          <a:p>
+            <a:pPr algn="l"/>
+            <a:r>
+              <a:rPr lang="de-DE" sz="2000" b="1" dirty="0" smtClean="0">
+                <a:latin typeface="Arial" panose="020B0604020202020204" pitchFamily="34" charset="0"/>
+                <a:cs typeface="Arial" panose="020B0604020202020204" pitchFamily="34" charset="0"/>
+              </a:rPr>
+              <a:t>4. Route </a:t>
+            </a:r>
+            <a:r>
+              <a:rPr lang="de-DE" sz="2000" dirty="0">
+                <a:latin typeface="Arial" panose="020B0604020202020204" pitchFamily="34" charset="0"/>
+                <a:cs typeface="Arial" panose="020B0604020202020204" pitchFamily="34" charset="0"/>
+              </a:rPr>
+              <a:t>– Funktion: Vordefinierte </a:t>
+            </a:r>
+            <a:r>
+              <a:rPr lang="de-DE" sz="2000" dirty="0" smtClean="0">
+                <a:latin typeface="Arial" panose="020B0604020202020204" pitchFamily="34" charset="0"/>
+                <a:cs typeface="Arial" panose="020B0604020202020204" pitchFamily="34" charset="0"/>
+              </a:rPr>
+              <a:t>Route</a:t>
+            </a:r>
+            <a:endParaRPr lang="de-DE" sz="2000" dirty="0">
+              <a:latin typeface="Arial" panose="020B0604020202020204" pitchFamily="34" charset="0"/>
+              <a:cs typeface="Arial" panose="020B0604020202020204" pitchFamily="34" charset="0"/>
+            </a:endParaRPr>
+          </a:p>
+        </p:txBody>
+      </p:sp>
+      <p:sp>
+        <p:nvSpPr>
+          <p:cNvPr id="3" name="Inhaltsplatzhalter 2"/>
+          <p:cNvSpPr>
+            <a:spLocks noGrp="1"/>
+          </p:cNvSpPr>
+          <p:nvPr>
+            <p:ph idx="1"/>
+          </p:nvPr>
+        </p:nvSpPr>
+        <p:spPr>
+          <a:xfrm>
+            <a:off x="457200" y="5197202"/>
+            <a:ext cx="8229600" cy="1224136"/>
+          </a:xfrm>
+          <a:ln w="12700">
+            <a:solidFill>
+              <a:srgbClr val="3F51B5"/>
+            </a:solidFill>
+          </a:ln>
+        </p:spPr>
+        <p:txBody>
+          <a:bodyPr>
+            <a:noAutofit/>
+          </a:bodyPr>
+          <a:lstStyle/>
+          <a:p>
+            <a:pPr marL="720725" indent="-274638"/>
+            <a:r>
+              <a:rPr lang="de-DE" sz="1600" dirty="0">
+                <a:latin typeface="Arial" panose="020B0604020202020204" pitchFamily="34" charset="0"/>
+                <a:cs typeface="Arial" panose="020B0604020202020204" pitchFamily="34" charset="0"/>
+              </a:rPr>
+              <a:t>Häufige </a:t>
+            </a:r>
+            <a:r>
+              <a:rPr lang="de-DE" sz="1600" dirty="0" smtClean="0">
+                <a:latin typeface="Arial" panose="020B0604020202020204" pitchFamily="34" charset="0"/>
+                <a:cs typeface="Arial" panose="020B0604020202020204" pitchFamily="34" charset="0"/>
+              </a:rPr>
+              <a:t>Gründe für das nicht Nutzen wollen einer vordefinierten Route sind die </a:t>
+            </a:r>
+            <a:r>
+              <a:rPr lang="de-DE" sz="1600" b="1" dirty="0">
+                <a:latin typeface="Arial" panose="020B0604020202020204" pitchFamily="34" charset="0"/>
+                <a:cs typeface="Arial" panose="020B0604020202020204" pitchFamily="34" charset="0"/>
+              </a:rPr>
+              <a:t>fehlende Spontanität </a:t>
+            </a:r>
+            <a:r>
+              <a:rPr lang="de-DE" sz="1600" dirty="0">
+                <a:latin typeface="Arial" panose="020B0604020202020204" pitchFamily="34" charset="0"/>
+                <a:cs typeface="Arial" panose="020B0604020202020204" pitchFamily="34" charset="0"/>
+              </a:rPr>
+              <a:t>und der </a:t>
+            </a:r>
+            <a:r>
+              <a:rPr lang="de-DE" sz="1600" b="1" dirty="0">
+                <a:latin typeface="Arial" panose="020B0604020202020204" pitchFamily="34" charset="0"/>
+                <a:cs typeface="Arial" panose="020B0604020202020204" pitchFamily="34" charset="0"/>
+              </a:rPr>
+              <a:t>erhöhte Aufwand</a:t>
+            </a:r>
+            <a:r>
+              <a:rPr lang="de-DE" sz="1600" dirty="0" smtClean="0">
+                <a:latin typeface="Arial" panose="020B0604020202020204" pitchFamily="34" charset="0"/>
+                <a:cs typeface="Arial" panose="020B0604020202020204" pitchFamily="34" charset="0"/>
+              </a:rPr>
+              <a:t>.</a:t>
+            </a:r>
+          </a:p>
+          <a:p>
+            <a:pPr marL="720725" indent="-274638"/>
+            <a:r>
+              <a:rPr lang="de-DE" sz="1600" u="sng" dirty="0" smtClean="0">
+                <a:latin typeface="Arial" panose="020B0604020202020204" pitchFamily="34" charset="0"/>
+                <a:cs typeface="Arial" panose="020B0604020202020204" pitchFamily="34" charset="0"/>
+              </a:rPr>
+              <a:t>Schlussfolgerung:</a:t>
+            </a:r>
+            <a:r>
+              <a:rPr lang="de-DE" sz="1600" dirty="0" smtClean="0">
+                <a:latin typeface="Arial" panose="020B0604020202020204" pitchFamily="34" charset="0"/>
+                <a:cs typeface="Arial" panose="020B0604020202020204" pitchFamily="34" charset="0"/>
+              </a:rPr>
+              <a:t> Zu mindestens der zweite Punkt kann durch eine einfache Bedienung der Web-App vermieden werden.</a:t>
+            </a:r>
+            <a:endParaRPr lang="de-DE" sz="1600" dirty="0">
+              <a:latin typeface="Arial" panose="020B0604020202020204" pitchFamily="34" charset="0"/>
+              <a:cs typeface="Arial" panose="020B0604020202020204" pitchFamily="34" charset="0"/>
+            </a:endParaRPr>
+          </a:p>
+          <a:p>
+            <a:pPr marL="720725" indent="-274638"/>
+            <a:endParaRPr lang="de-DE" sz="1600" dirty="0">
+              <a:latin typeface="Arial" panose="020B0604020202020204" pitchFamily="34" charset="0"/>
+              <a:cs typeface="Arial" panose="020B0604020202020204" pitchFamily="34" charset="0"/>
+            </a:endParaRPr>
+          </a:p>
+        </p:txBody>
+      </p:sp>
+      <p:sp>
+        <p:nvSpPr>
+          <p:cNvPr id="4" name="Gleichschenkliges Dreieck 3"/>
+          <p:cNvSpPr/>
+          <p:nvPr/>
+        </p:nvSpPr>
+        <p:spPr>
+          <a:xfrm rot="5400000">
+            <a:off x="118401" y="5555077"/>
+            <a:ext cx="1188000" cy="504000"/>
+          </a:xfrm>
+          <a:prstGeom prst="triangle">
+            <a:avLst/>
+          </a:prstGeom>
+          <a:solidFill>
+            <a:srgbClr val="3F51B5"/>
+          </a:solidFill>
+          <a:ln>
+            <a:solidFill>
+              <a:srgbClr val="3F51B5"/>
+            </a:solidFill>
+          </a:ln>
+        </p:spPr>
+        <p:style>
+          <a:lnRef idx="2">
+            <a:schemeClr val="accent1">
+              <a:shade val="50000"/>
+            </a:schemeClr>
+          </a:lnRef>
+          <a:fillRef idx="1">
+            <a:schemeClr val="accent1"/>
+          </a:fillRef>
+          <a:effectRef idx="0">
+            <a:schemeClr val="accent1"/>
+          </a:effectRef>
+          <a:fontRef idx="minor">
+            <a:schemeClr val="lt1"/>
+          </a:fontRef>
+        </p:style>
+        <p:txBody>
+          <a:bodyPr rtlCol="0" anchor="ctr"/>
+          <a:lstStyle/>
+          <a:p>
+            <a:pPr algn="ctr"/>
+            <a:endParaRPr lang="de-DE">
+              <a:latin typeface="Arial" panose="020B0604020202020204" pitchFamily="34" charset="0"/>
+              <a:cs typeface="Arial" panose="020B0604020202020204" pitchFamily="34" charset="0"/>
+            </a:endParaRPr>
+          </a:p>
+        </p:txBody>
+      </p:sp>
+      <p:sp>
+        <p:nvSpPr>
+          <p:cNvPr id="6" name="Inhaltsplatzhalter 2"/>
+          <p:cNvSpPr txBox="1">
+            <a:spLocks/>
+          </p:cNvSpPr>
+          <p:nvPr/>
+        </p:nvSpPr>
+        <p:spPr>
+          <a:xfrm>
+            <a:off x="457200" y="1124744"/>
+            <a:ext cx="8229600" cy="3960440"/>
+          </a:xfrm>
+          <a:prstGeom prst="rect">
+            <a:avLst/>
+          </a:prstGeom>
+          <a:ln w="12700">
+            <a:solidFill>
+              <a:srgbClr val="3F51B5"/>
+            </a:solidFill>
+          </a:ln>
+        </p:spPr>
+        <p:txBody>
+          <a:bodyPr vert="horz" lIns="91440" tIns="45720" rIns="91440" bIns="45720" rtlCol="0">
+            <a:normAutofit/>
+          </a:bodyPr>
+          <a:lstStyle>
+            <a:lvl1pPr marL="342900" indent="-342900" algn="l" defTabSz="914400" rtl="0" eaLnBrk="1" latinLnBrk="0" hangingPunct="1">
+              <a:spcBef>
+                <a:spcPct val="20000"/>
+              </a:spcBef>
+              <a:buFont typeface="Arial" pitchFamily="34" charset="0"/>
+              <a:buChar char="•"/>
+              <a:defRPr sz="3200" kern="1200">
+                <a:solidFill>
+                  <a:schemeClr val="tx1"/>
+                </a:solidFill>
+                <a:latin typeface="+mn-lt"/>
+                <a:ea typeface="+mn-ea"/>
+                <a:cs typeface="+mn-cs"/>
+              </a:defRPr>
+            </a:lvl1pPr>
+            <a:lvl2pPr marL="742950" indent="-285750" algn="l" defTabSz="914400" rtl="0" eaLnBrk="1" latinLnBrk="0" hangingPunct="1">
+              <a:spcBef>
+                <a:spcPct val="20000"/>
+              </a:spcBef>
+              <a:buFont typeface="Arial" pitchFamily="34" charset="0"/>
+              <a:buChar char="–"/>
+              <a:defRPr sz="2800" kern="1200">
+                <a:solidFill>
+                  <a:schemeClr val="tx1"/>
+                </a:solidFill>
+                <a:latin typeface="+mn-lt"/>
+                <a:ea typeface="+mn-ea"/>
+                <a:cs typeface="+mn-cs"/>
+              </a:defRPr>
+            </a:lvl2pPr>
+            <a:lvl3pPr marL="1143000" indent="-228600" algn="l" defTabSz="914400" rtl="0" eaLnBrk="1" latinLnBrk="0" hangingPunct="1">
+              <a:spcBef>
+                <a:spcPct val="20000"/>
+              </a:spcBef>
+              <a:buFont typeface="Arial" pitchFamily="34" charset="0"/>
+              <a:buChar char="•"/>
+              <a:defRPr sz="2400" kern="1200">
+                <a:solidFill>
+                  <a:schemeClr val="tx1"/>
+                </a:solidFill>
+                <a:latin typeface="+mn-lt"/>
+                <a:ea typeface="+mn-ea"/>
+                <a:cs typeface="+mn-cs"/>
+              </a:defRPr>
+            </a:lvl3pPr>
+            <a:lvl4pPr marL="1600200" indent="-228600" algn="l" defTabSz="914400" rtl="0" eaLnBrk="1" latinLnBrk="0" hangingPunct="1">
+              <a:spcBef>
+                <a:spcPct val="20000"/>
+              </a:spcBef>
+              <a:buFont typeface="Arial" pitchFamily="34" charset="0"/>
+              <a:buChar char="–"/>
+              <a:defRPr sz="2000" kern="1200">
+                <a:solidFill>
+                  <a:schemeClr val="tx1"/>
+                </a:solidFill>
+                <a:latin typeface="+mn-lt"/>
+                <a:ea typeface="+mn-ea"/>
+                <a:cs typeface="+mn-cs"/>
+              </a:defRPr>
+            </a:lvl4pPr>
+            <a:lvl5pPr marL="2057400" indent="-228600" algn="l" defTabSz="914400" rtl="0" eaLnBrk="1" latinLnBrk="0" hangingPunct="1">
+              <a:spcBef>
+                <a:spcPct val="20000"/>
+              </a:spcBef>
+              <a:buFont typeface="Arial" pitchFamily="34" charset="0"/>
+              <a:buChar char="»"/>
+              <a:defRPr sz="2000" kern="1200">
+                <a:solidFill>
+                  <a:schemeClr val="tx1"/>
+                </a:solidFill>
+                <a:latin typeface="+mn-lt"/>
+                <a:ea typeface="+mn-ea"/>
+                <a:cs typeface="+mn-cs"/>
+              </a:defRPr>
+            </a:lvl5pPr>
+            <a:lvl6pPr marL="2514600" indent="-228600" algn="l" defTabSz="914400" rtl="0" eaLnBrk="1" latinLnBrk="0" hangingPunct="1">
+              <a:spcBef>
+                <a:spcPct val="20000"/>
+              </a:spcBef>
+              <a:buFont typeface="Arial" pitchFamily="34" charset="0"/>
+              <a:buChar char="•"/>
+              <a:defRPr sz="2000" kern="1200">
+                <a:solidFill>
+                  <a:schemeClr val="tx1"/>
+                </a:solidFill>
+                <a:latin typeface="+mn-lt"/>
+                <a:ea typeface="+mn-ea"/>
+                <a:cs typeface="+mn-cs"/>
+              </a:defRPr>
+            </a:lvl6pPr>
+            <a:lvl7pPr marL="2971800" indent="-228600" algn="l" defTabSz="914400" rtl="0" eaLnBrk="1" latinLnBrk="0" hangingPunct="1">
+              <a:spcBef>
+                <a:spcPct val="20000"/>
+              </a:spcBef>
+              <a:buFont typeface="Arial" pitchFamily="34" charset="0"/>
+              <a:buChar char="•"/>
+              <a:defRPr sz="2000" kern="1200">
+                <a:solidFill>
+                  <a:schemeClr val="tx1"/>
+                </a:solidFill>
+                <a:latin typeface="+mn-lt"/>
+                <a:ea typeface="+mn-ea"/>
+                <a:cs typeface="+mn-cs"/>
+              </a:defRPr>
+            </a:lvl7pPr>
+            <a:lvl8pPr marL="3429000" indent="-228600" algn="l" defTabSz="914400" rtl="0" eaLnBrk="1" latinLnBrk="0" hangingPunct="1">
+              <a:spcBef>
+                <a:spcPct val="20000"/>
+              </a:spcBef>
+              <a:buFont typeface="Arial" pitchFamily="34" charset="0"/>
+              <a:buChar char="•"/>
+              <a:defRPr sz="2000" kern="1200">
+                <a:solidFill>
+                  <a:schemeClr val="tx1"/>
+                </a:solidFill>
+                <a:latin typeface="+mn-lt"/>
+                <a:ea typeface="+mn-ea"/>
+                <a:cs typeface="+mn-cs"/>
+              </a:defRPr>
+            </a:lvl8pPr>
+            <a:lvl9pPr marL="3886200" indent="-228600" algn="l" defTabSz="914400" rtl="0" eaLnBrk="1" latinLnBrk="0" hangingPunct="1">
+              <a:spcBef>
+                <a:spcPct val="20000"/>
+              </a:spcBef>
+              <a:buFont typeface="Arial" pitchFamily="34" charset="0"/>
+              <a:buChar char="•"/>
+              <a:defRPr sz="2000" kern="1200">
+                <a:solidFill>
+                  <a:schemeClr val="tx1"/>
+                </a:solidFill>
+                <a:latin typeface="+mn-lt"/>
+                <a:ea typeface="+mn-ea"/>
+                <a:cs typeface="+mn-cs"/>
+              </a:defRPr>
+            </a:lvl9pPr>
+          </a:lstStyle>
+          <a:p>
+            <a:pPr marL="720725" indent="-274638"/>
+            <a:endParaRPr lang="de-DE" sz="1600" dirty="0">
+              <a:latin typeface="Arial" panose="020B0604020202020204" pitchFamily="34" charset="0"/>
+              <a:cs typeface="Arial" panose="020B0604020202020204" pitchFamily="34" charset="0"/>
+            </a:endParaRPr>
+          </a:p>
+        </p:txBody>
+      </p:sp>
+      <p:sp>
+        <p:nvSpPr>
+          <p:cNvPr id="5" name="Rechteck 4"/>
+          <p:cNvSpPr/>
+          <p:nvPr/>
+        </p:nvSpPr>
+        <p:spPr>
+          <a:xfrm>
+            <a:off x="469062" y="1131094"/>
+            <a:ext cx="8208000" cy="504056"/>
+          </a:xfrm>
+          <a:prstGeom prst="rect">
+            <a:avLst/>
+          </a:prstGeom>
+          <a:solidFill>
+            <a:srgbClr val="3F51B5"/>
+          </a:solidFill>
+          <a:ln>
+            <a:solidFill>
+              <a:srgbClr val="3F51B5"/>
+            </a:solidFill>
+          </a:ln>
+        </p:spPr>
+        <p:style>
+          <a:lnRef idx="2">
+            <a:schemeClr val="accent1">
+              <a:shade val="50000"/>
+            </a:schemeClr>
+          </a:lnRef>
+          <a:fillRef idx="1">
+            <a:schemeClr val="accent1"/>
+          </a:fillRef>
+          <a:effectRef idx="0">
+            <a:schemeClr val="accent1"/>
+          </a:effectRef>
+          <a:fontRef idx="minor">
+            <a:schemeClr val="lt1"/>
+          </a:fontRef>
+        </p:style>
+        <p:txBody>
+          <a:bodyPr rtlCol="0" anchor="ctr"/>
+          <a:lstStyle/>
+          <a:p>
+            <a:pPr algn="ctr"/>
+            <a:r>
+              <a:rPr lang="de-DE" sz="1600" b="1" dirty="0" smtClean="0">
+                <a:latin typeface="Arial" panose="020B0604020202020204" pitchFamily="34" charset="0"/>
+                <a:cs typeface="Arial" panose="020B0604020202020204" pitchFamily="34" charset="0"/>
+              </a:rPr>
               <a:t>Q15* </a:t>
             </a:r>
             <a:r>
@@ -18649,7 +19733,7 @@
           <a:p>
             <a:fld id="{6C6AE60A-B69C-4790-82F7-3882EDF23186}" type="slidenum">
               <a:rPr lang="de-DE" smtClean="0"/>
-              <a:t>23</a:t>
+              <a:t>24</a:t>
             </a:fld>
             <a:endParaRPr lang="de-DE"/>
           </a:p>
@@ -19379,7 +20463,7 @@
 </p:sld>
 </file>
 
-<file path=ppt/slides/slide24.xml><?xml version="1.0" encoding="utf-8"?>
+<file path=ppt/slides/slide25.xml><?xml version="1.0" encoding="utf-8"?>
 <p:sld xmlns:a="http://schemas.openxmlformats.org/drawingml/2006/main" xmlns:r="http://schemas.openxmlformats.org/officeDocument/2006/relationships" xmlns:p="http://schemas.openxmlformats.org/presentationml/2006/main">
   <p:cSld>
     <p:spTree>
@@ -19970,7 +21054,7 @@
           <a:p>
             <a:fld id="{6C6AE60A-B69C-4790-82F7-3882EDF23186}" type="slidenum">
               <a:rPr lang="de-DE" smtClean="0"/>
-              <a:t>24</a:t>
+              <a:t>25</a:t>
             </a:fld>
             <a:endParaRPr lang="de-DE"/>
           </a:p>
@@ -19996,7 +21080,7 @@
 </p:sld>
 </file>
 
-<file path=ppt/slides/slide25.xml><?xml version="1.0" encoding="utf-8"?>
+<file path=ppt/slides/slide26.xml><?xml version="1.0" encoding="utf-8"?>
 <p:sld xmlns:a="http://schemas.openxmlformats.org/drawingml/2006/main" xmlns:r="http://schemas.openxmlformats.org/officeDocument/2006/relationships" xmlns:p="http://schemas.openxmlformats.org/presentationml/2006/main">
   <p:cSld>
     <p:spTree>
@@ -20086,76 +21170,82 @@
           <a:p>
             <a:pPr marL="720725" indent="-274638"/>
             <a:r>
+              <a:rPr lang="de-DE" sz="1600" b="1" dirty="0" smtClean="0">
+                <a:latin typeface="Arial" panose="020B0604020202020204" pitchFamily="34" charset="0"/>
+                <a:cs typeface="Arial" panose="020B0604020202020204" pitchFamily="34" charset="0"/>
+              </a:rPr>
+              <a:t>56,7%</a:t>
+            </a:r>
+            <a:r>
               <a:rPr lang="de-DE" sz="1600" dirty="0" smtClean="0">
                 <a:latin typeface="Arial" panose="020B0604020202020204" pitchFamily="34" charset="0"/>
                 <a:cs typeface="Arial" panose="020B0604020202020204" pitchFamily="34" charset="0"/>
               </a:rPr>
-              <a:t>Vor allem folgende Punkte sind den Befragten bei der Erstellung einer eigenen Route wichtig: </a:t>
+              <a:t> der Befragten die angegeben haben mehr als eine Happy Hour pro Abend zu besuchen, würden auch eine eigene Happy Hour Route erstellen.</a:t>
+            </a:r>
+          </a:p>
+          <a:p>
+            <a:pPr marL="720725" indent="-274638"/>
+            <a:r>
+              <a:rPr lang="de-DE" sz="1600" dirty="0" smtClean="0">
+                <a:latin typeface="Arial" panose="020B0604020202020204" pitchFamily="34" charset="0"/>
+                <a:cs typeface="Arial" panose="020B0604020202020204" pitchFamily="34" charset="0"/>
+              </a:rPr>
+              <a:t>Nur </a:t>
             </a:r>
             <a:r>
               <a:rPr lang="de-DE" sz="1600" b="1" dirty="0" smtClean="0">
                 <a:latin typeface="Arial" panose="020B0604020202020204" pitchFamily="34" charset="0"/>
                 <a:cs typeface="Arial" panose="020B0604020202020204" pitchFamily="34" charset="0"/>
               </a:rPr>
-              <a:t>Art </a:t>
-            </a:r>
-            <a:r>
-              <a:rPr lang="de-DE" sz="1600" b="1" dirty="0">
-                <a:latin typeface="Arial" panose="020B0604020202020204" pitchFamily="34" charset="0"/>
-                <a:cs typeface="Arial" panose="020B0604020202020204" pitchFamily="34" charset="0"/>
-              </a:rPr>
-              <a:t>der Location</a:t>
+              <a:t>27,2%</a:t>
+            </a:r>
+            <a:r>
+              <a:rPr lang="de-DE" sz="1600" dirty="0" smtClean="0">
+                <a:latin typeface="Arial" panose="020B0604020202020204" pitchFamily="34" charset="0"/>
+                <a:cs typeface="Arial" panose="020B0604020202020204" pitchFamily="34" charset="0"/>
+              </a:rPr>
+              <a:t> </a:t>
             </a:r>
             <a:r>
               <a:rPr lang="de-DE" sz="1600" dirty="0">
                 <a:latin typeface="Arial" panose="020B0604020202020204" pitchFamily="34" charset="0"/>
                 <a:cs typeface="Arial" panose="020B0604020202020204" pitchFamily="34" charset="0"/>
               </a:rPr>
-              <a:t>, </a:t>
-            </a:r>
-            <a:r>
-              <a:rPr lang="de-DE" sz="1600" b="1" dirty="0">
-                <a:latin typeface="Arial" panose="020B0604020202020204" pitchFamily="34" charset="0"/>
-                <a:cs typeface="Arial" panose="020B0604020202020204" pitchFamily="34" charset="0"/>
-              </a:rPr>
-              <a:t>Preisindex</a:t>
+              <a:t>der Befragten die angegeben haben </a:t>
+            </a:r>
+            <a:r>
+              <a:rPr lang="de-DE" sz="1600" dirty="0" smtClean="0">
+                <a:latin typeface="Arial" panose="020B0604020202020204" pitchFamily="34" charset="0"/>
+                <a:cs typeface="Arial" panose="020B0604020202020204" pitchFamily="34" charset="0"/>
+              </a:rPr>
+              <a:t>nicht mehr </a:t>
             </a:r>
             <a:r>
               <a:rPr lang="de-DE" sz="1600" dirty="0">
                 <a:latin typeface="Arial" panose="020B0604020202020204" pitchFamily="34" charset="0"/>
                 <a:cs typeface="Arial" panose="020B0604020202020204" pitchFamily="34" charset="0"/>
               </a:rPr>
-              <a:t>, </a:t>
-            </a:r>
-            <a:r>
-              <a:rPr lang="de-DE" sz="1600" b="1" dirty="0">
-                <a:latin typeface="Arial" panose="020B0604020202020204" pitchFamily="34" charset="0"/>
-                <a:cs typeface="Arial" panose="020B0604020202020204" pitchFamily="34" charset="0"/>
-              </a:rPr>
-              <a:t>Entfernung zwischen Locations</a:t>
+              <a:t>als eine Happy Hour pro Abend zu besuchen </a:t>
+            </a:r>
+            <a:r>
+              <a:rPr lang="de-DE" sz="1600" dirty="0" smtClean="0">
+                <a:latin typeface="Arial" panose="020B0604020202020204" pitchFamily="34" charset="0"/>
+                <a:cs typeface="Arial" panose="020B0604020202020204" pitchFamily="34" charset="0"/>
+              </a:rPr>
+              <a:t>würden, </a:t>
             </a:r>
             <a:r>
               <a:rPr lang="de-DE" sz="1600" dirty="0">
                 <a:latin typeface="Arial" panose="020B0604020202020204" pitchFamily="34" charset="0"/>
                 <a:cs typeface="Arial" panose="020B0604020202020204" pitchFamily="34" charset="0"/>
               </a:rPr>
-              <a:t>, </a:t>
-            </a:r>
-            <a:r>
-              <a:rPr lang="de-DE" sz="1600" b="1" dirty="0">
-                <a:latin typeface="Arial" panose="020B0604020202020204" pitchFamily="34" charset="0"/>
-                <a:cs typeface="Arial" panose="020B0604020202020204" pitchFamily="34" charset="0"/>
-              </a:rPr>
-              <a:t>Flexible </a:t>
-            </a:r>
-            <a:r>
-              <a:rPr lang="de-DE" sz="1600" b="1" dirty="0" smtClean="0">
-                <a:latin typeface="Arial" panose="020B0604020202020204" pitchFamily="34" charset="0"/>
-                <a:cs typeface="Arial" panose="020B0604020202020204" pitchFamily="34" charset="0"/>
-              </a:rPr>
-              <a:t>Einstellungsmöglichkeiten</a:t>
-            </a:r>
-            <a:endParaRPr lang="de-DE" sz="1600" b="1" dirty="0">
+              <a:t>auch eine eigene Happy Hour Route erstellen.</a:t>
+            </a:r>
+          </a:p>
+          <a:p>
+            <a:pPr marL="720725" indent="-274638"/>
+            <a:endParaRPr lang="de-DE" sz="1600" dirty="0">
               <a:latin typeface="Arial" panose="020B0604020202020204" pitchFamily="34" charset="0"/>
               <a:cs typeface="Arial" panose="020B0604020202020204" pitchFamily="34" charset="0"/>
             </a:endParaRPr>
@@ -20434,6 +21524,638 @@
                 <a:latin typeface="Arial" panose="020B0604020202020204" pitchFamily="34" charset="0"/>
                 <a:cs typeface="Arial" panose="020B0604020202020204" pitchFamily="34" charset="0"/>
               </a:rPr>
+              <a:t>Q16 </a:t>
+            </a:r>
+            <a:r>
+              <a:rPr lang="de-DE" sz="1600" dirty="0" smtClean="0">
+                <a:latin typeface="Arial" panose="020B0604020202020204" pitchFamily="34" charset="0"/>
+                <a:cs typeface="Arial" panose="020B0604020202020204" pitchFamily="34" charset="0"/>
+              </a:rPr>
+              <a:t>– </a:t>
+            </a:r>
+            <a:r>
+              <a:rPr lang="de-DE" sz="1600" dirty="0">
+                <a:latin typeface="Arial" panose="020B0604020202020204" pitchFamily="34" charset="0"/>
+                <a:cs typeface="Arial" panose="020B0604020202020204" pitchFamily="34" charset="0"/>
+              </a:rPr>
+              <a:t>Würdest du gerne eine Happy Hour Route selber </a:t>
+            </a:r>
+            <a:r>
+              <a:rPr lang="de-DE" sz="1600" dirty="0" smtClean="0">
+                <a:latin typeface="Arial" panose="020B0604020202020204" pitchFamily="34" charset="0"/>
+                <a:cs typeface="Arial" panose="020B0604020202020204" pitchFamily="34" charset="0"/>
+              </a:rPr>
+              <a:t>erstellen? * </a:t>
+            </a:r>
+            <a:r>
+              <a:rPr lang="de-DE" sz="1600" b="1" dirty="0" smtClean="0">
+                <a:latin typeface="Arial" panose="020B0604020202020204" pitchFamily="34" charset="0"/>
+                <a:cs typeface="Arial" panose="020B0604020202020204" pitchFamily="34" charset="0"/>
+              </a:rPr>
+              <a:t>Q9</a:t>
+            </a:r>
+            <a:r>
+              <a:rPr lang="de-DE" sz="1600" dirty="0" smtClean="0">
+                <a:latin typeface="Arial" panose="020B0604020202020204" pitchFamily="34" charset="0"/>
+                <a:cs typeface="Arial" panose="020B0604020202020204" pitchFamily="34" charset="0"/>
+              </a:rPr>
+              <a:t> </a:t>
+            </a:r>
+            <a:r>
+              <a:rPr lang="de-DE" sz="1600" dirty="0">
+                <a:latin typeface="Arial" panose="020B0604020202020204" pitchFamily="34" charset="0"/>
+                <a:cs typeface="Arial" panose="020B0604020202020204" pitchFamily="34" charset="0"/>
+              </a:rPr>
+              <a:t>–</a:t>
+            </a:r>
+            <a:r>
+              <a:rPr lang="de-DE" sz="1600" dirty="0" smtClean="0">
+                <a:latin typeface="Arial" panose="020B0604020202020204" pitchFamily="34" charset="0"/>
+                <a:cs typeface="Arial" panose="020B0604020202020204" pitchFamily="34" charset="0"/>
+              </a:rPr>
+              <a:t> Besuchst du mehr als eine Happy Hour pro Abend? </a:t>
+            </a:r>
+            <a:r>
+              <a:rPr lang="de-DE" sz="900" dirty="0" smtClean="0">
+                <a:latin typeface="Arial" panose="020B0604020202020204" pitchFamily="34" charset="0"/>
+                <a:cs typeface="Arial" panose="020B0604020202020204" pitchFamily="34" charset="0"/>
+              </a:rPr>
+              <a:t>(Kreuztabelle)</a:t>
+            </a:r>
+            <a:endParaRPr lang="de-DE" sz="900" dirty="0">
+              <a:latin typeface="Arial" panose="020B0604020202020204" pitchFamily="34" charset="0"/>
+              <a:cs typeface="Arial" panose="020B0604020202020204" pitchFamily="34" charset="0"/>
+            </a:endParaRPr>
+          </a:p>
+        </p:txBody>
+      </p:sp>
+      <p:sp>
+        <p:nvSpPr>
+          <p:cNvPr id="11" name="Rechteck 10"/>
+          <p:cNvSpPr/>
+          <p:nvPr/>
+        </p:nvSpPr>
+        <p:spPr>
+          <a:xfrm>
+            <a:off x="7791028" y="3246884"/>
+            <a:ext cx="811039" cy="351457"/>
+          </a:xfrm>
+          <a:prstGeom prst="rect">
+            <a:avLst/>
+          </a:prstGeom>
+          <a:noFill/>
+          <a:ln w="12700">
+            <a:solidFill>
+              <a:srgbClr val="3F51B5"/>
+            </a:solidFill>
+          </a:ln>
+        </p:spPr>
+        <p:style>
+          <a:lnRef idx="2">
+            <a:schemeClr val="accent1">
+              <a:shade val="50000"/>
+            </a:schemeClr>
+          </a:lnRef>
+          <a:fillRef idx="1">
+            <a:schemeClr val="accent1"/>
+          </a:fillRef>
+          <a:effectRef idx="0">
+            <a:schemeClr val="accent1"/>
+          </a:effectRef>
+          <a:fontRef idx="minor">
+            <a:schemeClr val="lt1"/>
+          </a:fontRef>
+        </p:style>
+        <p:txBody>
+          <a:bodyPr rtlCol="0" anchor="ctr"/>
+          <a:lstStyle/>
+          <a:p>
+            <a:pPr algn="ctr"/>
+            <a:r>
+              <a:rPr lang="de-DE" sz="1400" dirty="0" smtClean="0">
+                <a:solidFill>
+                  <a:schemeClr val="tx1"/>
+                </a:solidFill>
+                <a:latin typeface="Arial" panose="020B0604020202020204" pitchFamily="34" charset="0"/>
+                <a:cs typeface="Arial" panose="020B0604020202020204" pitchFamily="34" charset="0"/>
+              </a:rPr>
+              <a:t>N = 192</a:t>
+            </a:r>
+            <a:endParaRPr lang="de-DE" sz="1400" dirty="0">
+              <a:solidFill>
+                <a:schemeClr val="tx1"/>
+              </a:solidFill>
+              <a:latin typeface="Arial" panose="020B0604020202020204" pitchFamily="34" charset="0"/>
+              <a:cs typeface="Arial" panose="020B0604020202020204" pitchFamily="34" charset="0"/>
+            </a:endParaRPr>
+          </a:p>
+        </p:txBody>
+      </p:sp>
+      <p:sp>
+        <p:nvSpPr>
+          <p:cNvPr id="7" name="Foliennummernplatzhalter 6"/>
+          <p:cNvSpPr>
+            <a:spLocks noGrp="1"/>
+          </p:cNvSpPr>
+          <p:nvPr>
+            <p:ph type="sldNum" sz="quarter" idx="12"/>
+          </p:nvPr>
+        </p:nvSpPr>
+        <p:spPr/>
+        <p:txBody>
+          <a:bodyPr/>
+          <a:lstStyle/>
+          <a:p>
+            <a:fld id="{6C6AE60A-B69C-4790-82F7-3882EDF23186}" type="slidenum">
+              <a:rPr lang="de-DE" smtClean="0"/>
+              <a:t>26</a:t>
+            </a:fld>
+            <a:endParaRPr lang="de-DE"/>
+          </a:p>
+        </p:txBody>
+      </p:sp>
+      <p:graphicFrame>
+        <p:nvGraphicFramePr>
+          <p:cNvPr id="13" name="Diagramm 12"/>
+          <p:cNvGraphicFramePr>
+            <a:graphicFrameLocks/>
+          </p:cNvGraphicFramePr>
+          <p:nvPr>
+            <p:extLst>
+              <p:ext uri="{D42A27DB-BD31-4B8C-83A1-F6EECF244321}">
+                <p14:modId xmlns:p14="http://schemas.microsoft.com/office/powerpoint/2010/main" val="3061882950"/>
+              </p:ext>
+            </p:extLst>
+          </p:nvPr>
+        </p:nvGraphicFramePr>
+        <p:xfrm>
+          <a:off x="1331640" y="1635150"/>
+          <a:ext cx="6459388" cy="3450034"/>
+        </p:xfrm>
+        <a:graphic>
+          <a:graphicData uri="http://schemas.openxmlformats.org/drawingml/2006/chart">
+            <c:chart xmlns:c="http://schemas.openxmlformats.org/drawingml/2006/chart" xmlns:r="http://schemas.openxmlformats.org/officeDocument/2006/relationships" r:id="rId2"/>
+          </a:graphicData>
+        </a:graphic>
+      </p:graphicFrame>
+    </p:spTree>
+    <p:extLst>
+      <p:ext uri="{BB962C8B-B14F-4D97-AF65-F5344CB8AC3E}">
+        <p14:creationId xmlns:p14="http://schemas.microsoft.com/office/powerpoint/2010/main" val="4183481956"/>
+      </p:ext>
+    </p:extLst>
+  </p:cSld>
+  <p:clrMapOvr>
+    <a:masterClrMapping/>
+  </p:clrMapOvr>
+  <p:timing>
+    <p:tnLst>
+      <p:par>
+        <p:cTn id="1" dur="indefinite" restart="never" nodeType="tmRoot"/>
+      </p:par>
+    </p:tnLst>
+  </p:timing>
+</p:sld>
+</file>
+
+<file path=ppt/slides/slide27.xml><?xml version="1.0" encoding="utf-8"?>
+<p:sld xmlns:a="http://schemas.openxmlformats.org/drawingml/2006/main" xmlns:r="http://schemas.openxmlformats.org/officeDocument/2006/relationships" xmlns:p="http://schemas.openxmlformats.org/presentationml/2006/main">
+  <p:cSld>
+    <p:spTree>
+      <p:nvGrpSpPr>
+        <p:cNvPr id="1" name=""/>
+        <p:cNvGrpSpPr/>
+        <p:nvPr/>
+      </p:nvGrpSpPr>
+      <p:grpSpPr>
+        <a:xfrm>
+          <a:off x="0" y="0"/>
+          <a:ext cx="0" cy="0"/>
+          <a:chOff x="0" y="0"/>
+          <a:chExt cx="0" cy="0"/>
+        </a:xfrm>
+      </p:grpSpPr>
+      <p:sp>
+        <p:nvSpPr>
+          <p:cNvPr id="2" name="Titel 1"/>
+          <p:cNvSpPr>
+            <a:spLocks noGrp="1"/>
+          </p:cNvSpPr>
+          <p:nvPr>
+            <p:ph type="title"/>
+          </p:nvPr>
+        </p:nvSpPr>
+        <p:spPr>
+          <a:xfrm>
+            <a:off x="457200" y="274638"/>
+            <a:ext cx="8229600" cy="634082"/>
+          </a:xfrm>
+        </p:spPr>
+        <p:txBody>
+          <a:bodyPr>
+            <a:normAutofit/>
+          </a:bodyPr>
+          <a:lstStyle/>
+          <a:p>
+            <a:pPr algn="l"/>
+            <a:r>
+              <a:rPr lang="de-DE" sz="2000" b="1" dirty="0" smtClean="0">
+                <a:latin typeface="Arial" panose="020B0604020202020204" pitchFamily="34" charset="0"/>
+                <a:cs typeface="Arial" panose="020B0604020202020204" pitchFamily="34" charset="0"/>
+              </a:rPr>
+              <a:t>4. Route </a:t>
+            </a:r>
+            <a:r>
+              <a:rPr lang="de-DE" sz="2000" dirty="0" smtClean="0">
+                <a:latin typeface="Arial" panose="020B0604020202020204" pitchFamily="34" charset="0"/>
+                <a:cs typeface="Arial" panose="020B0604020202020204" pitchFamily="34" charset="0"/>
+              </a:rPr>
+              <a:t>– Funktion: Selbsterstellte Route</a:t>
+            </a:r>
+            <a:endParaRPr lang="de-DE" sz="2000" dirty="0">
+              <a:latin typeface="Arial" panose="020B0604020202020204" pitchFamily="34" charset="0"/>
+              <a:cs typeface="Arial" panose="020B0604020202020204" pitchFamily="34" charset="0"/>
+            </a:endParaRPr>
+          </a:p>
+        </p:txBody>
+      </p:sp>
+      <p:sp>
+        <p:nvSpPr>
+          <p:cNvPr id="3" name="Inhaltsplatzhalter 2"/>
+          <p:cNvSpPr>
+            <a:spLocks noGrp="1"/>
+          </p:cNvSpPr>
+          <p:nvPr>
+            <p:ph idx="1"/>
+          </p:nvPr>
+        </p:nvSpPr>
+        <p:spPr>
+          <a:xfrm>
+            <a:off x="457200" y="5197202"/>
+            <a:ext cx="8229600" cy="1224136"/>
+          </a:xfrm>
+          <a:ln w="12700">
+            <a:solidFill>
+              <a:srgbClr val="3F51B5"/>
+            </a:solidFill>
+          </a:ln>
+        </p:spPr>
+        <p:txBody>
+          <a:bodyPr>
+            <a:noAutofit/>
+          </a:bodyPr>
+          <a:lstStyle/>
+          <a:p>
+            <a:pPr marL="720725" indent="-274638"/>
+            <a:r>
+              <a:rPr lang="de-DE" sz="1600" dirty="0" smtClean="0">
+                <a:latin typeface="Arial" panose="020B0604020202020204" pitchFamily="34" charset="0"/>
+                <a:cs typeface="Arial" panose="020B0604020202020204" pitchFamily="34" charset="0"/>
+              </a:rPr>
+              <a:t>Vor allem folgende Punkte sind den Befragten bei der Erstellung einer eigenen Route wichtig: </a:t>
+            </a:r>
+            <a:r>
+              <a:rPr lang="de-DE" sz="1600" b="1" dirty="0" smtClean="0">
+                <a:latin typeface="Arial" panose="020B0604020202020204" pitchFamily="34" charset="0"/>
+                <a:cs typeface="Arial" panose="020B0604020202020204" pitchFamily="34" charset="0"/>
+              </a:rPr>
+              <a:t>Art </a:t>
+            </a:r>
+            <a:r>
+              <a:rPr lang="de-DE" sz="1600" b="1" dirty="0">
+                <a:latin typeface="Arial" panose="020B0604020202020204" pitchFamily="34" charset="0"/>
+                <a:cs typeface="Arial" panose="020B0604020202020204" pitchFamily="34" charset="0"/>
+              </a:rPr>
+              <a:t>der Location</a:t>
+            </a:r>
+            <a:r>
+              <a:rPr lang="de-DE" sz="1600" dirty="0">
+                <a:latin typeface="Arial" panose="020B0604020202020204" pitchFamily="34" charset="0"/>
+                <a:cs typeface="Arial" panose="020B0604020202020204" pitchFamily="34" charset="0"/>
+              </a:rPr>
+              <a:t>, </a:t>
+            </a:r>
+            <a:r>
+              <a:rPr lang="de-DE" sz="1600" b="1" dirty="0">
+                <a:latin typeface="Arial" panose="020B0604020202020204" pitchFamily="34" charset="0"/>
+                <a:cs typeface="Arial" panose="020B0604020202020204" pitchFamily="34" charset="0"/>
+              </a:rPr>
+              <a:t>Preisindex</a:t>
+            </a:r>
+            <a:r>
+              <a:rPr lang="de-DE" sz="1600" dirty="0">
+                <a:latin typeface="Arial" panose="020B0604020202020204" pitchFamily="34" charset="0"/>
+                <a:cs typeface="Arial" panose="020B0604020202020204" pitchFamily="34" charset="0"/>
+              </a:rPr>
+              <a:t>, </a:t>
+            </a:r>
+            <a:r>
+              <a:rPr lang="de-DE" sz="1600" b="1" dirty="0">
+                <a:latin typeface="Arial" panose="020B0604020202020204" pitchFamily="34" charset="0"/>
+                <a:cs typeface="Arial" panose="020B0604020202020204" pitchFamily="34" charset="0"/>
+              </a:rPr>
+              <a:t>Entfernung zwischen Locations</a:t>
+            </a:r>
+            <a:r>
+              <a:rPr lang="de-DE" sz="1600" dirty="0">
+                <a:latin typeface="Arial" panose="020B0604020202020204" pitchFamily="34" charset="0"/>
+                <a:cs typeface="Arial" panose="020B0604020202020204" pitchFamily="34" charset="0"/>
+              </a:rPr>
+              <a:t>, </a:t>
+            </a:r>
+            <a:r>
+              <a:rPr lang="de-DE" sz="1600" b="1" dirty="0">
+                <a:latin typeface="Arial" panose="020B0604020202020204" pitchFamily="34" charset="0"/>
+                <a:cs typeface="Arial" panose="020B0604020202020204" pitchFamily="34" charset="0"/>
+              </a:rPr>
+              <a:t>Flexible </a:t>
+            </a:r>
+            <a:r>
+              <a:rPr lang="de-DE" sz="1600" b="1" dirty="0" smtClean="0">
+                <a:latin typeface="Arial" panose="020B0604020202020204" pitchFamily="34" charset="0"/>
+                <a:cs typeface="Arial" panose="020B0604020202020204" pitchFamily="34" charset="0"/>
+              </a:rPr>
+              <a:t>Einstellungsmöglichkeiten</a:t>
+            </a:r>
+            <a:endParaRPr lang="de-DE" sz="1600" b="1" dirty="0">
+              <a:latin typeface="Arial" panose="020B0604020202020204" pitchFamily="34" charset="0"/>
+              <a:cs typeface="Arial" panose="020B0604020202020204" pitchFamily="34" charset="0"/>
+            </a:endParaRPr>
+          </a:p>
+        </p:txBody>
+      </p:sp>
+      <p:sp>
+        <p:nvSpPr>
+          <p:cNvPr id="4" name="Gleichschenkliges Dreieck 3"/>
+          <p:cNvSpPr/>
+          <p:nvPr/>
+        </p:nvSpPr>
+        <p:spPr>
+          <a:xfrm rot="5400000">
+            <a:off x="118401" y="5555077"/>
+            <a:ext cx="1188000" cy="504000"/>
+          </a:xfrm>
+          <a:prstGeom prst="triangle">
+            <a:avLst/>
+          </a:prstGeom>
+          <a:solidFill>
+            <a:srgbClr val="3F51B5"/>
+          </a:solidFill>
+          <a:ln>
+            <a:solidFill>
+              <a:srgbClr val="3F51B5"/>
+            </a:solidFill>
+          </a:ln>
+        </p:spPr>
+        <p:style>
+          <a:lnRef idx="2">
+            <a:schemeClr val="accent1">
+              <a:shade val="50000"/>
+            </a:schemeClr>
+          </a:lnRef>
+          <a:fillRef idx="1">
+            <a:schemeClr val="accent1"/>
+          </a:fillRef>
+          <a:effectRef idx="0">
+            <a:schemeClr val="accent1"/>
+          </a:effectRef>
+          <a:fontRef idx="minor">
+            <a:schemeClr val="lt1"/>
+          </a:fontRef>
+        </p:style>
+        <p:txBody>
+          <a:bodyPr rtlCol="0" anchor="ctr"/>
+          <a:lstStyle/>
+          <a:p>
+            <a:pPr algn="ctr"/>
+            <a:endParaRPr lang="de-DE">
+              <a:latin typeface="Arial" panose="020B0604020202020204" pitchFamily="34" charset="0"/>
+              <a:cs typeface="Arial" panose="020B0604020202020204" pitchFamily="34" charset="0"/>
+            </a:endParaRPr>
+          </a:p>
+        </p:txBody>
+      </p:sp>
+      <p:sp>
+        <p:nvSpPr>
+          <p:cNvPr id="6" name="Inhaltsplatzhalter 2"/>
+          <p:cNvSpPr txBox="1">
+            <a:spLocks/>
+          </p:cNvSpPr>
+          <p:nvPr/>
+        </p:nvSpPr>
+        <p:spPr>
+          <a:xfrm>
+            <a:off x="457200" y="1124744"/>
+            <a:ext cx="8229600" cy="3960440"/>
+          </a:xfrm>
+          <a:prstGeom prst="rect">
+            <a:avLst/>
+          </a:prstGeom>
+          <a:ln w="12700">
+            <a:solidFill>
+              <a:srgbClr val="3F51B5"/>
+            </a:solidFill>
+          </a:ln>
+        </p:spPr>
+        <p:txBody>
+          <a:bodyPr vert="horz" lIns="91440" tIns="45720" rIns="91440" bIns="45720" rtlCol="0">
+            <a:normAutofit/>
+          </a:bodyPr>
+          <a:lstStyle>
+            <a:lvl1pPr marL="342900" indent="-342900" algn="l" defTabSz="914400" rtl="0" eaLnBrk="1" latinLnBrk="0" hangingPunct="1">
+              <a:spcBef>
+                <a:spcPct val="20000"/>
+              </a:spcBef>
+              <a:buFont typeface="Arial" pitchFamily="34" charset="0"/>
+              <a:buChar char="•"/>
+              <a:defRPr sz="3200" kern="1200">
+                <a:solidFill>
+                  <a:schemeClr val="tx1"/>
+                </a:solidFill>
+                <a:latin typeface="+mn-lt"/>
+                <a:ea typeface="+mn-ea"/>
+                <a:cs typeface="+mn-cs"/>
+              </a:defRPr>
+            </a:lvl1pPr>
+            <a:lvl2pPr marL="742950" indent="-285750" algn="l" defTabSz="914400" rtl="0" eaLnBrk="1" latinLnBrk="0" hangingPunct="1">
+              <a:spcBef>
+                <a:spcPct val="20000"/>
+              </a:spcBef>
+              <a:buFont typeface="Arial" pitchFamily="34" charset="0"/>
+              <a:buChar char="–"/>
+              <a:defRPr sz="2800" kern="1200">
+                <a:solidFill>
+                  <a:schemeClr val="tx1"/>
+                </a:solidFill>
+                <a:latin typeface="+mn-lt"/>
+                <a:ea typeface="+mn-ea"/>
+                <a:cs typeface="+mn-cs"/>
+              </a:defRPr>
+            </a:lvl2pPr>
+            <a:lvl3pPr marL="1143000" indent="-228600" algn="l" defTabSz="914400" rtl="0" eaLnBrk="1" latinLnBrk="0" hangingPunct="1">
+              <a:spcBef>
+                <a:spcPct val="20000"/>
+              </a:spcBef>
+              <a:buFont typeface="Arial" pitchFamily="34" charset="0"/>
+              <a:buChar char="•"/>
+              <a:defRPr sz="2400" kern="1200">
+                <a:solidFill>
+                  <a:schemeClr val="tx1"/>
+                </a:solidFill>
+                <a:latin typeface="+mn-lt"/>
+                <a:ea typeface="+mn-ea"/>
+                <a:cs typeface="+mn-cs"/>
+              </a:defRPr>
+            </a:lvl3pPr>
+            <a:lvl4pPr marL="1600200" indent="-228600" algn="l" defTabSz="914400" rtl="0" eaLnBrk="1" latinLnBrk="0" hangingPunct="1">
+              <a:spcBef>
+                <a:spcPct val="20000"/>
+              </a:spcBef>
+              <a:buFont typeface="Arial" pitchFamily="34" charset="0"/>
+              <a:buChar char="–"/>
+              <a:defRPr sz="2000" kern="1200">
+                <a:solidFill>
+                  <a:schemeClr val="tx1"/>
+                </a:solidFill>
+                <a:latin typeface="+mn-lt"/>
+                <a:ea typeface="+mn-ea"/>
+                <a:cs typeface="+mn-cs"/>
+              </a:defRPr>
+            </a:lvl4pPr>
+            <a:lvl5pPr marL="2057400" indent="-228600" algn="l" defTabSz="914400" rtl="0" eaLnBrk="1" latinLnBrk="0" hangingPunct="1">
+              <a:spcBef>
+                <a:spcPct val="20000"/>
+              </a:spcBef>
+              <a:buFont typeface="Arial" pitchFamily="34" charset="0"/>
+              <a:buChar char="»"/>
+              <a:defRPr sz="2000" kern="1200">
+                <a:solidFill>
+                  <a:schemeClr val="tx1"/>
+                </a:solidFill>
+                <a:latin typeface="+mn-lt"/>
+                <a:ea typeface="+mn-ea"/>
+                <a:cs typeface="+mn-cs"/>
+              </a:defRPr>
+            </a:lvl5pPr>
+            <a:lvl6pPr marL="2514600" indent="-228600" algn="l" defTabSz="914400" rtl="0" eaLnBrk="1" latinLnBrk="0" hangingPunct="1">
+              <a:spcBef>
+                <a:spcPct val="20000"/>
+              </a:spcBef>
+              <a:buFont typeface="Arial" pitchFamily="34" charset="0"/>
+              <a:buChar char="•"/>
+              <a:defRPr sz="2000" kern="1200">
+                <a:solidFill>
+                  <a:schemeClr val="tx1"/>
+                </a:solidFill>
+                <a:latin typeface="+mn-lt"/>
+                <a:ea typeface="+mn-ea"/>
+                <a:cs typeface="+mn-cs"/>
+              </a:defRPr>
+            </a:lvl6pPr>
+            <a:lvl7pPr marL="2971800" indent="-228600" algn="l" defTabSz="914400" rtl="0" eaLnBrk="1" latinLnBrk="0" hangingPunct="1">
+              <a:spcBef>
+                <a:spcPct val="20000"/>
+              </a:spcBef>
+              <a:buFont typeface="Arial" pitchFamily="34" charset="0"/>
+              <a:buChar char="•"/>
+              <a:defRPr sz="2000" kern="1200">
+                <a:solidFill>
+                  <a:schemeClr val="tx1"/>
+                </a:solidFill>
+                <a:latin typeface="+mn-lt"/>
+                <a:ea typeface="+mn-ea"/>
+                <a:cs typeface="+mn-cs"/>
+              </a:defRPr>
+            </a:lvl7pPr>
+            <a:lvl8pPr marL="3429000" indent="-228600" algn="l" defTabSz="914400" rtl="0" eaLnBrk="1" latinLnBrk="0" hangingPunct="1">
+              <a:spcBef>
+                <a:spcPct val="20000"/>
+              </a:spcBef>
+              <a:buFont typeface="Arial" pitchFamily="34" charset="0"/>
+              <a:buChar char="•"/>
+              <a:defRPr sz="2000" kern="1200">
+                <a:solidFill>
+                  <a:schemeClr val="tx1"/>
+                </a:solidFill>
+                <a:latin typeface="+mn-lt"/>
+                <a:ea typeface="+mn-ea"/>
+                <a:cs typeface="+mn-cs"/>
+              </a:defRPr>
+            </a:lvl8pPr>
+            <a:lvl9pPr marL="3886200" indent="-228600" algn="l" defTabSz="914400" rtl="0" eaLnBrk="1" latinLnBrk="0" hangingPunct="1">
+              <a:spcBef>
+                <a:spcPct val="20000"/>
+              </a:spcBef>
+              <a:buFont typeface="Arial" pitchFamily="34" charset="0"/>
+              <a:buChar char="•"/>
+              <a:defRPr sz="2000" kern="1200">
+                <a:solidFill>
+                  <a:schemeClr val="tx1"/>
+                </a:solidFill>
+                <a:latin typeface="+mn-lt"/>
+                <a:ea typeface="+mn-ea"/>
+                <a:cs typeface="+mn-cs"/>
+              </a:defRPr>
+            </a:lvl9pPr>
+          </a:lstStyle>
+          <a:p>
+            <a:pPr marL="720725" indent="-274638"/>
+            <a:endParaRPr lang="de-DE" sz="1600" dirty="0">
+              <a:latin typeface="Arial" panose="020B0604020202020204" pitchFamily="34" charset="0"/>
+              <a:cs typeface="Arial" panose="020B0604020202020204" pitchFamily="34" charset="0"/>
+            </a:endParaRPr>
+          </a:p>
+        </p:txBody>
+      </p:sp>
+      <p:sp>
+        <p:nvSpPr>
+          <p:cNvPr id="5" name="Rechteck 4"/>
+          <p:cNvSpPr/>
+          <p:nvPr/>
+        </p:nvSpPr>
+        <p:spPr>
+          <a:xfrm>
+            <a:off x="469062" y="1131094"/>
+            <a:ext cx="8208000" cy="504056"/>
+          </a:xfrm>
+          <a:prstGeom prst="rect">
+            <a:avLst/>
+          </a:prstGeom>
+          <a:solidFill>
+            <a:srgbClr val="3F51B5"/>
+          </a:solidFill>
+          <a:ln>
+            <a:solidFill>
+              <a:srgbClr val="3F51B5"/>
+            </a:solidFill>
+          </a:ln>
+        </p:spPr>
+        <p:style>
+          <a:lnRef idx="2">
+            <a:schemeClr val="accent1">
+              <a:shade val="50000"/>
+            </a:schemeClr>
+          </a:lnRef>
+          <a:fillRef idx="1">
+            <a:schemeClr val="accent1"/>
+          </a:fillRef>
+          <a:effectRef idx="0">
+            <a:schemeClr val="accent1"/>
+          </a:effectRef>
+          <a:fontRef idx="minor">
+            <a:schemeClr val="lt1"/>
+          </a:fontRef>
+        </p:style>
+        <p:txBody>
+          <a:bodyPr rtlCol="0" anchor="ctr"/>
+          <a:lstStyle/>
+          <a:p>
+            <a:pPr algn="ctr"/>
+            <a:r>
+              <a:rPr lang="de-DE" sz="1600" b="1" dirty="0" smtClean="0">
+                <a:latin typeface="Arial" panose="020B0604020202020204" pitchFamily="34" charset="0"/>
+                <a:cs typeface="Arial" panose="020B0604020202020204" pitchFamily="34" charset="0"/>
+              </a:rPr>
               <a:t>Q17* </a:t>
             </a:r>
             <a:r>
@@ -20543,7 +22265,7 @@
           <a:p>
             <a:fld id="{6C6AE60A-B69C-4790-82F7-3882EDF23186}" type="slidenum">
               <a:rPr lang="de-DE" smtClean="0"/>
-              <a:t>25</a:t>
+              <a:t>27</a:t>
             </a:fld>
             <a:endParaRPr lang="de-DE"/>
           </a:p>
@@ -21183,7 +22905,7 @@
 </p:sld>
 </file>
 
-<file path=ppt/slides/slide26.xml><?xml version="1.0" encoding="utf-8"?>
+<file path=ppt/slides/slide28.xml><?xml version="1.0" encoding="utf-8"?>
 <p:sld xmlns:a="http://schemas.openxmlformats.org/drawingml/2006/main" xmlns:r="http://schemas.openxmlformats.org/officeDocument/2006/relationships" xmlns:p="http://schemas.openxmlformats.org/presentationml/2006/main">
   <p:cSld>
     <p:spTree>
@@ -21860,7 +23582,7 @@
           <a:p>
             <a:fld id="{6C6AE60A-B69C-4790-82F7-3882EDF23186}" type="slidenum">
               <a:rPr lang="de-DE" smtClean="0"/>
-              <a:t>26</a:t>
+              <a:t>28</a:t>
             </a:fld>
             <a:endParaRPr lang="de-DE"/>
           </a:p>
@@ -21886,7 +23608,7 @@
 </p:sld>
 </file>
 
-<file path=ppt/slides/slide27.xml><?xml version="1.0" encoding="utf-8"?>
+<file path=ppt/slides/slide29.xml><?xml version="1.0" encoding="utf-8"?>
 <p:sld xmlns:a="http://schemas.openxmlformats.org/drawingml/2006/main" xmlns:r="http://schemas.openxmlformats.org/officeDocument/2006/relationships" xmlns:p="http://schemas.openxmlformats.org/presentationml/2006/main">
   <p:cSld>
     <p:spTree>
@@ -22512,7 +24234,7 @@
           <a:p>
             <a:fld id="{6C6AE60A-B69C-4790-82F7-3882EDF23186}" type="slidenum">
               <a:rPr lang="de-DE" smtClean="0"/>
-              <a:t>27</a:t>
+              <a:t>29</a:t>
             </a:fld>
             <a:endParaRPr lang="de-DE"/>
           </a:p>
@@ -22538,7 +24260,592 @@
 </p:sld>
 </file>
 
-<file path=ppt/slides/slide28.xml><?xml version="1.0" encoding="utf-8"?>
+<file path=ppt/slides/slide3.xml><?xml version="1.0" encoding="utf-8"?>
+<p:sld xmlns:a="http://schemas.openxmlformats.org/drawingml/2006/main" xmlns:r="http://schemas.openxmlformats.org/officeDocument/2006/relationships" xmlns:p="http://schemas.openxmlformats.org/presentationml/2006/main">
+  <p:cSld>
+    <p:spTree>
+      <p:nvGrpSpPr>
+        <p:cNvPr id="1" name=""/>
+        <p:cNvGrpSpPr/>
+        <p:nvPr/>
+      </p:nvGrpSpPr>
+      <p:grpSpPr>
+        <a:xfrm>
+          <a:off x="0" y="0"/>
+          <a:ext cx="0" cy="0"/>
+          <a:chOff x="0" y="0"/>
+          <a:chExt cx="0" cy="0"/>
+        </a:xfrm>
+      </p:grpSpPr>
+      <p:sp>
+        <p:nvSpPr>
+          <p:cNvPr id="8" name="Rechteck 7"/>
+          <p:cNvSpPr/>
+          <p:nvPr/>
+        </p:nvSpPr>
+        <p:spPr>
+          <a:xfrm>
+            <a:off x="469062" y="1512094"/>
+            <a:ext cx="8208000" cy="1577826"/>
+          </a:xfrm>
+          <a:prstGeom prst="rect">
+            <a:avLst/>
+          </a:prstGeom>
+          <a:solidFill>
+            <a:srgbClr val="3F51B5"/>
+          </a:solidFill>
+          <a:ln>
+            <a:solidFill>
+              <a:srgbClr val="3F51B5"/>
+            </a:solidFill>
+          </a:ln>
+        </p:spPr>
+        <p:style>
+          <a:lnRef idx="2">
+            <a:schemeClr val="accent1">
+              <a:shade val="50000"/>
+            </a:schemeClr>
+          </a:lnRef>
+          <a:fillRef idx="1">
+            <a:schemeClr val="accent1"/>
+          </a:fillRef>
+          <a:effectRef idx="0">
+            <a:schemeClr val="accent1"/>
+          </a:effectRef>
+          <a:fontRef idx="minor">
+            <a:schemeClr val="lt1"/>
+          </a:fontRef>
+        </p:style>
+        <p:txBody>
+          <a:bodyPr rtlCol="0" anchor="ctr"/>
+          <a:lstStyle/>
+          <a:p>
+            <a:pPr algn="just"/>
+            <a:r>
+              <a:rPr lang="de-DE" sz="1600" dirty="0">
+                <a:solidFill>
+                  <a:schemeClr val="bg1"/>
+                </a:solidFill>
+                <a:latin typeface="Arial" panose="020B0604020202020204" pitchFamily="34" charset="0"/>
+                <a:cs typeface="Arial" panose="020B0604020202020204" pitchFamily="34" charset="0"/>
+              </a:rPr>
+              <a:t>Ziel </a:t>
+            </a:r>
+            <a:r>
+              <a:rPr lang="de-DE" sz="1600" dirty="0" smtClean="0">
+                <a:solidFill>
+                  <a:schemeClr val="bg1"/>
+                </a:solidFill>
+                <a:latin typeface="Arial" panose="020B0604020202020204" pitchFamily="34" charset="0"/>
+                <a:cs typeface="Arial" panose="020B0604020202020204" pitchFamily="34" charset="0"/>
+              </a:rPr>
+              <a:t>dieser Umfrage ist es einen Überblick über den potentiellen Markt für „Go Happy“ zu bekommen. </a:t>
+            </a:r>
+            <a:r>
+              <a:rPr lang="de-DE" sz="1600" dirty="0">
+                <a:solidFill>
+                  <a:schemeClr val="bg1"/>
+                </a:solidFill>
+                <a:latin typeface="Arial" panose="020B0604020202020204" pitchFamily="34" charset="0"/>
+                <a:cs typeface="Arial" panose="020B0604020202020204" pitchFamily="34" charset="0"/>
+              </a:rPr>
+              <a:t>Bei der Auswertung der Umfrage sind zwei Aspekte ausschlaggebend. Zum einen sollen Impulse zur Erstellung der Web-Applikationen gewonnen werden </a:t>
+            </a:r>
+            <a:r>
+              <a:rPr lang="de-DE" sz="1600" dirty="0" smtClean="0">
+                <a:solidFill>
+                  <a:schemeClr val="bg1"/>
+                </a:solidFill>
+                <a:latin typeface="Arial" panose="020B0604020202020204" pitchFamily="34" charset="0"/>
+                <a:cs typeface="Arial" panose="020B0604020202020204" pitchFamily="34" charset="0"/>
+              </a:rPr>
+              <a:t>(z.B. Funktionen, </a:t>
+            </a:r>
+            <a:r>
+              <a:rPr lang="de-DE" sz="1600" dirty="0">
+                <a:solidFill>
+                  <a:schemeClr val="bg1"/>
+                </a:solidFill>
+                <a:latin typeface="Arial" panose="020B0604020202020204" pitchFamily="34" charset="0"/>
+                <a:cs typeface="Arial" panose="020B0604020202020204" pitchFamily="34" charset="0"/>
+              </a:rPr>
+              <a:t>etc. die </a:t>
+            </a:r>
+            <a:r>
+              <a:rPr lang="de-DE" sz="1600" dirty="0" smtClean="0">
+                <a:solidFill>
+                  <a:schemeClr val="bg1"/>
+                </a:solidFill>
+                <a:latin typeface="Arial" panose="020B0604020202020204" pitchFamily="34" charset="0"/>
+                <a:cs typeface="Arial" panose="020B0604020202020204" pitchFamily="34" charset="0"/>
+              </a:rPr>
+              <a:t>sich unsere </a:t>
+            </a:r>
+            <a:r>
+              <a:rPr lang="de-DE" sz="1600" dirty="0">
+                <a:solidFill>
+                  <a:schemeClr val="bg1"/>
+                </a:solidFill>
+                <a:latin typeface="Arial" panose="020B0604020202020204" pitchFamily="34" charset="0"/>
+                <a:cs typeface="Arial" panose="020B0604020202020204" pitchFamily="34" charset="0"/>
+              </a:rPr>
+              <a:t>Zielgruppe </a:t>
+            </a:r>
+            <a:r>
+              <a:rPr lang="de-DE" sz="1600" dirty="0" smtClean="0">
+                <a:solidFill>
+                  <a:schemeClr val="bg1"/>
+                </a:solidFill>
+                <a:latin typeface="Arial" panose="020B0604020202020204" pitchFamily="34" charset="0"/>
+                <a:cs typeface="Arial" panose="020B0604020202020204" pitchFamily="34" charset="0"/>
+              </a:rPr>
+              <a:t>vorstellt) </a:t>
+            </a:r>
+            <a:r>
+              <a:rPr lang="de-DE" sz="1600" dirty="0">
+                <a:solidFill>
+                  <a:schemeClr val="bg1"/>
+                </a:solidFill>
+                <a:latin typeface="Arial" panose="020B0604020202020204" pitchFamily="34" charset="0"/>
+                <a:cs typeface="Arial" panose="020B0604020202020204" pitchFamily="34" charset="0"/>
+              </a:rPr>
+              <a:t>und zum anderen sollen die Ergebnisse zielführend bei den </a:t>
+            </a:r>
+            <a:r>
+              <a:rPr lang="de-DE" sz="1600" dirty="0" smtClean="0">
+                <a:solidFill>
+                  <a:schemeClr val="bg1"/>
+                </a:solidFill>
+                <a:latin typeface="Arial" panose="020B0604020202020204" pitchFamily="34" charset="0"/>
+                <a:cs typeface="Arial" panose="020B0604020202020204" pitchFamily="34" charset="0"/>
+              </a:rPr>
+              <a:t>zu entwickelnden Marketingstrategien </a:t>
+            </a:r>
+            <a:r>
+              <a:rPr lang="de-DE" sz="1600" dirty="0">
+                <a:solidFill>
+                  <a:schemeClr val="bg1"/>
+                </a:solidFill>
+                <a:latin typeface="Arial" panose="020B0604020202020204" pitchFamily="34" charset="0"/>
+                <a:cs typeface="Arial" panose="020B0604020202020204" pitchFamily="34" charset="0"/>
+              </a:rPr>
+              <a:t>beachtet werden </a:t>
+            </a:r>
+            <a:r>
+              <a:rPr lang="de-DE" sz="1600" dirty="0" smtClean="0">
+                <a:solidFill>
+                  <a:schemeClr val="bg1"/>
+                </a:solidFill>
+                <a:latin typeface="Arial" panose="020B0604020202020204" pitchFamily="34" charset="0"/>
+                <a:cs typeface="Arial" panose="020B0604020202020204" pitchFamily="34" charset="0"/>
+              </a:rPr>
+              <a:t>(Art der Werbung, </a:t>
+            </a:r>
+            <a:r>
+              <a:rPr lang="de-DE" sz="1600" dirty="0">
+                <a:solidFill>
+                  <a:schemeClr val="bg1"/>
+                </a:solidFill>
+                <a:latin typeface="Arial" panose="020B0604020202020204" pitchFamily="34" charset="0"/>
+                <a:cs typeface="Arial" panose="020B0604020202020204" pitchFamily="34" charset="0"/>
+              </a:rPr>
+              <a:t>etc</a:t>
+            </a:r>
+            <a:r>
+              <a:rPr lang="de-DE" sz="1600" dirty="0" smtClean="0">
+                <a:solidFill>
+                  <a:schemeClr val="bg1"/>
+                </a:solidFill>
+                <a:latin typeface="Arial" panose="020B0604020202020204" pitchFamily="34" charset="0"/>
+                <a:cs typeface="Arial" panose="020B0604020202020204" pitchFamily="34" charset="0"/>
+              </a:rPr>
+              <a:t>.).</a:t>
+            </a:r>
+            <a:endParaRPr lang="de-DE" sz="1600" dirty="0">
+              <a:latin typeface="Arial" panose="020B0604020202020204" pitchFamily="34" charset="0"/>
+              <a:cs typeface="Arial" panose="020B0604020202020204" pitchFamily="34" charset="0"/>
+            </a:endParaRPr>
+          </a:p>
+        </p:txBody>
+      </p:sp>
+      <p:sp>
+        <p:nvSpPr>
+          <p:cNvPr id="2" name="Titel 1"/>
+          <p:cNvSpPr>
+            <a:spLocks noGrp="1"/>
+          </p:cNvSpPr>
+          <p:nvPr>
+            <p:ph type="title"/>
+          </p:nvPr>
+        </p:nvSpPr>
+        <p:spPr>
+          <a:xfrm>
+            <a:off x="457200" y="274638"/>
+            <a:ext cx="8363272" cy="634082"/>
+          </a:xfrm>
+        </p:spPr>
+        <p:txBody>
+          <a:bodyPr>
+            <a:normAutofit/>
+          </a:bodyPr>
+          <a:lstStyle/>
+          <a:p>
+            <a:pPr algn="l"/>
+            <a:r>
+              <a:rPr lang="de-DE" sz="2000" b="1" dirty="0" smtClean="0">
+                <a:latin typeface="Arial" panose="020B0604020202020204" pitchFamily="34" charset="0"/>
+                <a:cs typeface="Arial" panose="020B0604020202020204" pitchFamily="34" charset="0"/>
+              </a:rPr>
+              <a:t>1. Allgemeines </a:t>
+            </a:r>
+            <a:r>
+              <a:rPr lang="de-DE" sz="2000" dirty="0" smtClean="0">
+                <a:latin typeface="Arial" panose="020B0604020202020204" pitchFamily="34" charset="0"/>
+                <a:cs typeface="Arial" panose="020B0604020202020204" pitchFamily="34" charset="0"/>
+              </a:rPr>
+              <a:t>– Ziel, Durchführung und Analyse der Umfrage</a:t>
+            </a:r>
+            <a:endParaRPr lang="de-DE" sz="2000" dirty="0">
+              <a:latin typeface="Arial" panose="020B0604020202020204" pitchFamily="34" charset="0"/>
+              <a:cs typeface="Arial" panose="020B0604020202020204" pitchFamily="34" charset="0"/>
+            </a:endParaRPr>
+          </a:p>
+        </p:txBody>
+      </p:sp>
+      <p:sp>
+        <p:nvSpPr>
+          <p:cNvPr id="9" name="Rechteck 8"/>
+          <p:cNvSpPr/>
+          <p:nvPr/>
+        </p:nvSpPr>
+        <p:spPr>
+          <a:xfrm>
+            <a:off x="469062" y="3627760"/>
+            <a:ext cx="8208000" cy="1097384"/>
+          </a:xfrm>
+          <a:prstGeom prst="rect">
+            <a:avLst/>
+          </a:prstGeom>
+          <a:solidFill>
+            <a:srgbClr val="3F51B5"/>
+          </a:solidFill>
+          <a:ln>
+            <a:solidFill>
+              <a:srgbClr val="3F51B5"/>
+            </a:solidFill>
+          </a:ln>
+        </p:spPr>
+        <p:style>
+          <a:lnRef idx="2">
+            <a:schemeClr val="accent1">
+              <a:shade val="50000"/>
+            </a:schemeClr>
+          </a:lnRef>
+          <a:fillRef idx="1">
+            <a:schemeClr val="accent1"/>
+          </a:fillRef>
+          <a:effectRef idx="0">
+            <a:schemeClr val="accent1"/>
+          </a:effectRef>
+          <a:fontRef idx="minor">
+            <a:schemeClr val="lt1"/>
+          </a:fontRef>
+        </p:style>
+        <p:txBody>
+          <a:bodyPr rtlCol="0" anchor="ctr"/>
+          <a:lstStyle/>
+          <a:p>
+            <a:pPr algn="just"/>
+            <a:r>
+              <a:rPr lang="de-DE" sz="1600" dirty="0" smtClean="0">
+                <a:solidFill>
+                  <a:schemeClr val="bg1"/>
+                </a:solidFill>
+                <a:latin typeface="Arial" panose="020B0604020202020204" pitchFamily="34" charset="0"/>
+                <a:cs typeface="Arial" panose="020B0604020202020204" pitchFamily="34" charset="0"/>
+              </a:rPr>
+              <a:t>Die Umfrage enthält 25 Fragen, davon 4 zur statistischen Einordnung und gliedert sich in die Teile: Ausgehverhalten, Happy Hours, Route und Informationen zu den Locations. Die Umfrage wurde am 05.12.2014 gestartet und war bis zum 21.12.2014 geöffnet. Die Umfrage wurde über verschiedenen Kanäle verteilt und beworben.</a:t>
+            </a:r>
+            <a:endParaRPr lang="de-DE" sz="1600" dirty="0">
+              <a:latin typeface="Arial" panose="020B0604020202020204" pitchFamily="34" charset="0"/>
+              <a:cs typeface="Arial" panose="020B0604020202020204" pitchFamily="34" charset="0"/>
+            </a:endParaRPr>
+          </a:p>
+        </p:txBody>
+      </p:sp>
+      <p:sp>
+        <p:nvSpPr>
+          <p:cNvPr id="10" name="Rechteck 9"/>
+          <p:cNvSpPr/>
+          <p:nvPr/>
+        </p:nvSpPr>
+        <p:spPr>
+          <a:xfrm>
+            <a:off x="469062" y="5249912"/>
+            <a:ext cx="8208000" cy="936104"/>
+          </a:xfrm>
+          <a:prstGeom prst="rect">
+            <a:avLst/>
+          </a:prstGeom>
+          <a:solidFill>
+            <a:srgbClr val="3F51B5"/>
+          </a:solidFill>
+          <a:ln>
+            <a:solidFill>
+              <a:srgbClr val="3F51B5"/>
+            </a:solidFill>
+          </a:ln>
+        </p:spPr>
+        <p:style>
+          <a:lnRef idx="2">
+            <a:schemeClr val="accent1">
+              <a:shade val="50000"/>
+            </a:schemeClr>
+          </a:lnRef>
+          <a:fillRef idx="1">
+            <a:schemeClr val="accent1"/>
+          </a:fillRef>
+          <a:effectRef idx="0">
+            <a:schemeClr val="accent1"/>
+          </a:effectRef>
+          <a:fontRef idx="minor">
+            <a:schemeClr val="lt1"/>
+          </a:fontRef>
+        </p:style>
+        <p:txBody>
+          <a:bodyPr rtlCol="0" anchor="ctr"/>
+          <a:lstStyle/>
+          <a:p>
+            <a:pPr algn="just"/>
+            <a:r>
+              <a:rPr lang="de-DE" sz="1600" dirty="0">
+                <a:solidFill>
+                  <a:schemeClr val="bg1"/>
+                </a:solidFill>
+                <a:latin typeface="Arial" panose="020B0604020202020204" pitchFamily="34" charset="0"/>
+                <a:cs typeface="Arial" panose="020B0604020202020204" pitchFamily="34" charset="0"/>
+              </a:rPr>
+              <a:t>Bei der Analyse der Umfrage werden zum einen die Basic </a:t>
+            </a:r>
+            <a:r>
+              <a:rPr lang="de-DE" sz="1600" dirty="0" err="1" smtClean="0">
+                <a:solidFill>
+                  <a:schemeClr val="bg1"/>
+                </a:solidFill>
+                <a:latin typeface="Arial" panose="020B0604020202020204" pitchFamily="34" charset="0"/>
+                <a:cs typeface="Arial" panose="020B0604020202020204" pitchFamily="34" charset="0"/>
+              </a:rPr>
+              <a:t>Frequencys</a:t>
+            </a:r>
+            <a:r>
+              <a:rPr lang="de-DE" sz="1600" dirty="0" smtClean="0">
+                <a:solidFill>
+                  <a:schemeClr val="bg1"/>
+                </a:solidFill>
+                <a:latin typeface="Arial" panose="020B0604020202020204" pitchFamily="34" charset="0"/>
+                <a:cs typeface="Arial" panose="020B0604020202020204" pitchFamily="34" charset="0"/>
+              </a:rPr>
+              <a:t> </a:t>
+            </a:r>
+            <a:r>
+              <a:rPr lang="de-DE" sz="1600" dirty="0">
+                <a:solidFill>
+                  <a:schemeClr val="bg1"/>
+                </a:solidFill>
+                <a:latin typeface="Arial" panose="020B0604020202020204" pitchFamily="34" charset="0"/>
+                <a:cs typeface="Arial" panose="020B0604020202020204" pitchFamily="34" charset="0"/>
+              </a:rPr>
+              <a:t>aber auch verschiedenen </a:t>
+            </a:r>
+            <a:r>
+              <a:rPr lang="de-DE" sz="1600" dirty="0" err="1">
+                <a:solidFill>
+                  <a:schemeClr val="bg1"/>
+                </a:solidFill>
+                <a:latin typeface="Arial" panose="020B0604020202020204" pitchFamily="34" charset="0"/>
+                <a:cs typeface="Arial" panose="020B0604020202020204" pitchFamily="34" charset="0"/>
+              </a:rPr>
+              <a:t>Crosstabs</a:t>
+            </a:r>
+            <a:r>
+              <a:rPr lang="de-DE" sz="1600" dirty="0">
+                <a:solidFill>
+                  <a:schemeClr val="bg1"/>
+                </a:solidFill>
+                <a:latin typeface="Arial" panose="020B0604020202020204" pitchFamily="34" charset="0"/>
+                <a:cs typeface="Arial" panose="020B0604020202020204" pitchFamily="34" charset="0"/>
+              </a:rPr>
+              <a:t> </a:t>
+            </a:r>
+            <a:r>
+              <a:rPr lang="de-DE" sz="1600" dirty="0" smtClean="0">
+                <a:solidFill>
+                  <a:schemeClr val="bg1"/>
+                </a:solidFill>
+                <a:latin typeface="Arial" panose="020B0604020202020204" pitchFamily="34" charset="0"/>
+                <a:cs typeface="Arial" panose="020B0604020202020204" pitchFamily="34" charset="0"/>
+              </a:rPr>
+              <a:t>der Fragen betrachtet. Die Analyse wurde mit Hilfe von Microsoft Excel 2010 und SPSS 20 durchgeführt.</a:t>
+            </a:r>
+            <a:endParaRPr lang="de-DE" sz="1600" dirty="0">
+              <a:latin typeface="Arial" panose="020B0604020202020204" pitchFamily="34" charset="0"/>
+              <a:cs typeface="Arial" panose="020B0604020202020204" pitchFamily="34" charset="0"/>
+            </a:endParaRPr>
+          </a:p>
+        </p:txBody>
+      </p:sp>
+      <p:sp>
+        <p:nvSpPr>
+          <p:cNvPr id="7" name="Textfeld 6"/>
+          <p:cNvSpPr txBox="1"/>
+          <p:nvPr/>
+        </p:nvSpPr>
+        <p:spPr>
+          <a:xfrm>
+            <a:off x="380162" y="1164997"/>
+            <a:ext cx="625492" cy="400110"/>
+          </a:xfrm>
+          <a:prstGeom prst="rect">
+            <a:avLst/>
+          </a:prstGeom>
+          <a:noFill/>
+        </p:spPr>
+        <p:txBody>
+          <a:bodyPr wrap="none" rtlCol="0">
+            <a:spAutoFit/>
+          </a:bodyPr>
+          <a:lstStyle/>
+          <a:p>
+            <a:r>
+              <a:rPr lang="de-DE" sz="2000" b="1" dirty="0" smtClean="0">
+                <a:latin typeface="Arial" panose="020B0604020202020204" pitchFamily="34" charset="0"/>
+                <a:cs typeface="Arial" panose="020B0604020202020204" pitchFamily="34" charset="0"/>
+              </a:rPr>
+              <a:t>Ziel</a:t>
+            </a:r>
+            <a:endParaRPr lang="de-DE" sz="2000" b="1" dirty="0">
+              <a:latin typeface="Arial" panose="020B0604020202020204" pitchFamily="34" charset="0"/>
+              <a:cs typeface="Arial" panose="020B0604020202020204" pitchFamily="34" charset="0"/>
+            </a:endParaRPr>
+          </a:p>
+        </p:txBody>
+      </p:sp>
+      <p:sp>
+        <p:nvSpPr>
+          <p:cNvPr id="12" name="Textfeld 11"/>
+          <p:cNvSpPr txBox="1"/>
+          <p:nvPr/>
+        </p:nvSpPr>
+        <p:spPr>
+          <a:xfrm>
+            <a:off x="367462" y="3271902"/>
+            <a:ext cx="1896673" cy="400110"/>
+          </a:xfrm>
+          <a:prstGeom prst="rect">
+            <a:avLst/>
+          </a:prstGeom>
+          <a:noFill/>
+        </p:spPr>
+        <p:txBody>
+          <a:bodyPr wrap="none" rtlCol="0">
+            <a:spAutoFit/>
+          </a:bodyPr>
+          <a:lstStyle/>
+          <a:p>
+            <a:r>
+              <a:rPr lang="de-DE" sz="2000" b="1" dirty="0" smtClean="0">
+                <a:latin typeface="Arial" panose="020B0604020202020204" pitchFamily="34" charset="0"/>
+                <a:cs typeface="Arial" panose="020B0604020202020204" pitchFamily="34" charset="0"/>
+              </a:rPr>
+              <a:t>Durchführung</a:t>
+            </a:r>
+            <a:endParaRPr lang="de-DE" sz="2000" b="1" dirty="0">
+              <a:latin typeface="Arial" panose="020B0604020202020204" pitchFamily="34" charset="0"/>
+              <a:cs typeface="Arial" panose="020B0604020202020204" pitchFamily="34" charset="0"/>
+            </a:endParaRPr>
+          </a:p>
+        </p:txBody>
+      </p:sp>
+      <p:sp>
+        <p:nvSpPr>
+          <p:cNvPr id="13" name="Textfeld 12"/>
+          <p:cNvSpPr txBox="1"/>
+          <p:nvPr/>
+        </p:nvSpPr>
+        <p:spPr>
+          <a:xfrm>
+            <a:off x="392861" y="4875202"/>
+            <a:ext cx="1168910" cy="400110"/>
+          </a:xfrm>
+          <a:prstGeom prst="rect">
+            <a:avLst/>
+          </a:prstGeom>
+          <a:noFill/>
+        </p:spPr>
+        <p:txBody>
+          <a:bodyPr wrap="none" rtlCol="0">
+            <a:spAutoFit/>
+          </a:bodyPr>
+          <a:lstStyle/>
+          <a:p>
+            <a:r>
+              <a:rPr lang="de-DE" sz="2000" b="1" dirty="0" smtClean="0">
+                <a:latin typeface="Arial" panose="020B0604020202020204" pitchFamily="34" charset="0"/>
+                <a:cs typeface="Arial" panose="020B0604020202020204" pitchFamily="34" charset="0"/>
+              </a:rPr>
+              <a:t>Analyse</a:t>
+            </a:r>
+            <a:endParaRPr lang="de-DE" sz="2000" b="1" dirty="0">
+              <a:latin typeface="Arial" panose="020B0604020202020204" pitchFamily="34" charset="0"/>
+              <a:cs typeface="Arial" panose="020B0604020202020204" pitchFamily="34" charset="0"/>
+            </a:endParaRPr>
+          </a:p>
+        </p:txBody>
+      </p:sp>
+      <p:sp>
+        <p:nvSpPr>
+          <p:cNvPr id="11" name="Foliennummernplatzhalter 10"/>
+          <p:cNvSpPr>
+            <a:spLocks noGrp="1"/>
+          </p:cNvSpPr>
+          <p:nvPr>
+            <p:ph type="sldNum" sz="quarter" idx="12"/>
+          </p:nvPr>
+        </p:nvSpPr>
+        <p:spPr/>
+        <p:txBody>
+          <a:bodyPr/>
+          <a:lstStyle/>
+          <a:p>
+            <a:fld id="{6C6AE60A-B69C-4790-82F7-3882EDF23186}" type="slidenum">
+              <a:rPr lang="de-DE" smtClean="0"/>
+              <a:t>3</a:t>
+            </a:fld>
+            <a:endParaRPr lang="de-DE"/>
+          </a:p>
+        </p:txBody>
+      </p:sp>
+    </p:spTree>
+    <p:extLst>
+      <p:ext uri="{BB962C8B-B14F-4D97-AF65-F5344CB8AC3E}">
+        <p14:creationId xmlns:p14="http://schemas.microsoft.com/office/powerpoint/2010/main" val="567722494"/>
+      </p:ext>
+    </p:extLst>
+  </p:cSld>
+  <p:clrMapOvr>
+    <a:masterClrMapping/>
+  </p:clrMapOvr>
+  <p:timing>
+    <p:tnLst>
+      <p:par>
+        <p:cTn id="1" dur="indefinite" restart="never" nodeType="tmRoot"/>
+      </p:par>
+    </p:tnLst>
+  </p:timing>
+</p:sld>
+</file>
+
+<file path=ppt/slides/slide30.xml><?xml version="1.0" encoding="utf-8"?>
 <p:sld xmlns:a="http://schemas.openxmlformats.org/drawingml/2006/main" xmlns:r="http://schemas.openxmlformats.org/officeDocument/2006/relationships" xmlns:p="http://schemas.openxmlformats.org/presentationml/2006/main">
   <p:cSld>
     <p:spTree>
@@ -23129,7 +25436,7 @@
           <a:p>
             <a:fld id="{6C6AE60A-B69C-4790-82F7-3882EDF23186}" type="slidenum">
               <a:rPr lang="de-DE" smtClean="0"/>
-              <a:t>28</a:t>
+              <a:t>30</a:t>
             </a:fld>
             <a:endParaRPr lang="de-DE"/>
           </a:p>
@@ -23155,7 +25462,7 @@
 </p:sld>
 </file>
 
-<file path=ppt/slides/slide29.xml><?xml version="1.0" encoding="utf-8"?>
+<file path=ppt/slides/slide31.xml><?xml version="1.0" encoding="utf-8"?>
 <p:sld xmlns:a="http://schemas.openxmlformats.org/drawingml/2006/main" xmlns:r="http://schemas.openxmlformats.org/officeDocument/2006/relationships" xmlns:p="http://schemas.openxmlformats.org/presentationml/2006/main">
   <p:cSld>
     <p:spTree>
@@ -23716,7 +26023,7 @@
           <a:p>
             <a:fld id="{6C6AE60A-B69C-4790-82F7-3882EDF23186}" type="slidenum">
               <a:rPr lang="de-DE" smtClean="0"/>
-              <a:t>29</a:t>
+              <a:t>31</a:t>
             </a:fld>
             <a:endParaRPr lang="de-DE"/>
           </a:p>
@@ -24224,592 +26531,7 @@
 </p:sld>
 </file>
 
-<file path=ppt/slides/slide3.xml><?xml version="1.0" encoding="utf-8"?>
-<p:sld xmlns:a="http://schemas.openxmlformats.org/drawingml/2006/main" xmlns:r="http://schemas.openxmlformats.org/officeDocument/2006/relationships" xmlns:p="http://schemas.openxmlformats.org/presentationml/2006/main">
-  <p:cSld>
-    <p:spTree>
-      <p:nvGrpSpPr>
-        <p:cNvPr id="1" name=""/>
-        <p:cNvGrpSpPr/>
-        <p:nvPr/>
-      </p:nvGrpSpPr>
-      <p:grpSpPr>
-        <a:xfrm>
-          <a:off x="0" y="0"/>
-          <a:ext cx="0" cy="0"/>
-          <a:chOff x="0" y="0"/>
-          <a:chExt cx="0" cy="0"/>
-        </a:xfrm>
-      </p:grpSpPr>
-      <p:sp>
-        <p:nvSpPr>
-          <p:cNvPr id="8" name="Rechteck 7"/>
-          <p:cNvSpPr/>
-          <p:nvPr/>
-        </p:nvSpPr>
-        <p:spPr>
-          <a:xfrm>
-            <a:off x="469062" y="1512094"/>
-            <a:ext cx="8208000" cy="1577826"/>
-          </a:xfrm>
-          <a:prstGeom prst="rect">
-            <a:avLst/>
-          </a:prstGeom>
-          <a:solidFill>
-            <a:srgbClr val="3F51B5"/>
-          </a:solidFill>
-          <a:ln>
-            <a:solidFill>
-              <a:srgbClr val="3F51B5"/>
-            </a:solidFill>
-          </a:ln>
-        </p:spPr>
-        <p:style>
-          <a:lnRef idx="2">
-            <a:schemeClr val="accent1">
-              <a:shade val="50000"/>
-            </a:schemeClr>
-          </a:lnRef>
-          <a:fillRef idx="1">
-            <a:schemeClr val="accent1"/>
-          </a:fillRef>
-          <a:effectRef idx="0">
-            <a:schemeClr val="accent1"/>
-          </a:effectRef>
-          <a:fontRef idx="minor">
-            <a:schemeClr val="lt1"/>
-          </a:fontRef>
-        </p:style>
-        <p:txBody>
-          <a:bodyPr rtlCol="0" anchor="ctr"/>
-          <a:lstStyle/>
-          <a:p>
-            <a:pPr algn="just"/>
-            <a:r>
-              <a:rPr lang="de-DE" sz="1600" dirty="0">
-                <a:solidFill>
-                  <a:schemeClr val="bg1"/>
-                </a:solidFill>
-                <a:latin typeface="Arial" panose="020B0604020202020204" pitchFamily="34" charset="0"/>
-                <a:cs typeface="Arial" panose="020B0604020202020204" pitchFamily="34" charset="0"/>
-              </a:rPr>
-              <a:t>Ziel </a:t>
-            </a:r>
-            <a:r>
-              <a:rPr lang="de-DE" sz="1600" dirty="0" smtClean="0">
-                <a:solidFill>
-                  <a:schemeClr val="bg1"/>
-                </a:solidFill>
-                <a:latin typeface="Arial" panose="020B0604020202020204" pitchFamily="34" charset="0"/>
-                <a:cs typeface="Arial" panose="020B0604020202020204" pitchFamily="34" charset="0"/>
-              </a:rPr>
-              <a:t>dieser Umfrage ist es einen Überblick über den potentiellen Markt für „Go Happy“ zu bekommen. </a:t>
-            </a:r>
-            <a:r>
-              <a:rPr lang="de-DE" sz="1600" dirty="0">
-                <a:solidFill>
-                  <a:schemeClr val="bg1"/>
-                </a:solidFill>
-                <a:latin typeface="Arial" panose="020B0604020202020204" pitchFamily="34" charset="0"/>
-                <a:cs typeface="Arial" panose="020B0604020202020204" pitchFamily="34" charset="0"/>
-              </a:rPr>
-              <a:t>Bei der Auswertung der Umfrage sind zwei Aspekte ausschlaggebend. Zum einen sollen Impulse zur Erstellung der Web-Applikationen gewonnen werden </a:t>
-            </a:r>
-            <a:r>
-              <a:rPr lang="de-DE" sz="1600" dirty="0" smtClean="0">
-                <a:solidFill>
-                  <a:schemeClr val="bg1"/>
-                </a:solidFill>
-                <a:latin typeface="Arial" panose="020B0604020202020204" pitchFamily="34" charset="0"/>
-                <a:cs typeface="Arial" panose="020B0604020202020204" pitchFamily="34" charset="0"/>
-              </a:rPr>
-              <a:t>(z.B. Funktionen, </a:t>
-            </a:r>
-            <a:r>
-              <a:rPr lang="de-DE" sz="1600" dirty="0">
-                <a:solidFill>
-                  <a:schemeClr val="bg1"/>
-                </a:solidFill>
-                <a:latin typeface="Arial" panose="020B0604020202020204" pitchFamily="34" charset="0"/>
-                <a:cs typeface="Arial" panose="020B0604020202020204" pitchFamily="34" charset="0"/>
-              </a:rPr>
-              <a:t>etc. die </a:t>
-            </a:r>
-            <a:r>
-              <a:rPr lang="de-DE" sz="1600" dirty="0" smtClean="0">
-                <a:solidFill>
-                  <a:schemeClr val="bg1"/>
-                </a:solidFill>
-                <a:latin typeface="Arial" panose="020B0604020202020204" pitchFamily="34" charset="0"/>
-                <a:cs typeface="Arial" panose="020B0604020202020204" pitchFamily="34" charset="0"/>
-              </a:rPr>
-              <a:t>sich unsere </a:t>
-            </a:r>
-            <a:r>
-              <a:rPr lang="de-DE" sz="1600" dirty="0">
-                <a:solidFill>
-                  <a:schemeClr val="bg1"/>
-                </a:solidFill>
-                <a:latin typeface="Arial" panose="020B0604020202020204" pitchFamily="34" charset="0"/>
-                <a:cs typeface="Arial" panose="020B0604020202020204" pitchFamily="34" charset="0"/>
-              </a:rPr>
-              <a:t>Zielgruppe </a:t>
-            </a:r>
-            <a:r>
-              <a:rPr lang="de-DE" sz="1600" dirty="0" smtClean="0">
-                <a:solidFill>
-                  <a:schemeClr val="bg1"/>
-                </a:solidFill>
-                <a:latin typeface="Arial" panose="020B0604020202020204" pitchFamily="34" charset="0"/>
-                <a:cs typeface="Arial" panose="020B0604020202020204" pitchFamily="34" charset="0"/>
-              </a:rPr>
-              <a:t>vorstellt) </a:t>
-            </a:r>
-            <a:r>
-              <a:rPr lang="de-DE" sz="1600" dirty="0">
-                <a:solidFill>
-                  <a:schemeClr val="bg1"/>
-                </a:solidFill>
-                <a:latin typeface="Arial" panose="020B0604020202020204" pitchFamily="34" charset="0"/>
-                <a:cs typeface="Arial" panose="020B0604020202020204" pitchFamily="34" charset="0"/>
-              </a:rPr>
-              <a:t>und zum anderen sollen die Ergebnisse zielführend bei den </a:t>
-            </a:r>
-            <a:r>
-              <a:rPr lang="de-DE" sz="1600" dirty="0" smtClean="0">
-                <a:solidFill>
-                  <a:schemeClr val="bg1"/>
-                </a:solidFill>
-                <a:latin typeface="Arial" panose="020B0604020202020204" pitchFamily="34" charset="0"/>
-                <a:cs typeface="Arial" panose="020B0604020202020204" pitchFamily="34" charset="0"/>
-              </a:rPr>
-              <a:t>zu entwickelnden Marketingstrategien </a:t>
-            </a:r>
-            <a:r>
-              <a:rPr lang="de-DE" sz="1600" dirty="0">
-                <a:solidFill>
-                  <a:schemeClr val="bg1"/>
-                </a:solidFill>
-                <a:latin typeface="Arial" panose="020B0604020202020204" pitchFamily="34" charset="0"/>
-                <a:cs typeface="Arial" panose="020B0604020202020204" pitchFamily="34" charset="0"/>
-              </a:rPr>
-              <a:t>beachtet werden </a:t>
-            </a:r>
-            <a:r>
-              <a:rPr lang="de-DE" sz="1600" dirty="0" smtClean="0">
-                <a:solidFill>
-                  <a:schemeClr val="bg1"/>
-                </a:solidFill>
-                <a:latin typeface="Arial" panose="020B0604020202020204" pitchFamily="34" charset="0"/>
-                <a:cs typeface="Arial" panose="020B0604020202020204" pitchFamily="34" charset="0"/>
-              </a:rPr>
-              <a:t>(Art der Werbung, </a:t>
-            </a:r>
-            <a:r>
-              <a:rPr lang="de-DE" sz="1600" dirty="0">
-                <a:solidFill>
-                  <a:schemeClr val="bg1"/>
-                </a:solidFill>
-                <a:latin typeface="Arial" panose="020B0604020202020204" pitchFamily="34" charset="0"/>
-                <a:cs typeface="Arial" panose="020B0604020202020204" pitchFamily="34" charset="0"/>
-              </a:rPr>
-              <a:t>etc</a:t>
-            </a:r>
-            <a:r>
-              <a:rPr lang="de-DE" sz="1600" dirty="0" smtClean="0">
-                <a:solidFill>
-                  <a:schemeClr val="bg1"/>
-                </a:solidFill>
-                <a:latin typeface="Arial" panose="020B0604020202020204" pitchFamily="34" charset="0"/>
-                <a:cs typeface="Arial" panose="020B0604020202020204" pitchFamily="34" charset="0"/>
-              </a:rPr>
-              <a:t>.).</a:t>
-            </a:r>
-            <a:endParaRPr lang="de-DE" sz="1600" dirty="0">
-              <a:latin typeface="Arial" panose="020B0604020202020204" pitchFamily="34" charset="0"/>
-              <a:cs typeface="Arial" panose="020B0604020202020204" pitchFamily="34" charset="0"/>
-            </a:endParaRPr>
-          </a:p>
-        </p:txBody>
-      </p:sp>
-      <p:sp>
-        <p:nvSpPr>
-          <p:cNvPr id="2" name="Titel 1"/>
-          <p:cNvSpPr>
-            <a:spLocks noGrp="1"/>
-          </p:cNvSpPr>
-          <p:nvPr>
-            <p:ph type="title"/>
-          </p:nvPr>
-        </p:nvSpPr>
-        <p:spPr>
-          <a:xfrm>
-            <a:off x="457200" y="274638"/>
-            <a:ext cx="8363272" cy="634082"/>
-          </a:xfrm>
-        </p:spPr>
-        <p:txBody>
-          <a:bodyPr>
-            <a:normAutofit/>
-          </a:bodyPr>
-          <a:lstStyle/>
-          <a:p>
-            <a:pPr algn="l"/>
-            <a:r>
-              <a:rPr lang="de-DE" sz="2000" b="1" dirty="0" smtClean="0">
-                <a:latin typeface="Arial" panose="020B0604020202020204" pitchFamily="34" charset="0"/>
-                <a:cs typeface="Arial" panose="020B0604020202020204" pitchFamily="34" charset="0"/>
-              </a:rPr>
-              <a:t>1. Allgemeines </a:t>
-            </a:r>
-            <a:r>
-              <a:rPr lang="de-DE" sz="2000" dirty="0" smtClean="0">
-                <a:latin typeface="Arial" panose="020B0604020202020204" pitchFamily="34" charset="0"/>
-                <a:cs typeface="Arial" panose="020B0604020202020204" pitchFamily="34" charset="0"/>
-              </a:rPr>
-              <a:t>– Ziel, Durchführung und Analyse der Umfrage</a:t>
-            </a:r>
-            <a:endParaRPr lang="de-DE" sz="2000" dirty="0">
-              <a:latin typeface="Arial" panose="020B0604020202020204" pitchFamily="34" charset="0"/>
-              <a:cs typeface="Arial" panose="020B0604020202020204" pitchFamily="34" charset="0"/>
-            </a:endParaRPr>
-          </a:p>
-        </p:txBody>
-      </p:sp>
-      <p:sp>
-        <p:nvSpPr>
-          <p:cNvPr id="9" name="Rechteck 8"/>
-          <p:cNvSpPr/>
-          <p:nvPr/>
-        </p:nvSpPr>
-        <p:spPr>
-          <a:xfrm>
-            <a:off x="469062" y="3627760"/>
-            <a:ext cx="8208000" cy="1097384"/>
-          </a:xfrm>
-          <a:prstGeom prst="rect">
-            <a:avLst/>
-          </a:prstGeom>
-          <a:solidFill>
-            <a:srgbClr val="3F51B5"/>
-          </a:solidFill>
-          <a:ln>
-            <a:solidFill>
-              <a:srgbClr val="3F51B5"/>
-            </a:solidFill>
-          </a:ln>
-        </p:spPr>
-        <p:style>
-          <a:lnRef idx="2">
-            <a:schemeClr val="accent1">
-              <a:shade val="50000"/>
-            </a:schemeClr>
-          </a:lnRef>
-          <a:fillRef idx="1">
-            <a:schemeClr val="accent1"/>
-          </a:fillRef>
-          <a:effectRef idx="0">
-            <a:schemeClr val="accent1"/>
-          </a:effectRef>
-          <a:fontRef idx="minor">
-            <a:schemeClr val="lt1"/>
-          </a:fontRef>
-        </p:style>
-        <p:txBody>
-          <a:bodyPr rtlCol="0" anchor="ctr"/>
-          <a:lstStyle/>
-          <a:p>
-            <a:pPr algn="just"/>
-            <a:r>
-              <a:rPr lang="de-DE" sz="1600" dirty="0" smtClean="0">
-                <a:solidFill>
-                  <a:schemeClr val="bg1"/>
-                </a:solidFill>
-                <a:latin typeface="Arial" panose="020B0604020202020204" pitchFamily="34" charset="0"/>
-                <a:cs typeface="Arial" panose="020B0604020202020204" pitchFamily="34" charset="0"/>
-              </a:rPr>
-              <a:t>Die Umfrage enthält 25 Fragen, davon 4 zur statistischen Einordnung und gliedert sich in die Teile: Ausgehverhalten, Happy Hours, Route und Informationen zu den Locations. Die Umfrage wurde am 05.12.2014 gestartet und war bis zum 21.12.2014 geöffnet. Die Umfrage wurde über verschiedenen Kanäle verteilt und beworben.</a:t>
-            </a:r>
-            <a:endParaRPr lang="de-DE" sz="1600" dirty="0">
-              <a:latin typeface="Arial" panose="020B0604020202020204" pitchFamily="34" charset="0"/>
-              <a:cs typeface="Arial" panose="020B0604020202020204" pitchFamily="34" charset="0"/>
-            </a:endParaRPr>
-          </a:p>
-        </p:txBody>
-      </p:sp>
-      <p:sp>
-        <p:nvSpPr>
-          <p:cNvPr id="10" name="Rechteck 9"/>
-          <p:cNvSpPr/>
-          <p:nvPr/>
-        </p:nvSpPr>
-        <p:spPr>
-          <a:xfrm>
-            <a:off x="469062" y="5249912"/>
-            <a:ext cx="8208000" cy="936104"/>
-          </a:xfrm>
-          <a:prstGeom prst="rect">
-            <a:avLst/>
-          </a:prstGeom>
-          <a:solidFill>
-            <a:srgbClr val="3F51B5"/>
-          </a:solidFill>
-          <a:ln>
-            <a:solidFill>
-              <a:srgbClr val="3F51B5"/>
-            </a:solidFill>
-          </a:ln>
-        </p:spPr>
-        <p:style>
-          <a:lnRef idx="2">
-            <a:schemeClr val="accent1">
-              <a:shade val="50000"/>
-            </a:schemeClr>
-          </a:lnRef>
-          <a:fillRef idx="1">
-            <a:schemeClr val="accent1"/>
-          </a:fillRef>
-          <a:effectRef idx="0">
-            <a:schemeClr val="accent1"/>
-          </a:effectRef>
-          <a:fontRef idx="minor">
-            <a:schemeClr val="lt1"/>
-          </a:fontRef>
-        </p:style>
-        <p:txBody>
-          <a:bodyPr rtlCol="0" anchor="ctr"/>
-          <a:lstStyle/>
-          <a:p>
-            <a:pPr algn="just"/>
-            <a:r>
-              <a:rPr lang="de-DE" sz="1600" dirty="0">
-                <a:solidFill>
-                  <a:schemeClr val="bg1"/>
-                </a:solidFill>
-                <a:latin typeface="Arial" panose="020B0604020202020204" pitchFamily="34" charset="0"/>
-                <a:cs typeface="Arial" panose="020B0604020202020204" pitchFamily="34" charset="0"/>
-              </a:rPr>
-              <a:t>Bei der Analyse der Umfrage werden zum einen die Basic </a:t>
-            </a:r>
-            <a:r>
-              <a:rPr lang="de-DE" sz="1600" dirty="0" err="1" smtClean="0">
-                <a:solidFill>
-                  <a:schemeClr val="bg1"/>
-                </a:solidFill>
-                <a:latin typeface="Arial" panose="020B0604020202020204" pitchFamily="34" charset="0"/>
-                <a:cs typeface="Arial" panose="020B0604020202020204" pitchFamily="34" charset="0"/>
-              </a:rPr>
-              <a:t>Frequencys</a:t>
-            </a:r>
-            <a:r>
-              <a:rPr lang="de-DE" sz="1600" dirty="0" smtClean="0">
-                <a:solidFill>
-                  <a:schemeClr val="bg1"/>
-                </a:solidFill>
-                <a:latin typeface="Arial" panose="020B0604020202020204" pitchFamily="34" charset="0"/>
-                <a:cs typeface="Arial" panose="020B0604020202020204" pitchFamily="34" charset="0"/>
-              </a:rPr>
-              <a:t> </a:t>
-            </a:r>
-            <a:r>
-              <a:rPr lang="de-DE" sz="1600" dirty="0">
-                <a:solidFill>
-                  <a:schemeClr val="bg1"/>
-                </a:solidFill>
-                <a:latin typeface="Arial" panose="020B0604020202020204" pitchFamily="34" charset="0"/>
-                <a:cs typeface="Arial" panose="020B0604020202020204" pitchFamily="34" charset="0"/>
-              </a:rPr>
-              <a:t>aber auch verschiedenen </a:t>
-            </a:r>
-            <a:r>
-              <a:rPr lang="de-DE" sz="1600" dirty="0" err="1">
-                <a:solidFill>
-                  <a:schemeClr val="bg1"/>
-                </a:solidFill>
-                <a:latin typeface="Arial" panose="020B0604020202020204" pitchFamily="34" charset="0"/>
-                <a:cs typeface="Arial" panose="020B0604020202020204" pitchFamily="34" charset="0"/>
-              </a:rPr>
-              <a:t>Crosstabs</a:t>
-            </a:r>
-            <a:r>
-              <a:rPr lang="de-DE" sz="1600" dirty="0">
-                <a:solidFill>
-                  <a:schemeClr val="bg1"/>
-                </a:solidFill>
-                <a:latin typeface="Arial" panose="020B0604020202020204" pitchFamily="34" charset="0"/>
-                <a:cs typeface="Arial" panose="020B0604020202020204" pitchFamily="34" charset="0"/>
-              </a:rPr>
-              <a:t> </a:t>
-            </a:r>
-            <a:r>
-              <a:rPr lang="de-DE" sz="1600" dirty="0" smtClean="0">
-                <a:solidFill>
-                  <a:schemeClr val="bg1"/>
-                </a:solidFill>
-                <a:latin typeface="Arial" panose="020B0604020202020204" pitchFamily="34" charset="0"/>
-                <a:cs typeface="Arial" panose="020B0604020202020204" pitchFamily="34" charset="0"/>
-              </a:rPr>
-              <a:t>der Fragen betrachtet. Die Analyse wurde mit Hilfe von Microsoft Excel 2010 und SPSS 20 durchgeführt.</a:t>
-            </a:r>
-            <a:endParaRPr lang="de-DE" sz="1600" dirty="0">
-              <a:latin typeface="Arial" panose="020B0604020202020204" pitchFamily="34" charset="0"/>
-              <a:cs typeface="Arial" panose="020B0604020202020204" pitchFamily="34" charset="0"/>
-            </a:endParaRPr>
-          </a:p>
-        </p:txBody>
-      </p:sp>
-      <p:sp>
-        <p:nvSpPr>
-          <p:cNvPr id="7" name="Textfeld 6"/>
-          <p:cNvSpPr txBox="1"/>
-          <p:nvPr/>
-        </p:nvSpPr>
-        <p:spPr>
-          <a:xfrm>
-            <a:off x="380162" y="1164997"/>
-            <a:ext cx="625492" cy="400110"/>
-          </a:xfrm>
-          <a:prstGeom prst="rect">
-            <a:avLst/>
-          </a:prstGeom>
-          <a:noFill/>
-        </p:spPr>
-        <p:txBody>
-          <a:bodyPr wrap="none" rtlCol="0">
-            <a:spAutoFit/>
-          </a:bodyPr>
-          <a:lstStyle/>
-          <a:p>
-            <a:r>
-              <a:rPr lang="de-DE" sz="2000" b="1" dirty="0" smtClean="0">
-                <a:latin typeface="Arial" panose="020B0604020202020204" pitchFamily="34" charset="0"/>
-                <a:cs typeface="Arial" panose="020B0604020202020204" pitchFamily="34" charset="0"/>
-              </a:rPr>
-              <a:t>Ziel</a:t>
-            </a:r>
-            <a:endParaRPr lang="de-DE" sz="2000" b="1" dirty="0">
-              <a:latin typeface="Arial" panose="020B0604020202020204" pitchFamily="34" charset="0"/>
-              <a:cs typeface="Arial" panose="020B0604020202020204" pitchFamily="34" charset="0"/>
-            </a:endParaRPr>
-          </a:p>
-        </p:txBody>
-      </p:sp>
-      <p:sp>
-        <p:nvSpPr>
-          <p:cNvPr id="12" name="Textfeld 11"/>
-          <p:cNvSpPr txBox="1"/>
-          <p:nvPr/>
-        </p:nvSpPr>
-        <p:spPr>
-          <a:xfrm>
-            <a:off x="367462" y="3271902"/>
-            <a:ext cx="1896673" cy="400110"/>
-          </a:xfrm>
-          <a:prstGeom prst="rect">
-            <a:avLst/>
-          </a:prstGeom>
-          <a:noFill/>
-        </p:spPr>
-        <p:txBody>
-          <a:bodyPr wrap="none" rtlCol="0">
-            <a:spAutoFit/>
-          </a:bodyPr>
-          <a:lstStyle/>
-          <a:p>
-            <a:r>
-              <a:rPr lang="de-DE" sz="2000" b="1" dirty="0" smtClean="0">
-                <a:latin typeface="Arial" panose="020B0604020202020204" pitchFamily="34" charset="0"/>
-                <a:cs typeface="Arial" panose="020B0604020202020204" pitchFamily="34" charset="0"/>
-              </a:rPr>
-              <a:t>Durchführung</a:t>
-            </a:r>
-            <a:endParaRPr lang="de-DE" sz="2000" b="1" dirty="0">
-              <a:latin typeface="Arial" panose="020B0604020202020204" pitchFamily="34" charset="0"/>
-              <a:cs typeface="Arial" panose="020B0604020202020204" pitchFamily="34" charset="0"/>
-            </a:endParaRPr>
-          </a:p>
-        </p:txBody>
-      </p:sp>
-      <p:sp>
-        <p:nvSpPr>
-          <p:cNvPr id="13" name="Textfeld 12"/>
-          <p:cNvSpPr txBox="1"/>
-          <p:nvPr/>
-        </p:nvSpPr>
-        <p:spPr>
-          <a:xfrm>
-            <a:off x="392861" y="4875202"/>
-            <a:ext cx="1168910" cy="400110"/>
-          </a:xfrm>
-          <a:prstGeom prst="rect">
-            <a:avLst/>
-          </a:prstGeom>
-          <a:noFill/>
-        </p:spPr>
-        <p:txBody>
-          <a:bodyPr wrap="none" rtlCol="0">
-            <a:spAutoFit/>
-          </a:bodyPr>
-          <a:lstStyle/>
-          <a:p>
-            <a:r>
-              <a:rPr lang="de-DE" sz="2000" b="1" dirty="0" smtClean="0">
-                <a:latin typeface="Arial" panose="020B0604020202020204" pitchFamily="34" charset="0"/>
-                <a:cs typeface="Arial" panose="020B0604020202020204" pitchFamily="34" charset="0"/>
-              </a:rPr>
-              <a:t>Analyse</a:t>
-            </a:r>
-            <a:endParaRPr lang="de-DE" sz="2000" b="1" dirty="0">
-              <a:latin typeface="Arial" panose="020B0604020202020204" pitchFamily="34" charset="0"/>
-              <a:cs typeface="Arial" panose="020B0604020202020204" pitchFamily="34" charset="0"/>
-            </a:endParaRPr>
-          </a:p>
-        </p:txBody>
-      </p:sp>
-      <p:sp>
-        <p:nvSpPr>
-          <p:cNvPr id="11" name="Foliennummernplatzhalter 10"/>
-          <p:cNvSpPr>
-            <a:spLocks noGrp="1"/>
-          </p:cNvSpPr>
-          <p:nvPr>
-            <p:ph type="sldNum" sz="quarter" idx="12"/>
-          </p:nvPr>
-        </p:nvSpPr>
-        <p:spPr/>
-        <p:txBody>
-          <a:bodyPr/>
-          <a:lstStyle/>
-          <a:p>
-            <a:fld id="{6C6AE60A-B69C-4790-82F7-3882EDF23186}" type="slidenum">
-              <a:rPr lang="de-DE" smtClean="0"/>
-              <a:t>3</a:t>
-            </a:fld>
-            <a:endParaRPr lang="de-DE"/>
-          </a:p>
-        </p:txBody>
-      </p:sp>
-    </p:spTree>
-    <p:extLst>
-      <p:ext uri="{BB962C8B-B14F-4D97-AF65-F5344CB8AC3E}">
-        <p14:creationId xmlns:p14="http://schemas.microsoft.com/office/powerpoint/2010/main" val="567722494"/>
-      </p:ext>
-    </p:extLst>
-  </p:cSld>
-  <p:clrMapOvr>
-    <a:masterClrMapping/>
-  </p:clrMapOvr>
-  <p:timing>
-    <p:tnLst>
-      <p:par>
-        <p:cTn id="1" dur="indefinite" restart="never" nodeType="tmRoot"/>
-      </p:par>
-    </p:tnLst>
-  </p:timing>
-</p:sld>
-</file>
-
-<file path=ppt/slides/slide30.xml><?xml version="1.0" encoding="utf-8"?>
+<file path=ppt/slides/slide32.xml><?xml version="1.0" encoding="utf-8"?>
 <p:sld xmlns:a="http://schemas.openxmlformats.org/drawingml/2006/main" xmlns:r="http://schemas.openxmlformats.org/officeDocument/2006/relationships" xmlns:p="http://schemas.openxmlformats.org/presentationml/2006/main">
   <p:cSld>
     <p:spTree>
@@ -25380,7 +27102,7 @@
           <a:p>
             <a:fld id="{6C6AE60A-B69C-4790-82F7-3882EDF23186}" type="slidenum">
               <a:rPr lang="de-DE" smtClean="0"/>
-              <a:t>30</a:t>
+              <a:t>32</a:t>
             </a:fld>
             <a:endParaRPr lang="de-DE"/>
           </a:p>
@@ -25466,7 +27188,7 @@
 </p:sld>
 </file>
 
-<file path=ppt/slides/slide31.xml><?xml version="1.0" encoding="utf-8"?>
+<file path=ppt/slides/slide33.xml><?xml version="1.0" encoding="utf-8"?>
 <p:sld xmlns:a="http://schemas.openxmlformats.org/drawingml/2006/main" xmlns:r="http://schemas.openxmlformats.org/officeDocument/2006/relationships" xmlns:p="http://schemas.openxmlformats.org/presentationml/2006/main">
   <p:cSld>
     <p:spTree>
@@ -25991,7 +27713,7 @@
           <a:p>
             <a:fld id="{6C6AE60A-B69C-4790-82F7-3882EDF23186}" type="slidenum">
               <a:rPr lang="de-DE" smtClean="0"/>
-              <a:t>31</a:t>
+              <a:t>33</a:t>
             </a:fld>
             <a:endParaRPr lang="de-DE"/>
           </a:p>
@@ -26077,7 +27799,7 @@
 </p:sld>
 </file>
 
-<file path=ppt/slides/slide32.xml><?xml version="1.0" encoding="utf-8"?>
+<file path=ppt/slides/slide34.xml><?xml version="1.0" encoding="utf-8"?>
 <p:sld xmlns:a="http://schemas.openxmlformats.org/drawingml/2006/main" xmlns:r="http://schemas.openxmlformats.org/officeDocument/2006/relationships" xmlns:p="http://schemas.openxmlformats.org/presentationml/2006/main">
   <p:cSld>
     <p:spTree>
@@ -26563,7 +28285,7 @@
           <a:p>
             <a:fld id="{6C6AE60A-B69C-4790-82F7-3882EDF23186}" type="slidenum">
               <a:rPr lang="de-DE" smtClean="0"/>
-              <a:t>32</a:t>
+              <a:t>34</a:t>
             </a:fld>
             <a:endParaRPr lang="de-DE"/>
           </a:p>
@@ -26589,7 +28311,7 @@
 </p:sld>
 </file>
 
-<file path=ppt/slides/slide33.xml><?xml version="1.0" encoding="utf-8"?>
+<file path=ppt/slides/slide35.xml><?xml version="1.0" encoding="utf-8"?>
 <p:sld xmlns:a="http://schemas.openxmlformats.org/drawingml/2006/main" xmlns:r="http://schemas.openxmlformats.org/officeDocument/2006/relationships" xmlns:p="http://schemas.openxmlformats.org/presentationml/2006/main">
   <p:cSld>
     <p:spTree>
@@ -26739,7 +28461,7 @@
           <a:p>
             <a:fld id="{6C6AE60A-B69C-4790-82F7-3882EDF23186}" type="slidenum">
               <a:rPr lang="de-DE" smtClean="0"/>
-              <a:t>33</a:t>
+              <a:t>35</a:t>
             </a:fld>
             <a:endParaRPr lang="de-DE"/>
           </a:p>

</xml_diff>

<commit_message>
Fehlerkorrektur in Analyse Umfrage I
</commit_message>
<xml_diff>
--- a/documents/marketing/Marketing Analyse von Umfrage 1 (5.5).pptx
+++ b/documents/marketing/Marketing Analyse von Umfrage 1 (5.5).pptx
@@ -555,11 +555,11 @@
         </c:dLbls>
         <c:marker val="1"/>
         <c:smooth val="0"/>
-        <c:axId val="188676352"/>
-        <c:axId val="188686720"/>
+        <c:axId val="186024704"/>
+        <c:axId val="186026240"/>
       </c:lineChart>
       <c:dateAx>
-        <c:axId val="188676352"/>
+        <c:axId val="186024704"/>
         <c:scaling>
           <c:orientation val="minMax"/>
         </c:scaling>
@@ -579,14 +579,14 @@
             <a:endParaRPr lang="de-DE"/>
           </a:p>
         </c:txPr>
-        <c:crossAx val="188686720"/>
+        <c:crossAx val="186026240"/>
         <c:crosses val="autoZero"/>
         <c:auto val="1"/>
         <c:lblOffset val="100"/>
         <c:baseTimeUnit val="days"/>
       </c:dateAx>
       <c:valAx>
-        <c:axId val="188686720"/>
+        <c:axId val="186026240"/>
         <c:scaling>
           <c:orientation val="minMax"/>
         </c:scaling>
@@ -597,7 +597,7 @@
         <c:majorTickMark val="out"/>
         <c:minorTickMark val="none"/>
         <c:tickLblPos val="nextTo"/>
-        <c:crossAx val="188676352"/>
+        <c:crossAx val="186024704"/>
         <c:crosses val="autoZero"/>
         <c:crossBetween val="between"/>
       </c:valAx>
@@ -718,11 +718,11 @@
           <c:showBubbleSize val="0"/>
         </c:dLbls>
         <c:gapWidth val="100"/>
-        <c:axId val="311897472"/>
-        <c:axId val="311903744"/>
+        <c:axId val="187101184"/>
+        <c:axId val="187102720"/>
       </c:barChart>
       <c:catAx>
-        <c:axId val="311897472"/>
+        <c:axId val="187101184"/>
         <c:scaling>
           <c:orientation val="minMax"/>
         </c:scaling>
@@ -731,7 +731,7 @@
         <c:majorTickMark val="out"/>
         <c:minorTickMark val="none"/>
         <c:tickLblPos val="nextTo"/>
-        <c:crossAx val="311903744"/>
+        <c:crossAx val="187102720"/>
         <c:crosses val="autoZero"/>
         <c:auto val="1"/>
         <c:lblAlgn val="ctr"/>
@@ -739,7 +739,7 @@
         <c:noMultiLvlLbl val="0"/>
       </c:catAx>
       <c:valAx>
-        <c:axId val="311903744"/>
+        <c:axId val="187102720"/>
         <c:scaling>
           <c:orientation val="minMax"/>
           <c:max val="0.70000000000000007"/>
@@ -751,7 +751,7 @@
         <c:majorTickMark val="out"/>
         <c:minorTickMark val="none"/>
         <c:tickLblPos val="nextTo"/>
-        <c:crossAx val="311897472"/>
+        <c:crossAx val="187101184"/>
         <c:crosses val="autoZero"/>
         <c:crossBetween val="between"/>
       </c:valAx>
@@ -873,11 +873,11 @@
           <c:showBubbleSize val="0"/>
         </c:dLbls>
         <c:gapWidth val="100"/>
-        <c:axId val="288232576"/>
-        <c:axId val="288234880"/>
+        <c:axId val="184599296"/>
+        <c:axId val="184600832"/>
       </c:barChart>
       <c:catAx>
-        <c:axId val="288232576"/>
+        <c:axId val="184599296"/>
         <c:scaling>
           <c:orientation val="minMax"/>
         </c:scaling>
@@ -886,7 +886,7 @@
         <c:majorTickMark val="out"/>
         <c:minorTickMark val="none"/>
         <c:tickLblPos val="nextTo"/>
-        <c:crossAx val="288234880"/>
+        <c:crossAx val="184600832"/>
         <c:crosses val="autoZero"/>
         <c:auto val="1"/>
         <c:lblAlgn val="ctr"/>
@@ -894,7 +894,7 @@
         <c:noMultiLvlLbl val="0"/>
       </c:catAx>
       <c:valAx>
-        <c:axId val="288234880"/>
+        <c:axId val="184600832"/>
         <c:scaling>
           <c:orientation val="minMax"/>
           <c:max val="0.5"/>
@@ -906,7 +906,7 @@
         <c:majorTickMark val="out"/>
         <c:minorTickMark val="none"/>
         <c:tickLblPos val="nextTo"/>
-        <c:crossAx val="288232576"/>
+        <c:crossAx val="184599296"/>
         <c:crosses val="autoZero"/>
         <c:crossBetween val="between"/>
       </c:valAx>
@@ -1040,11 +1040,11 @@
           <c:showBubbleSize val="0"/>
         </c:dLbls>
         <c:gapWidth val="150"/>
-        <c:axId val="316286848"/>
-        <c:axId val="316288384"/>
+        <c:axId val="187139200"/>
+        <c:axId val="187140736"/>
       </c:barChart>
       <c:catAx>
-        <c:axId val="316286848"/>
+        <c:axId val="187139200"/>
         <c:scaling>
           <c:orientation val="maxMin"/>
         </c:scaling>
@@ -1053,7 +1053,7 @@
         <c:majorTickMark val="out"/>
         <c:minorTickMark val="none"/>
         <c:tickLblPos val="nextTo"/>
-        <c:crossAx val="316288384"/>
+        <c:crossAx val="187140736"/>
         <c:crosses val="autoZero"/>
         <c:auto val="1"/>
         <c:lblAlgn val="ctr"/>
@@ -1061,7 +1061,7 @@
         <c:noMultiLvlLbl val="0"/>
       </c:catAx>
       <c:valAx>
-        <c:axId val="316288384"/>
+        <c:axId val="187140736"/>
         <c:scaling>
           <c:orientation val="minMax"/>
         </c:scaling>
@@ -1072,7 +1072,7 @@
         <c:majorTickMark val="out"/>
         <c:minorTickMark val="none"/>
         <c:tickLblPos val="nextTo"/>
-        <c:crossAx val="316286848"/>
+        <c:crossAx val="187139200"/>
         <c:crosses val="autoZero"/>
         <c:crossBetween val="between"/>
       </c:valAx>
@@ -1394,11 +1394,11 @@
           <c:showBubbleSize val="0"/>
         </c:dLbls>
         <c:gapWidth val="150"/>
-        <c:axId val="316519168"/>
-        <c:axId val="316521088"/>
+        <c:axId val="187252736"/>
+        <c:axId val="187254272"/>
       </c:barChart>
       <c:catAx>
-        <c:axId val="316519168"/>
+        <c:axId val="187252736"/>
         <c:scaling>
           <c:orientation val="minMax"/>
         </c:scaling>
@@ -1408,7 +1408,7 @@
         <c:majorTickMark val="out"/>
         <c:minorTickMark val="none"/>
         <c:tickLblPos val="nextTo"/>
-        <c:crossAx val="316521088"/>
+        <c:crossAx val="187254272"/>
         <c:crosses val="autoZero"/>
         <c:auto val="1"/>
         <c:lblAlgn val="ctr"/>
@@ -1417,7 +1417,7 @@
         <c:noMultiLvlLbl val="0"/>
       </c:catAx>
       <c:valAx>
-        <c:axId val="316521088"/>
+        <c:axId val="187254272"/>
         <c:scaling>
           <c:orientation val="minMax"/>
         </c:scaling>
@@ -1428,7 +1428,7 @@
         <c:majorTickMark val="out"/>
         <c:minorTickMark val="none"/>
         <c:tickLblPos val="nextTo"/>
-        <c:crossAx val="316519168"/>
+        <c:crossAx val="187252736"/>
         <c:crosses val="autoZero"/>
         <c:crossBetween val="between"/>
       </c:valAx>
@@ -1656,11 +1656,11 @@
           <c:showBubbleSize val="0"/>
         </c:dLbls>
         <c:gapWidth val="150"/>
-        <c:axId val="316938496"/>
-        <c:axId val="316949632"/>
+        <c:axId val="187500800"/>
+        <c:axId val="187506688"/>
       </c:barChart>
       <c:catAx>
-        <c:axId val="316938496"/>
+        <c:axId val="187500800"/>
         <c:scaling>
           <c:orientation val="minMax"/>
         </c:scaling>
@@ -1669,7 +1669,7 @@
         <c:majorTickMark val="out"/>
         <c:minorTickMark val="none"/>
         <c:tickLblPos val="nextTo"/>
-        <c:crossAx val="316949632"/>
+        <c:crossAx val="187506688"/>
         <c:crosses val="autoZero"/>
         <c:auto val="1"/>
         <c:lblAlgn val="ctr"/>
@@ -1677,7 +1677,7 @@
         <c:noMultiLvlLbl val="0"/>
       </c:catAx>
       <c:valAx>
-        <c:axId val="316949632"/>
+        <c:axId val="187506688"/>
         <c:scaling>
           <c:orientation val="minMax"/>
         </c:scaling>
@@ -1688,7 +1688,7 @@
         <c:majorTickMark val="out"/>
         <c:minorTickMark val="none"/>
         <c:tickLblPos val="nextTo"/>
-        <c:crossAx val="316938496"/>
+        <c:crossAx val="187500800"/>
         <c:crosses val="autoZero"/>
         <c:crossBetween val="between"/>
       </c:valAx>
@@ -1804,11 +1804,11 @@
           <c:showBubbleSize val="0"/>
         </c:dLbls>
         <c:gapWidth val="100"/>
-        <c:axId val="316951552"/>
-        <c:axId val="318252544"/>
+        <c:axId val="187554432"/>
+        <c:axId val="187560320"/>
       </c:barChart>
       <c:catAx>
-        <c:axId val="316951552"/>
+        <c:axId val="187554432"/>
         <c:scaling>
           <c:orientation val="minMax"/>
         </c:scaling>
@@ -1817,7 +1817,7 @@
         <c:majorTickMark val="out"/>
         <c:minorTickMark val="none"/>
         <c:tickLblPos val="nextTo"/>
-        <c:crossAx val="318252544"/>
+        <c:crossAx val="187560320"/>
         <c:crosses val="autoZero"/>
         <c:auto val="1"/>
         <c:lblAlgn val="ctr"/>
@@ -1825,7 +1825,7 @@
         <c:noMultiLvlLbl val="0"/>
       </c:catAx>
       <c:valAx>
-        <c:axId val="318252544"/>
+        <c:axId val="187560320"/>
         <c:scaling>
           <c:orientation val="minMax"/>
         </c:scaling>
@@ -1836,7 +1836,7 @@
         <c:majorTickMark val="out"/>
         <c:minorTickMark val="none"/>
         <c:tickLblPos val="nextTo"/>
-        <c:crossAx val="316951552"/>
+        <c:crossAx val="187554432"/>
         <c:crosses val="autoZero"/>
         <c:crossBetween val="between"/>
       </c:valAx>
@@ -2265,11 +2265,11 @@
         </c:dLbls>
         <c:marker val="1"/>
         <c:smooth val="0"/>
-        <c:axId val="188644352"/>
-        <c:axId val="319464192"/>
+        <c:axId val="186038144"/>
+        <c:axId val="186039680"/>
       </c:lineChart>
       <c:dateAx>
-        <c:axId val="188644352"/>
+        <c:axId val="186038144"/>
         <c:scaling>
           <c:orientation val="minMax"/>
         </c:scaling>
@@ -2289,14 +2289,14 @@
             <a:endParaRPr lang="de-DE"/>
           </a:p>
         </c:txPr>
-        <c:crossAx val="319464192"/>
+        <c:crossAx val="186039680"/>
         <c:crosses val="autoZero"/>
         <c:auto val="1"/>
         <c:lblOffset val="100"/>
         <c:baseTimeUnit val="days"/>
       </c:dateAx>
       <c:valAx>
-        <c:axId val="319464192"/>
+        <c:axId val="186039680"/>
         <c:scaling>
           <c:orientation val="minMax"/>
           <c:max val="250"/>
@@ -2308,7 +2308,7 @@
         <c:majorTickMark val="out"/>
         <c:minorTickMark val="none"/>
         <c:tickLblPos val="nextTo"/>
-        <c:crossAx val="188644352"/>
+        <c:crossAx val="186038144"/>
         <c:crosses val="autoZero"/>
         <c:crossBetween val="between"/>
       </c:valAx>
@@ -2490,11 +2490,11 @@
           <c:showBubbleSize val="0"/>
         </c:dLbls>
         <c:gapWidth val="150"/>
-        <c:axId val="185876864"/>
-        <c:axId val="185907072"/>
+        <c:axId val="187859328"/>
+        <c:axId val="187860864"/>
       </c:barChart>
       <c:catAx>
-        <c:axId val="185876864"/>
+        <c:axId val="187859328"/>
         <c:scaling>
           <c:orientation val="minMax"/>
         </c:scaling>
@@ -2503,7 +2503,7 @@
         <c:majorTickMark val="out"/>
         <c:minorTickMark val="none"/>
         <c:tickLblPos val="nextTo"/>
-        <c:crossAx val="185907072"/>
+        <c:crossAx val="187860864"/>
         <c:crosses val="autoZero"/>
         <c:auto val="1"/>
         <c:lblAlgn val="ctr"/>
@@ -2511,7 +2511,7 @@
         <c:noMultiLvlLbl val="0"/>
       </c:catAx>
       <c:valAx>
-        <c:axId val="185907072"/>
+        <c:axId val="187860864"/>
         <c:scaling>
           <c:orientation val="minMax"/>
         </c:scaling>
@@ -2522,7 +2522,7 @@
         <c:majorTickMark val="out"/>
         <c:minorTickMark val="none"/>
         <c:tickLblPos val="nextTo"/>
-        <c:crossAx val="185876864"/>
+        <c:crossAx val="187859328"/>
         <c:crosses val="autoZero"/>
         <c:crossBetween val="between"/>
       </c:valAx>
@@ -2812,11 +2812,11 @@
           <c:showBubbleSize val="0"/>
         </c:dLbls>
         <c:gapWidth val="150"/>
-        <c:axId val="188693120"/>
-        <c:axId val="188738944"/>
+        <c:axId val="188166144"/>
+        <c:axId val="188167680"/>
       </c:barChart>
       <c:catAx>
-        <c:axId val="188693120"/>
+        <c:axId val="188166144"/>
         <c:scaling>
           <c:orientation val="minMax"/>
         </c:scaling>
@@ -2825,7 +2825,7 @@
         <c:majorTickMark val="out"/>
         <c:minorTickMark val="none"/>
         <c:tickLblPos val="nextTo"/>
-        <c:crossAx val="188738944"/>
+        <c:crossAx val="188167680"/>
         <c:crosses val="autoZero"/>
         <c:auto val="1"/>
         <c:lblAlgn val="ctr"/>
@@ -2833,7 +2833,7 @@
         <c:noMultiLvlLbl val="0"/>
       </c:catAx>
       <c:valAx>
-        <c:axId val="188738944"/>
+        <c:axId val="188167680"/>
         <c:scaling>
           <c:orientation val="minMax"/>
         </c:scaling>
@@ -2844,7 +2844,7 @@
         <c:majorTickMark val="out"/>
         <c:minorTickMark val="none"/>
         <c:tickLblPos val="nextTo"/>
-        <c:crossAx val="188693120"/>
+        <c:crossAx val="188166144"/>
         <c:crosses val="autoZero"/>
         <c:crossBetween val="between"/>
       </c:valAx>
@@ -2983,11 +2983,11 @@
           <c:showBubbleSize val="0"/>
         </c:dLbls>
         <c:gapWidth val="150"/>
-        <c:axId val="319312640"/>
-        <c:axId val="319314560"/>
+        <c:axId val="187966208"/>
+        <c:axId val="187967744"/>
       </c:barChart>
       <c:catAx>
-        <c:axId val="319312640"/>
+        <c:axId val="187966208"/>
         <c:scaling>
           <c:orientation val="maxMin"/>
         </c:scaling>
@@ -2996,7 +2996,7 @@
         <c:majorTickMark val="out"/>
         <c:minorTickMark val="none"/>
         <c:tickLblPos val="nextTo"/>
-        <c:crossAx val="319314560"/>
+        <c:crossAx val="187967744"/>
         <c:crosses val="autoZero"/>
         <c:auto val="1"/>
         <c:lblAlgn val="ctr"/>
@@ -3004,7 +3004,7 @@
         <c:noMultiLvlLbl val="0"/>
       </c:catAx>
       <c:valAx>
-        <c:axId val="319314560"/>
+        <c:axId val="187967744"/>
         <c:scaling>
           <c:orientation val="minMax"/>
         </c:scaling>
@@ -3015,7 +3015,7 @@
         <c:majorTickMark val="out"/>
         <c:minorTickMark val="none"/>
         <c:tickLblPos val="nextTo"/>
-        <c:crossAx val="319312640"/>
+        <c:crossAx val="187966208"/>
         <c:crosses val="autoZero"/>
         <c:crossBetween val="between"/>
       </c:valAx>
@@ -3161,11 +3161,11 @@
           <c:showBubbleSize val="0"/>
         </c:dLbls>
         <c:gapWidth val="150"/>
-        <c:axId val="318536704"/>
-        <c:axId val="319170048"/>
+        <c:axId val="188007936"/>
+        <c:axId val="188009472"/>
       </c:barChart>
       <c:catAx>
-        <c:axId val="318536704"/>
+        <c:axId val="188007936"/>
         <c:scaling>
           <c:orientation val="maxMin"/>
         </c:scaling>
@@ -3174,7 +3174,7 @@
         <c:majorTickMark val="out"/>
         <c:minorTickMark val="none"/>
         <c:tickLblPos val="nextTo"/>
-        <c:crossAx val="319170048"/>
+        <c:crossAx val="188009472"/>
         <c:crosses val="autoZero"/>
         <c:auto val="1"/>
         <c:lblAlgn val="ctr"/>
@@ -3182,7 +3182,7 @@
         <c:noMultiLvlLbl val="0"/>
       </c:catAx>
       <c:valAx>
-        <c:axId val="319170048"/>
+        <c:axId val="188009472"/>
         <c:scaling>
           <c:orientation val="minMax"/>
         </c:scaling>
@@ -3193,7 +3193,7 @@
         <c:majorTickMark val="out"/>
         <c:minorTickMark val="none"/>
         <c:tickLblPos val="nextTo"/>
-        <c:crossAx val="318536704"/>
+        <c:crossAx val="188007936"/>
         <c:crosses val="autoZero"/>
         <c:crossBetween val="between"/>
       </c:valAx>
@@ -3349,11 +3349,11 @@
         </c:dLbls>
         <c:marker val="1"/>
         <c:smooth val="0"/>
-        <c:axId val="319455232"/>
-        <c:axId val="319456768"/>
+        <c:axId val="187939840"/>
+        <c:axId val="187949824"/>
       </c:lineChart>
       <c:catAx>
-        <c:axId val="319455232"/>
+        <c:axId val="187939840"/>
         <c:scaling>
           <c:orientation val="minMax"/>
         </c:scaling>
@@ -3372,7 +3372,7 @@
             <a:endParaRPr lang="de-DE"/>
           </a:p>
         </c:txPr>
-        <c:crossAx val="319456768"/>
+        <c:crossAx val="187949824"/>
         <c:crosses val="autoZero"/>
         <c:auto val="1"/>
         <c:lblAlgn val="ctr"/>
@@ -3380,7 +3380,7 @@
         <c:noMultiLvlLbl val="0"/>
       </c:catAx>
       <c:valAx>
-        <c:axId val="319456768"/>
+        <c:axId val="187949824"/>
         <c:scaling>
           <c:orientation val="minMax"/>
           <c:min val="1"/>
@@ -3392,7 +3392,7 @@
         <c:majorTickMark val="out"/>
         <c:minorTickMark val="none"/>
         <c:tickLblPos val="nextTo"/>
-        <c:crossAx val="319455232"/>
+        <c:crossAx val="187939840"/>
         <c:crosses val="autoZero"/>
         <c:crossBetween val="between"/>
       </c:valAx>
@@ -3620,11 +3620,11 @@
           <c:showBubbleSize val="0"/>
         </c:dLbls>
         <c:gapWidth val="100"/>
-        <c:axId val="319988864"/>
-        <c:axId val="323966080"/>
+        <c:axId val="186820096"/>
+        <c:axId val="186821632"/>
       </c:barChart>
       <c:catAx>
-        <c:axId val="319988864"/>
+        <c:axId val="186820096"/>
         <c:scaling>
           <c:orientation val="minMax"/>
         </c:scaling>
@@ -3633,7 +3633,7 @@
         <c:majorTickMark val="out"/>
         <c:minorTickMark val="none"/>
         <c:tickLblPos val="nextTo"/>
-        <c:crossAx val="323966080"/>
+        <c:crossAx val="186821632"/>
         <c:crosses val="autoZero"/>
         <c:auto val="1"/>
         <c:lblAlgn val="ctr"/>
@@ -3641,7 +3641,7 @@
         <c:noMultiLvlLbl val="0"/>
       </c:catAx>
       <c:valAx>
-        <c:axId val="323966080"/>
+        <c:axId val="186821632"/>
         <c:scaling>
           <c:orientation val="minMax"/>
         </c:scaling>
@@ -3652,7 +3652,7 @@
         <c:majorTickMark val="out"/>
         <c:minorTickMark val="none"/>
         <c:tickLblPos val="nextTo"/>
-        <c:crossAx val="319988864"/>
+        <c:crossAx val="186820096"/>
         <c:crosses val="autoZero"/>
         <c:crossBetween val="between"/>
       </c:valAx>
@@ -3768,11 +3768,11 @@
           <c:showBubbleSize val="0"/>
         </c:dLbls>
         <c:gapWidth val="100"/>
-        <c:axId val="323977984"/>
-        <c:axId val="323979520"/>
+        <c:axId val="186947072"/>
+        <c:axId val="186948608"/>
       </c:barChart>
       <c:catAx>
-        <c:axId val="323977984"/>
+        <c:axId val="186947072"/>
         <c:scaling>
           <c:orientation val="minMax"/>
         </c:scaling>
@@ -3781,7 +3781,7 @@
         <c:majorTickMark val="out"/>
         <c:minorTickMark val="none"/>
         <c:tickLblPos val="nextTo"/>
-        <c:crossAx val="323979520"/>
+        <c:crossAx val="186948608"/>
         <c:crosses val="autoZero"/>
         <c:auto val="1"/>
         <c:lblAlgn val="ctr"/>
@@ -3789,7 +3789,7 @@
         <c:noMultiLvlLbl val="0"/>
       </c:catAx>
       <c:valAx>
-        <c:axId val="323979520"/>
+        <c:axId val="186948608"/>
         <c:scaling>
           <c:orientation val="minMax"/>
         </c:scaling>
@@ -3800,7 +3800,7 @@
         <c:majorTickMark val="out"/>
         <c:minorTickMark val="none"/>
         <c:tickLblPos val="nextTo"/>
-        <c:crossAx val="323977984"/>
+        <c:crossAx val="186947072"/>
         <c:crosses val="autoZero"/>
         <c:crossBetween val="between"/>
       </c:valAx>
@@ -3928,11 +3928,11 @@
           <c:showBubbleSize val="0"/>
         </c:dLbls>
         <c:gapWidth val="100"/>
-        <c:axId val="319997440"/>
-        <c:axId val="319999360"/>
+        <c:axId val="186849152"/>
+        <c:axId val="186850688"/>
       </c:barChart>
       <c:catAx>
-        <c:axId val="319997440"/>
+        <c:axId val="186849152"/>
         <c:scaling>
           <c:orientation val="minMax"/>
         </c:scaling>
@@ -3941,7 +3941,7 @@
         <c:majorTickMark val="out"/>
         <c:minorTickMark val="none"/>
         <c:tickLblPos val="nextTo"/>
-        <c:crossAx val="319999360"/>
+        <c:crossAx val="186850688"/>
         <c:crosses val="autoZero"/>
         <c:auto val="1"/>
         <c:lblAlgn val="ctr"/>
@@ -3949,7 +3949,7 @@
         <c:noMultiLvlLbl val="0"/>
       </c:catAx>
       <c:valAx>
-        <c:axId val="319999360"/>
+        <c:axId val="186850688"/>
         <c:scaling>
           <c:orientation val="minMax"/>
         </c:scaling>
@@ -3960,7 +3960,7 @@
         <c:majorTickMark val="out"/>
         <c:minorTickMark val="none"/>
         <c:tickLblPos val="nextTo"/>
-        <c:crossAx val="319997440"/>
+        <c:crossAx val="186849152"/>
         <c:crosses val="autoZero"/>
         <c:crossBetween val="between"/>
       </c:valAx>
@@ -4097,11 +4097,11 @@
           <c:showBubbleSize val="0"/>
         </c:dLbls>
         <c:gapWidth val="100"/>
-        <c:axId val="137462528"/>
-        <c:axId val="141249920"/>
+        <c:axId val="187308672"/>
+        <c:axId val="187326848"/>
       </c:barChart>
       <c:catAx>
-        <c:axId val="137462528"/>
+        <c:axId val="187308672"/>
         <c:scaling>
           <c:orientation val="minMax"/>
         </c:scaling>
@@ -4110,7 +4110,7 @@
         <c:majorTickMark val="out"/>
         <c:minorTickMark val="none"/>
         <c:tickLblPos val="nextTo"/>
-        <c:crossAx val="141249920"/>
+        <c:crossAx val="187326848"/>
         <c:crosses val="autoZero"/>
         <c:auto val="1"/>
         <c:lblAlgn val="ctr"/>
@@ -4118,7 +4118,7 @@
         <c:noMultiLvlLbl val="0"/>
       </c:catAx>
       <c:valAx>
-        <c:axId val="141249920"/>
+        <c:axId val="187326848"/>
         <c:scaling>
           <c:orientation val="minMax"/>
         </c:scaling>
@@ -4129,7 +4129,7 @@
         <c:majorTickMark val="out"/>
         <c:minorTickMark val="none"/>
         <c:tickLblPos val="nextTo"/>
-        <c:crossAx val="137462528"/>
+        <c:crossAx val="187308672"/>
         <c:crosses val="autoZero"/>
         <c:crossBetween val="between"/>
       </c:valAx>
@@ -4263,11 +4263,11 @@
           <c:showBubbleSize val="0"/>
         </c:dLbls>
         <c:gapWidth val="150"/>
-        <c:axId val="265156864"/>
-        <c:axId val="268208768"/>
+        <c:axId val="187440128"/>
+        <c:axId val="187441920"/>
       </c:barChart>
       <c:catAx>
-        <c:axId val="265156864"/>
+        <c:axId val="187440128"/>
         <c:scaling>
           <c:orientation val="maxMin"/>
         </c:scaling>
@@ -4276,7 +4276,7 @@
         <c:majorTickMark val="out"/>
         <c:minorTickMark val="none"/>
         <c:tickLblPos val="nextTo"/>
-        <c:crossAx val="268208768"/>
+        <c:crossAx val="187441920"/>
         <c:crosses val="autoZero"/>
         <c:auto val="1"/>
         <c:lblAlgn val="ctr"/>
@@ -4284,7 +4284,7 @@
         <c:noMultiLvlLbl val="0"/>
       </c:catAx>
       <c:valAx>
-        <c:axId val="268208768"/>
+        <c:axId val="187441920"/>
         <c:scaling>
           <c:orientation val="minMax"/>
         </c:scaling>
@@ -4295,7 +4295,7 @@
         <c:majorTickMark val="out"/>
         <c:minorTickMark val="none"/>
         <c:tickLblPos val="nextTo"/>
-        <c:crossAx val="265156864"/>
+        <c:crossAx val="187440128"/>
         <c:crosses val="autoZero"/>
         <c:crossBetween val="between"/>
       </c:valAx>
@@ -4423,11 +4423,11 @@
           <c:showBubbleSize val="0"/>
         </c:dLbls>
         <c:gapWidth val="150"/>
-        <c:axId val="268181504"/>
-        <c:axId val="268207616"/>
+        <c:axId val="187048320"/>
+        <c:axId val="187049856"/>
       </c:barChart>
       <c:catAx>
-        <c:axId val="268181504"/>
+        <c:axId val="187048320"/>
         <c:scaling>
           <c:orientation val="maxMin"/>
         </c:scaling>
@@ -4436,7 +4436,7 @@
         <c:majorTickMark val="out"/>
         <c:minorTickMark val="none"/>
         <c:tickLblPos val="nextTo"/>
-        <c:crossAx val="268207616"/>
+        <c:crossAx val="187049856"/>
         <c:crosses val="autoZero"/>
         <c:auto val="1"/>
         <c:lblAlgn val="ctr"/>
@@ -4444,7 +4444,7 @@
         <c:noMultiLvlLbl val="0"/>
       </c:catAx>
       <c:valAx>
-        <c:axId val="268207616"/>
+        <c:axId val="187049856"/>
         <c:scaling>
           <c:orientation val="minMax"/>
           <c:max val="1"/>
@@ -4456,7 +4456,7 @@
         <c:majorTickMark val="out"/>
         <c:minorTickMark val="none"/>
         <c:tickLblPos val="nextTo"/>
-        <c:crossAx val="268181504"/>
+        <c:crossAx val="187048320"/>
         <c:crosses val="autoZero"/>
         <c:crossBetween val="between"/>
       </c:valAx>
@@ -4553,7 +4553,7 @@
           <a:p>
             <a:fld id="{95DA7A4A-CCA3-4709-AE5C-B70612B70DF1}" type="datetimeFigureOut">
               <a:rPr lang="de-DE" smtClean="0"/>
-              <a:t>21.12.2014</a:t>
+              <a:t>22.12.2014</a:t>
             </a:fld>
             <a:endParaRPr lang="de-DE"/>
           </a:p>
@@ -5002,7 +5002,7 @@
           <a:p>
             <a:fld id="{C12F2883-04BD-4DAA-A948-CECBCBEE6FE5}" type="datetime1">
               <a:rPr lang="de-DE" smtClean="0"/>
-              <a:t>21.12.2014</a:t>
+              <a:t>22.12.2014</a:t>
             </a:fld>
             <a:endParaRPr lang="de-DE"/>
           </a:p>
@@ -5167,7 +5167,7 @@
           <a:p>
             <a:fld id="{45DB60FF-8589-41DB-9CB8-FDB1C8712399}" type="datetime1">
               <a:rPr lang="de-DE" smtClean="0"/>
-              <a:t>21.12.2014</a:t>
+              <a:t>22.12.2014</a:t>
             </a:fld>
             <a:endParaRPr lang="de-DE"/>
           </a:p>
@@ -5342,7 +5342,7 @@
           <a:p>
             <a:fld id="{623E37D0-88EC-4346-89A2-12A8BFE82AE0}" type="datetime1">
               <a:rPr lang="de-DE" smtClean="0"/>
-              <a:t>21.12.2014</a:t>
+              <a:t>22.12.2014</a:t>
             </a:fld>
             <a:endParaRPr lang="de-DE"/>
           </a:p>
@@ -5507,7 +5507,7 @@
           <a:p>
             <a:fld id="{3EB1791F-321E-4EF0-AC89-9B5E051C81F3}" type="datetime1">
               <a:rPr lang="de-DE" smtClean="0"/>
-              <a:t>21.12.2014</a:t>
+              <a:t>22.12.2014</a:t>
             </a:fld>
             <a:endParaRPr lang="de-DE"/>
           </a:p>
@@ -5748,7 +5748,7 @@
           <a:p>
             <a:fld id="{22744B83-AE53-475A-B355-0AED6E3516CC}" type="datetime1">
               <a:rPr lang="de-DE" smtClean="0"/>
-              <a:t>21.12.2014</a:t>
+              <a:t>22.12.2014</a:t>
             </a:fld>
             <a:endParaRPr lang="de-DE"/>
           </a:p>
@@ -6031,7 +6031,7 @@
           <a:p>
             <a:fld id="{BE14A012-88D8-4AE7-A552-67D70864FA8B}" type="datetime1">
               <a:rPr lang="de-DE" smtClean="0"/>
-              <a:t>21.12.2014</a:t>
+              <a:t>22.12.2014</a:t>
             </a:fld>
             <a:endParaRPr lang="de-DE"/>
           </a:p>
@@ -6448,7 +6448,7 @@
           <a:p>
             <a:fld id="{445ACB48-45BE-499D-B356-702A3B0F6605}" type="datetime1">
               <a:rPr lang="de-DE" smtClean="0"/>
-              <a:t>21.12.2014</a:t>
+              <a:t>22.12.2014</a:t>
             </a:fld>
             <a:endParaRPr lang="de-DE"/>
           </a:p>
@@ -6561,7 +6561,7 @@
           <a:p>
             <a:fld id="{9F54A0AF-5ECC-4B67-9F23-F59426C3F899}" type="datetime1">
               <a:rPr lang="de-DE" smtClean="0"/>
-              <a:t>21.12.2014</a:t>
+              <a:t>22.12.2014</a:t>
             </a:fld>
             <a:endParaRPr lang="de-DE"/>
           </a:p>
@@ -6651,7 +6651,7 @@
           <a:p>
             <a:fld id="{D375BF5A-73F9-4FED-85E2-9D3FB2FE8876}" type="datetime1">
               <a:rPr lang="de-DE" smtClean="0"/>
-              <a:t>21.12.2014</a:t>
+              <a:t>22.12.2014</a:t>
             </a:fld>
             <a:endParaRPr lang="de-DE"/>
           </a:p>
@@ -6923,7 +6923,7 @@
           <a:p>
             <a:fld id="{31AC40A4-1922-4BD0-8989-420CEAEC6415}" type="datetime1">
               <a:rPr lang="de-DE" smtClean="0"/>
-              <a:t>21.12.2014</a:t>
+              <a:t>22.12.2014</a:t>
             </a:fld>
             <a:endParaRPr lang="de-DE"/>
           </a:p>
@@ -7171,7 +7171,7 @@
           <a:p>
             <a:fld id="{436B358D-4B12-427F-A2AC-2C169FFB3FF5}" type="datetime1">
               <a:rPr lang="de-DE" smtClean="0"/>
-              <a:t>21.12.2014</a:t>
+              <a:t>22.12.2014</a:t>
             </a:fld>
             <a:endParaRPr lang="de-DE"/>
           </a:p>
@@ -7379,7 +7379,7 @@
           <a:p>
             <a:fld id="{3EAEDF5D-2518-4F93-A6BB-C2198E8D704A}" type="datetime1">
               <a:rPr lang="de-DE" smtClean="0"/>
-              <a:t>21.12.2014</a:t>
+              <a:t>22.12.2014</a:t>
             </a:fld>
             <a:endParaRPr lang="de-DE"/>
           </a:p>
@@ -7937,27 +7937,7 @@
                 <a:latin typeface="Arial" panose="020B0604020202020204" pitchFamily="34" charset="0"/>
                 <a:cs typeface="Arial" panose="020B0604020202020204" pitchFamily="34" charset="0"/>
               </a:rPr>
-              <a:t>Analyse von Umfrage </a:t>
-            </a:r>
-            <a:r>
-              <a:rPr lang="de-DE" sz="2200" b="1" dirty="0" smtClean="0">
-                <a:solidFill>
-                  <a:schemeClr val="bg1"/>
-                </a:solidFill>
-                <a:latin typeface="Arial" panose="020B0604020202020204" pitchFamily="34" charset="0"/>
-                <a:cs typeface="Arial" panose="020B0604020202020204" pitchFamily="34" charset="0"/>
-              </a:rPr>
-              <a:t>I </a:t>
-            </a:r>
-            <a:r>
-              <a:rPr lang="de-DE" sz="2200" b="1" dirty="0" smtClean="0">
-                <a:solidFill>
-                  <a:schemeClr val="bg1"/>
-                </a:solidFill>
-                <a:latin typeface="Arial" panose="020B0604020202020204" pitchFamily="34" charset="0"/>
-                <a:cs typeface="Arial" panose="020B0604020202020204" pitchFamily="34" charset="0"/>
-              </a:rPr>
-              <a:t/>
+              <a:t>Analyse von Umfrage I </a:t>
             </a:r>
             <a:br>
               <a:rPr lang="de-DE" sz="2200" b="1" dirty="0" smtClean="0">
@@ -7976,17 +7956,7 @@
                 <a:latin typeface="Arial" panose="020B0604020202020204" pitchFamily="34" charset="0"/>
                 <a:cs typeface="Arial" panose="020B0604020202020204" pitchFamily="34" charset="0"/>
               </a:rPr>
-              <a:t>(Arbeitspaket 5.5</a:t>
-            </a:r>
-            <a:r>
-              <a:rPr lang="de-DE" sz="2200" b="1" dirty="0" smtClean="0">
-                <a:solidFill>
-                  <a:schemeClr val="bg1"/>
-                </a:solidFill>
-                <a:latin typeface="Arial" panose="020B0604020202020204" pitchFamily="34" charset="0"/>
-                <a:cs typeface="Arial" panose="020B0604020202020204" pitchFamily="34" charset="0"/>
-              </a:rPr>
-              <a:t>)</a:t>
+              <a:t>(Arbeitspaket 5.5)</a:t>
             </a:r>
             <a:endParaRPr lang="de-DE" sz="2200" b="1" dirty="0">
               <a:solidFill>
@@ -27421,20 +27391,103 @@
               <a:t> </a:t>
             </a:r>
             <a:r>
+              <a:rPr lang="de-DE" sz="1600" dirty="0" smtClean="0">
+                <a:latin typeface="Arial" panose="020B0604020202020204" pitchFamily="34" charset="0"/>
+                <a:cs typeface="Arial" panose="020B0604020202020204" pitchFamily="34" charset="0"/>
+                <a:hlinkClick r:id="rId4" action="ppaction://hlinksldjump"/>
+              </a:rPr>
+              <a:t>24</a:t>
+            </a:r>
+            <a:r>
+              <a:rPr lang="de-DE" sz="1600" dirty="0" smtClean="0">
+                <a:latin typeface="Arial" panose="020B0604020202020204" pitchFamily="34" charset="0"/>
+                <a:cs typeface="Arial" panose="020B0604020202020204" pitchFamily="34" charset="0"/>
+              </a:rPr>
+              <a:t>)</a:t>
+            </a:r>
+            <a:endParaRPr lang="de-DE" sz="1600" dirty="0" smtClean="0">
+              <a:latin typeface="Arial" panose="020B0604020202020204" pitchFamily="34" charset="0"/>
+              <a:cs typeface="Arial" panose="020B0604020202020204" pitchFamily="34" charset="0"/>
+            </a:endParaRPr>
+          </a:p>
+          <a:p>
+            <a:r>
               <a:rPr lang="de-DE" sz="1600" dirty="0">
                 <a:latin typeface="Arial" panose="020B0604020202020204" pitchFamily="34" charset="0"/>
                 <a:cs typeface="Arial" panose="020B0604020202020204" pitchFamily="34" charset="0"/>
-                <a:hlinkClick r:id="rId4" action="ppaction://hlinksldjump"/>
-              </a:rPr>
-              <a:t>23</a:t>
+              </a:rPr>
+              <a:t>68,2% der Befragten geben an, dass sie kein Interesse daran haben eine eigene Routen zu erstellen</a:t>
             </a:r>
             <a:r>
               <a:rPr lang="de-DE" sz="1600" dirty="0" smtClean="0">
                 <a:latin typeface="Arial" panose="020B0604020202020204" pitchFamily="34" charset="0"/>
                 <a:cs typeface="Arial" panose="020B0604020202020204" pitchFamily="34" charset="0"/>
               </a:rPr>
+              <a:t>. Hier besteht die Herausforderung für das Marketing darin deutlich zu machen, dass Go Happy eine einfache Möglichkeit bietet </a:t>
+            </a:r>
+            <a:r>
+              <a:rPr lang="de-DE" sz="1600" dirty="0">
+                <a:latin typeface="Arial" panose="020B0604020202020204" pitchFamily="34" charset="0"/>
+                <a:cs typeface="Arial" panose="020B0604020202020204" pitchFamily="34" charset="0"/>
+              </a:rPr>
+              <a:t>eine Route zu </a:t>
+            </a:r>
+            <a:r>
+              <a:rPr lang="de-DE" sz="1600" dirty="0" smtClean="0">
+                <a:latin typeface="Arial" panose="020B0604020202020204" pitchFamily="34" charset="0"/>
+                <a:cs typeface="Arial" panose="020B0604020202020204" pitchFamily="34" charset="0"/>
+              </a:rPr>
+              <a:t>erstellen. Außerdem müssen weitere Vorteile herausgestellt werden wie beispielsweise die Spontanität </a:t>
+            </a:r>
+            <a:r>
+              <a:rPr lang="de-DE" sz="1600" dirty="0">
+                <a:latin typeface="Arial" panose="020B0604020202020204" pitchFamily="34" charset="0"/>
+                <a:cs typeface="Arial" panose="020B0604020202020204" pitchFamily="34" charset="0"/>
+              </a:rPr>
+              <a:t>durch </a:t>
+            </a:r>
+            <a:r>
+              <a:rPr lang="de-DE" sz="1600" dirty="0" smtClean="0">
+                <a:latin typeface="Arial" panose="020B0604020202020204" pitchFamily="34" charset="0"/>
+                <a:cs typeface="Arial" panose="020B0604020202020204" pitchFamily="34" charset="0"/>
+              </a:rPr>
+              <a:t>Einstellungen. (</a:t>
+            </a:r>
+            <a:r>
+              <a:rPr lang="de-DE" sz="1600" dirty="0">
+                <a:latin typeface="Arial" panose="020B0604020202020204" pitchFamily="34" charset="0"/>
+                <a:cs typeface="Arial" panose="020B0604020202020204" pitchFamily="34" charset="0"/>
+                <a:hlinkClick r:id="rId5" action="ppaction://hlinksldjump"/>
+              </a:rPr>
+              <a:t>Folie</a:t>
+            </a:r>
+            <a:r>
+              <a:rPr lang="de-DE" sz="1600" dirty="0" smtClean="0">
+                <a:latin typeface="Arial" panose="020B0604020202020204" pitchFamily="34" charset="0"/>
+                <a:cs typeface="Arial" panose="020B0604020202020204" pitchFamily="34" charset="0"/>
+                <a:hlinkClick r:id="rId5" action="ppaction://hlinksldjump"/>
+              </a:rPr>
+              <a:t> </a:t>
+            </a:r>
+            <a:r>
+              <a:rPr lang="de-DE" sz="1600" dirty="0" smtClean="0">
+                <a:latin typeface="Arial" panose="020B0604020202020204" pitchFamily="34" charset="0"/>
+                <a:cs typeface="Arial" panose="020B0604020202020204" pitchFamily="34" charset="0"/>
+                <a:hlinkClick r:id="rId5" action="ppaction://hlinksldjump"/>
+              </a:rPr>
+              <a:t>25</a:t>
+            </a:r>
+            <a:r>
+              <a:rPr lang="de-DE" sz="1600" dirty="0" smtClean="0">
+                <a:latin typeface="Arial" panose="020B0604020202020204" pitchFamily="34" charset="0"/>
+                <a:cs typeface="Arial" panose="020B0604020202020204" pitchFamily="34" charset="0"/>
+              </a:rPr>
               <a:t>)</a:t>
             </a:r>
+            <a:endParaRPr lang="de-DE" sz="1600" dirty="0" smtClean="0">
+              <a:latin typeface="Arial" panose="020B0604020202020204" pitchFamily="34" charset="0"/>
+              <a:cs typeface="Arial" panose="020B0604020202020204" pitchFamily="34" charset="0"/>
+            </a:endParaRPr>
           </a:p>
           <a:p>
             <a:r>
@@ -27442,125 +27495,58 @@
                 <a:latin typeface="Arial" panose="020B0604020202020204" pitchFamily="34" charset="0"/>
                 <a:cs typeface="Arial" panose="020B0604020202020204" pitchFamily="34" charset="0"/>
               </a:rPr>
-              <a:t>68,2% der Befragten geben an, dass sie kein Interesse daran haben eine eigene Routen zu erstellen</a:t>
+              <a:t>Folgende Informationen sind den Befragten besonders wichtig: Art der Location, Happy Hour Zeiten, Musik &amp; Preisindex, Adresse, Speise-/ </a:t>
             </a:r>
             <a:r>
               <a:rPr lang="de-DE" sz="1600" dirty="0" smtClean="0">
                 <a:latin typeface="Arial" panose="020B0604020202020204" pitchFamily="34" charset="0"/>
                 <a:cs typeface="Arial" panose="020B0604020202020204" pitchFamily="34" charset="0"/>
               </a:rPr>
-              <a:t>. Hier besteht die Herausforderung für das Marketing darin deutlich zu machen, dass Go Happy eine einfache Möglichkeit bietet </a:t>
+              <a:t>Getränkekarte. Diese </a:t>
             </a:r>
             <a:r>
               <a:rPr lang="de-DE" sz="1600" dirty="0">
                 <a:latin typeface="Arial" panose="020B0604020202020204" pitchFamily="34" charset="0"/>
                 <a:cs typeface="Arial" panose="020B0604020202020204" pitchFamily="34" charset="0"/>
               </a:rPr>
-              <a:t>eine Route zu </a:t>
+              <a:t>Aspekte beinhaltet das bisherige Konzept </a:t>
             </a:r>
             <a:r>
               <a:rPr lang="de-DE" sz="1600" dirty="0" smtClean="0">
                 <a:latin typeface="Arial" panose="020B0604020202020204" pitchFamily="34" charset="0"/>
                 <a:cs typeface="Arial" panose="020B0604020202020204" pitchFamily="34" charset="0"/>
               </a:rPr>
-              <a:t>erstellen. Außerdem müssen weitere Vorteile herausgestellt werden wie beispielsweise die Spontanität </a:t>
+              <a:t>noch nicht</a:t>
             </a:r>
             <a:r>
               <a:rPr lang="de-DE" sz="1600" dirty="0">
                 <a:latin typeface="Arial" panose="020B0604020202020204" pitchFamily="34" charset="0"/>
                 <a:cs typeface="Arial" panose="020B0604020202020204" pitchFamily="34" charset="0"/>
               </a:rPr>
-              <a:t>durch </a:t>
+              <a:t>: Art der Location, Musik, Speise-/ </a:t>
             </a:r>
             <a:r>
               <a:rPr lang="de-DE" sz="1600" dirty="0" smtClean="0">
                 <a:latin typeface="Arial" panose="020B0604020202020204" pitchFamily="34" charset="0"/>
                 <a:cs typeface="Arial" panose="020B0604020202020204" pitchFamily="34" charset="0"/>
               </a:rPr>
-              <a:t>Einstellungen. (</a:t>
-            </a:r>
-            <a:r>
-              <a:rPr lang="de-DE" sz="1600" dirty="0">
-                <a:latin typeface="Arial" panose="020B0604020202020204" pitchFamily="34" charset="0"/>
-                <a:cs typeface="Arial" panose="020B0604020202020204" pitchFamily="34" charset="0"/>
-                <a:hlinkClick r:id="rId5" action="ppaction://hlinksldjump"/>
-              </a:rPr>
-              <a:t>Folie</a:t>
+              <a:t>Getränkekarte. (</a:t>
             </a:r>
             <a:r>
               <a:rPr lang="de-DE" sz="1600" dirty="0" smtClean="0">
                 <a:latin typeface="Arial" panose="020B0604020202020204" pitchFamily="34" charset="0"/>
                 <a:cs typeface="Arial" panose="020B0604020202020204" pitchFamily="34" charset="0"/>
-                <a:hlinkClick r:id="rId5" action="ppaction://hlinksldjump"/>
-              </a:rPr>
-              <a:t> </a:t>
-            </a:r>
-            <a:r>
-              <a:rPr lang="de-DE" sz="1600" dirty="0">
-                <a:latin typeface="Arial" panose="020B0604020202020204" pitchFamily="34" charset="0"/>
-                <a:cs typeface="Arial" panose="020B0604020202020204" pitchFamily="34" charset="0"/>
-                <a:hlinkClick r:id="rId5" action="ppaction://hlinksldjump"/>
-              </a:rPr>
-              <a:t>24</a:t>
+                <a:hlinkClick r:id="rId6" action="ppaction://hlinksldjump"/>
+              </a:rPr>
+              <a:t>Folie </a:t>
             </a:r>
             <a:r>
               <a:rPr lang="de-DE" sz="1600" dirty="0" smtClean="0">
                 <a:latin typeface="Arial" panose="020B0604020202020204" pitchFamily="34" charset="0"/>
                 <a:cs typeface="Arial" panose="020B0604020202020204" pitchFamily="34" charset="0"/>
-              </a:rPr>
-              <a:t>)</a:t>
-            </a:r>
-          </a:p>
-          <a:p>
-            <a:r>
-              <a:rPr lang="de-DE" sz="1600" dirty="0">
-                <a:latin typeface="Arial" panose="020B0604020202020204" pitchFamily="34" charset="0"/>
-                <a:cs typeface="Arial" panose="020B0604020202020204" pitchFamily="34" charset="0"/>
-              </a:rPr>
-              <a:t>Folgende Informationen sind den Befragten besonders wichtig: Art der Location, Happy Hour Zeiten, Musik &amp; Preisindex, Adresse, Speise-/ </a:t>
-            </a:r>
-            <a:r>
-              <a:rPr lang="de-DE" sz="1600" dirty="0" smtClean="0">
-                <a:latin typeface="Arial" panose="020B0604020202020204" pitchFamily="34" charset="0"/>
-                <a:cs typeface="Arial" panose="020B0604020202020204" pitchFamily="34" charset="0"/>
-              </a:rPr>
-              <a:t>Getränkekarte. Diese </a:t>
-            </a:r>
-            <a:r>
-              <a:rPr lang="de-DE" sz="1600" dirty="0">
-                <a:latin typeface="Arial" panose="020B0604020202020204" pitchFamily="34" charset="0"/>
-                <a:cs typeface="Arial" panose="020B0604020202020204" pitchFamily="34" charset="0"/>
-              </a:rPr>
-              <a:t>Aspekte beinhaltet das bisherige Konzept </a:t>
-            </a:r>
-            <a:r>
-              <a:rPr lang="de-DE" sz="1600" dirty="0" smtClean="0">
-                <a:latin typeface="Arial" panose="020B0604020202020204" pitchFamily="34" charset="0"/>
-                <a:cs typeface="Arial" panose="020B0604020202020204" pitchFamily="34" charset="0"/>
-              </a:rPr>
-              <a:t>noch nicht</a:t>
-            </a:r>
-            <a:r>
-              <a:rPr lang="de-DE" sz="1600" dirty="0">
-                <a:latin typeface="Arial" panose="020B0604020202020204" pitchFamily="34" charset="0"/>
-                <a:cs typeface="Arial" panose="020B0604020202020204" pitchFamily="34" charset="0"/>
-              </a:rPr>
-              <a:t>: Art der Location, Musik, Speise-/ </a:t>
-            </a:r>
-            <a:r>
-              <a:rPr lang="de-DE" sz="1600" dirty="0" smtClean="0">
-                <a:latin typeface="Arial" panose="020B0604020202020204" pitchFamily="34" charset="0"/>
-                <a:cs typeface="Arial" panose="020B0604020202020204" pitchFamily="34" charset="0"/>
-              </a:rPr>
-              <a:t>Getränkekarte. (</a:t>
-            </a:r>
-            <a:r>
-              <a:rPr lang="de-DE" sz="1600" dirty="0" smtClean="0">
-                <a:latin typeface="Arial" panose="020B0604020202020204" pitchFamily="34" charset="0"/>
-                <a:cs typeface="Arial" panose="020B0604020202020204" pitchFamily="34" charset="0"/>
                 <a:hlinkClick r:id="rId6" action="ppaction://hlinksldjump"/>
               </a:rPr>
-              <a:t>Folie 27</a:t>
+              <a:t>29</a:t>
             </a:r>
             <a:r>
               <a:rPr lang="de-DE" sz="1600" dirty="0" smtClean="0">
@@ -28366,14 +28352,7 @@
                 <a:latin typeface="Arial" panose="020B0604020202020204" pitchFamily="34" charset="0"/>
                 <a:cs typeface="Arial" panose="020B0604020202020204" pitchFamily="34" charset="0"/>
               </a:rPr>
-              <a:t>Mehr </a:t>
-            </a:r>
-            <a:r>
-              <a:rPr lang="de-DE" sz="1800" dirty="0" smtClean="0">
-                <a:latin typeface="Arial" panose="020B0604020202020204" pitchFamily="34" charset="0"/>
-                <a:cs typeface="Arial" panose="020B0604020202020204" pitchFamily="34" charset="0"/>
-              </a:rPr>
-              <a:t>Stadtgebiete als Wohnort zur Vorauswahl</a:t>
+              <a:t>Mehr Stadtgebiete als Wohnort zur Vorauswahl</a:t>
             </a:r>
           </a:p>
           <a:p>

</xml_diff>